<commit_message>
update traceability architecture until First solution (chapter 4)
Structure document with a systems engineering approach: scope, needs
with scenarios, tool chain requirements, solutions.
</commit_message>
<xml_diff>
--- a/T7.3/TraceabilityArchitecture/images/2015-10-25 openETCS traceability_Figures.pptx
+++ b/T7.3/TraceabilityArchitecture/images/2015-10-25 openETCS traceability_Figures.pptx
@@ -206,7 +206,7 @@
           <a:p>
             <a:fld id="{4A18087E-E36A-2A4D-8CB3-3CD1A9D98D8B}" type="datetimeFigureOut">
               <a:rPr lang="fr-FR" smtClean="0"/>
-              <a:t>24/10/2015</a:t>
+              <a:t>27/10/2015</a:t>
             </a:fld>
             <a:endParaRPr lang="fr-FR"/>
           </a:p>
@@ -372,7 +372,7 @@
           <a:p>
             <a:fld id="{D0A69204-F5D6-9145-8B06-239DED8355FC}" type="datetimeFigureOut">
               <a:rPr lang="fr-FR" smtClean="0"/>
-              <a:t>24/10/2015</a:t>
+              <a:t>27/10/2015</a:t>
             </a:fld>
             <a:endParaRPr lang="fr-FR"/>
           </a:p>
@@ -7943,13 +7943,8 @@
               <a:pPr algn="ctr"/>
               <a:r>
                 <a:rPr lang="eu-ES" dirty="0" smtClean="0"/>
-                <a:t>User stories </a:t>
+                <a:t>User stories model</a:t>
               </a:r>
-              <a:r>
-                <a:rPr lang="eu-ES" dirty="0" smtClean="0"/>
-                <a:t>model</a:t>
-              </a:r>
-              <a:endParaRPr lang="eu-ES" dirty="0" smtClean="0"/>
             </a:p>
           </p:txBody>
         </p:sp>
@@ -8301,15 +8296,7 @@
               <a:pPr algn="ctr"/>
               <a:r>
                 <a:rPr lang="eu-ES" sz="1400" dirty="0" smtClean="0"/>
-                <a:t>OpenETCS architecture </a:t>
-              </a:r>
-              <a:r>
-                <a:rPr lang="eu-ES" sz="1400" dirty="0" smtClean="0"/>
-                <a:t>(semi formal) </a:t>
-              </a:r>
-              <a:r>
-                <a:rPr lang="eu-ES" sz="1400" dirty="0" smtClean="0"/>
-                <a:t>model</a:t>
+                <a:t>OpenETCS architecture (semi formal) model</a:t>
               </a:r>
               <a:endParaRPr lang="eu-ES" sz="1400" dirty="0"/>
             </a:p>
@@ -12904,13 +12891,8 @@
               <a:pPr algn="ctr"/>
               <a:r>
                 <a:rPr lang="eu-ES" dirty="0" smtClean="0"/>
-                <a:t>User stories </a:t>
+                <a:t>User stories model</a:t>
               </a:r>
-              <a:r>
-                <a:rPr lang="eu-ES" dirty="0" smtClean="0"/>
-                <a:t>model</a:t>
-              </a:r>
-              <a:endParaRPr lang="eu-ES" dirty="0" smtClean="0"/>
             </a:p>
           </p:txBody>
         </p:sp>
@@ -13262,15 +13244,7 @@
               <a:pPr algn="ctr"/>
               <a:r>
                 <a:rPr lang="eu-ES" sz="1400" dirty="0" smtClean="0"/>
-                <a:t>OpenETCS architecture </a:t>
-              </a:r>
-              <a:r>
-                <a:rPr lang="eu-ES" sz="1400" dirty="0" smtClean="0"/>
-                <a:t>(semi formal) </a:t>
-              </a:r>
-              <a:r>
-                <a:rPr lang="eu-ES" sz="1400" dirty="0" smtClean="0"/>
-                <a:t>model</a:t>
+                <a:t>OpenETCS architecture (semi formal) model</a:t>
               </a:r>
               <a:endParaRPr lang="eu-ES" sz="1400" dirty="0"/>
             </a:p>
@@ -15750,27 +15724,7 @@
               <a:pPr algn="ctr"/>
               <a:r>
                 <a:rPr lang="eu-ES" sz="1600" dirty="0" smtClean="0"/>
-                <a:t>Software or hardware </a:t>
-              </a:r>
-              <a:r>
-                <a:rPr lang="eu-ES" sz="1600" dirty="0" smtClean="0"/>
-                <a:t>block </a:t>
-              </a:r>
-              <a:r>
-                <a:rPr lang="eu-ES" sz="1600" dirty="0" smtClean="0"/>
-                <a:t>definition </a:t>
-              </a:r>
-              <a:r>
-                <a:rPr lang="eu-ES" sz="1600" dirty="0" smtClean="0"/>
-                <a:t>a</a:t>
-              </a:r>
-              <a:r>
-                <a:rPr lang="eu-ES" sz="1600" dirty="0" smtClean="0"/>
-                <a:t>nd </a:t>
-              </a:r>
-              <a:r>
-                <a:rPr lang="eu-ES" sz="1600" dirty="0" smtClean="0"/>
-                <a:t>realization</a:t>
+                <a:t>Software or hardware block definition and realization</a:t>
               </a:r>
               <a:endParaRPr lang="eu-ES" sz="1600" dirty="0"/>
             </a:p>
@@ -15830,11 +15784,7 @@
             </a:r>
             <a:r>
               <a:rPr lang="fr-FR" dirty="0" err="1" smtClean="0"/>
-              <a:t>req</a:t>
-            </a:r>
-            <a:r>
-              <a:rPr lang="fr-FR" dirty="0" err="1" smtClean="0"/>
-              <a:t>uirements</a:t>
+              <a:t>requirements</a:t>
             </a:r>
             <a:r>
               <a:rPr lang="fr-FR" dirty="0" smtClean="0"/>
@@ -17759,11 +17709,7 @@
                   <a:pPr algn="ctr"/>
                   <a:r>
                     <a:rPr lang="eu-ES" sz="1100" dirty="0" smtClean="0"/>
-                    <a:t>Cenelec </a:t>
-                  </a:r>
-                  <a:r>
-                    <a:rPr lang="eu-ES" sz="1100" dirty="0" smtClean="0"/>
-                    <a:t>EN 50128</a:t>
+                    <a:t>Cenelec EN 50128</a:t>
                   </a:r>
                   <a:endParaRPr lang="eu-ES" sz="1100" dirty="0"/>
                 </a:p>
@@ -19702,15 +19648,7 @@
                     <a:srgbClr val="FF6600"/>
                   </a:solidFill>
                 </a:rPr>
-                <a:t>T</a:t>
-              </a:r>
-              <a:r>
-                <a:rPr lang="en-GB" sz="1400" i="1" dirty="0" smtClean="0">
-                  <a:solidFill>
-                    <a:srgbClr val="FF6600"/>
-                  </a:solidFill>
-                </a:rPr>
-                <a:t>raceability (between requirements or through models)</a:t>
+                <a:t>Traceability (between requirements or through models)</a:t>
               </a:r>
               <a:endParaRPr lang="en-GB" sz="1400" i="1" dirty="0">
                 <a:solidFill>
@@ -26049,7 +25987,6 @@
                         <a:rPr lang="eu-ES" dirty="0" smtClean="0"/>
                         <a:t>openETCS OnBoard Unit functions</a:t>
                       </a:r>
-                      <a:endParaRPr lang="eu-ES" dirty="0" smtClean="0"/>
                     </a:p>
                     <a:p>
                       <a:pPr algn="ctr"/>
@@ -26369,11 +26306,7 @@
                       <a:pPr algn="ctr"/>
                       <a:r>
                         <a:rPr lang="eu-ES" dirty="0" smtClean="0"/>
-                        <a:t>(semi formal) </a:t>
-                      </a:r>
-                      <a:r>
-                        <a:rPr lang="eu-ES" dirty="0" smtClean="0"/>
-                        <a:t>model</a:t>
+                        <a:t>(semi formal) model</a:t>
                       </a:r>
                       <a:endParaRPr lang="eu-ES" dirty="0"/>
                     </a:p>
@@ -26467,13 +26400,8 @@
                       <a:pPr algn="ctr"/>
                       <a:r>
                         <a:rPr lang="eu-ES" dirty="0" smtClean="0"/>
-                        <a:t>User stories </a:t>
+                        <a:t>User stories model</a:t>
                       </a:r>
-                      <a:r>
-                        <a:rPr lang="eu-ES" dirty="0" smtClean="0"/>
-                        <a:t>model</a:t>
-                      </a:r>
-                      <a:endParaRPr lang="eu-ES" dirty="0" smtClean="0"/>
                     </a:p>
                   </p:txBody>
                 </p:sp>
@@ -27088,11 +27016,7 @@
           <a:p>
             <a:r>
               <a:rPr lang="eu-ES" dirty="0" smtClean="0"/>
-              <a:t>OpenETCS </a:t>
-            </a:r>
-            <a:r>
-              <a:rPr lang="eu-ES" dirty="0" smtClean="0"/>
-              <a:t>traceability priority</a:t>
+              <a:t>OpenETCS traceability priority</a:t>
             </a:r>
             <a:endParaRPr lang="eu-ES" dirty="0"/>
           </a:p>
@@ -27100,7 +27024,7 @@
       </p:sp>
       <p:grpSp>
         <p:nvGrpSpPr>
-          <p:cNvPr id="127" name="Grouper 126"/>
+          <p:cNvPr id="140" name="Grouper 139"/>
           <p:cNvGrpSpPr/>
           <p:nvPr/>
         </p:nvGrpSpPr>
@@ -27114,21 +27038,21 @@
         </p:grpSpPr>
         <p:grpSp>
           <p:nvGrpSpPr>
-            <p:cNvPr id="126" name="Grouper 125"/>
+            <p:cNvPr id="127" name="Grouper 126"/>
             <p:cNvGrpSpPr/>
             <p:nvPr/>
           </p:nvGrpSpPr>
           <p:grpSpPr>
             <a:xfrm>
-              <a:off x="920223" y="2482896"/>
-              <a:ext cx="5581010" cy="4050497"/>
-              <a:chOff x="920223" y="2482896"/>
-              <a:chExt cx="5581010" cy="4050497"/>
+              <a:off x="920223" y="1519887"/>
+              <a:ext cx="5581010" cy="5013506"/>
+              <a:chOff x="920223" y="1519887"/>
+              <a:chExt cx="5581010" cy="5013506"/>
             </a:xfrm>
           </p:grpSpPr>
           <p:grpSp>
             <p:nvGrpSpPr>
-              <p:cNvPr id="108" name="Grouper 107"/>
+              <p:cNvPr id="126" name="Grouper 125"/>
               <p:cNvGrpSpPr/>
               <p:nvPr/>
             </p:nvGrpSpPr>
@@ -27142,7 +27066,7 @@
             </p:grpSpPr>
             <p:grpSp>
               <p:nvGrpSpPr>
-                <p:cNvPr id="98" name="Grouper 97"/>
+                <p:cNvPr id="108" name="Grouper 107"/>
                 <p:cNvGrpSpPr/>
                 <p:nvPr/>
               </p:nvGrpSpPr>
@@ -27242,11 +27166,7 @@
                           <a:pPr algn="ctr"/>
                           <a:r>
                             <a:rPr lang="eu-ES" sz="1600" dirty="0" smtClean="0"/>
-                            <a:t>SRS – Subset </a:t>
-                          </a:r>
-                          <a:r>
-                            <a:rPr lang="eu-ES" sz="1600" dirty="0" smtClean="0"/>
-                            <a:t>26</a:t>
+                            <a:t>SRS – Subset 26</a:t>
                           </a:r>
                         </a:p>
                         <a:p>
@@ -27268,7 +27188,7 @@
                       <p:spPr>
                         <a:xfrm>
                           <a:off x="2489113" y="2787067"/>
-                          <a:ext cx="1933483" cy="1537656"/>
+                          <a:ext cx="2013568" cy="1537656"/>
                         </a:xfrm>
                         <a:prstGeom prst="roundRect">
                           <a:avLst/>
@@ -27304,20 +27224,21 @@
                         <a:p>
                           <a:pPr algn="ctr"/>
                           <a:r>
-                            <a:rPr lang="eu-ES" dirty="0" smtClean="0"/>
-                            <a:t>Architecture </a:t>
+                            <a:rPr lang="eu-ES" sz="1600" dirty="0" smtClean="0"/>
+                            <a:t>System architecture </a:t>
                           </a:r>
+                          <a:endParaRPr lang="eu-ES" sz="1600" dirty="0" smtClean="0"/>
                         </a:p>
                         <a:p>
                           <a:pPr algn="ctr"/>
                           <a:r>
-                            <a:rPr lang="eu-ES" dirty="0" smtClean="0"/>
+                            <a:rPr lang="eu-ES" sz="1600" dirty="0" smtClean="0"/>
                             <a:t>(semi formal) model</a:t>
                           </a:r>
                         </a:p>
                         <a:p>
                           <a:pPr algn="ctr"/>
-                          <a:endParaRPr lang="eu-ES" dirty="0"/>
+                          <a:endParaRPr lang="eu-ES" sz="1600" dirty="0"/>
                         </a:p>
                       </p:txBody>
                     </p:sp>
@@ -27419,7 +27340,11 @@
                           <a:pPr algn="ctr"/>
                           <a:r>
                             <a:rPr lang="eu-ES" dirty="0" smtClean="0"/>
-                            <a:t>openETCS OnBoard Unit functions</a:t>
+                            <a:t>openETCS </a:t>
+                          </a:r>
+                          <a:r>
+                            <a:rPr lang="eu-ES" dirty="0" smtClean="0"/>
+                            <a:t>OBU functional</a:t>
                           </a:r>
                           <a:endParaRPr lang="eu-ES" dirty="0" smtClean="0"/>
                         </a:p>
@@ -27427,7 +27352,18 @@
                           <a:pPr algn="ctr"/>
                           <a:r>
                             <a:rPr lang="eu-ES" dirty="0" smtClean="0"/>
-                            <a:t>(executable) model</a:t>
+                            <a:t>(formal)</a:t>
+                          </a:r>
+                        </a:p>
+                        <a:p>
+                          <a:pPr algn="ctr"/>
+                          <a:r>
+                            <a:rPr lang="eu-ES" dirty="0" smtClean="0"/>
+                            <a:t>executable </a:t>
+                          </a:r>
+                          <a:r>
+                            <a:rPr lang="eu-ES" dirty="0" smtClean="0"/>
+                            <a:t>model</a:t>
                           </a:r>
                           <a:endParaRPr lang="eu-ES" dirty="0"/>
                         </a:p>
@@ -27499,8 +27435,8 @@
                   </p:nvCxnSpPr>
                   <p:spPr>
                     <a:xfrm flipH="1">
-                      <a:off x="2052523" y="4210626"/>
-                      <a:ext cx="2318600" cy="1"/>
+                      <a:off x="2132613" y="4210626"/>
+                      <a:ext cx="2238510" cy="1"/>
                     </a:xfrm>
                     <a:prstGeom prst="straightConnector1">
                       <a:avLst/>
@@ -27566,111 +27502,190 @@
                   </p:style>
                 </p:cxnSp>
               </p:grpSp>
-              <p:sp>
-                <p:nvSpPr>
-                  <p:cNvPr id="71" name="Rectangle à coins arrondis 70"/>
-                  <p:cNvSpPr/>
+              <p:cxnSp>
+                <p:nvCxnSpPr>
+                  <p:cNvPr id="99" name="Connecteur droit avec flèche 98"/>
+                  <p:cNvCxnSpPr/>
                   <p:nvPr/>
-                </p:nvSpPr>
+                </p:nvCxnSpPr>
                 <p:spPr>
-                  <a:xfrm>
-                    <a:off x="1015767" y="3682637"/>
-                    <a:ext cx="1036756" cy="675830"/>
+                  <a:xfrm flipH="1">
+                    <a:off x="2132613" y="3142691"/>
+                    <a:ext cx="910620" cy="0"/>
                   </a:xfrm>
-                  <a:prstGeom prst="roundRect">
+                  <a:prstGeom prst="straightConnector1">
                     <a:avLst/>
                   </a:prstGeom>
-                  <a:solidFill>
-                    <a:srgbClr val="660066">
-                      <a:alpha val="68000"/>
-                    </a:srgbClr>
-                  </a:solidFill>
-                  <a:ln w="76200" cmpd="sng">
+                  <a:ln w="28575" cmpd="sng">
                     <a:solidFill>
-                      <a:schemeClr val="tx1"/>
+                      <a:srgbClr val="FF6600"/>
                     </a:solidFill>
+                    <a:prstDash val="solid"/>
+                    <a:tailEnd type="arrow"/>
                   </a:ln>
                 </p:spPr>
                 <p:style>
-                  <a:lnRef idx="1">
+                  <a:lnRef idx="2">
                     <a:schemeClr val="accent1"/>
                   </a:lnRef>
-                  <a:fillRef idx="3">
+                  <a:fillRef idx="0">
                     <a:schemeClr val="accent1"/>
                   </a:fillRef>
-                  <a:effectRef idx="2">
+                  <a:effectRef idx="1">
                     <a:schemeClr val="accent1"/>
                   </a:effectRef>
                   <a:fontRef idx="minor">
-                    <a:schemeClr val="lt1"/>
+                    <a:schemeClr val="tx1"/>
                   </a:fontRef>
                 </p:style>
-                <p:txBody>
-                  <a:bodyPr rtlCol="0" anchor="ctr"/>
-                  <a:lstStyle/>
-                  <a:p>
-                    <a:pPr algn="ctr"/>
-                    <a:r>
-                      <a:rPr lang="eu-ES" sz="1600" dirty="0" smtClean="0"/>
-                      <a:t>Chapters 7 &amp; 8</a:t>
-                    </a:r>
-                    <a:endParaRPr lang="eu-ES" sz="1600" dirty="0"/>
-                  </a:p>
-                </p:txBody>
-              </p:sp>
+              </p:cxnSp>
+              <p:cxnSp>
+                <p:nvCxnSpPr>
+                  <p:cNvPr id="101" name="Connecteur droit avec flèche 100"/>
+                  <p:cNvCxnSpPr/>
+                  <p:nvPr/>
+                </p:nvCxnSpPr>
+                <p:spPr>
+                  <a:xfrm flipH="1">
+                    <a:off x="2162880" y="3646469"/>
+                    <a:ext cx="2813836" cy="0"/>
+                  </a:xfrm>
+                  <a:prstGeom prst="straightConnector1">
+                    <a:avLst/>
+                  </a:prstGeom>
+                  <a:ln w="28575" cmpd="sng">
+                    <a:solidFill>
+                      <a:srgbClr val="FF6600"/>
+                    </a:solidFill>
+                    <a:prstDash val="solid"/>
+                    <a:tailEnd type="arrow"/>
+                  </a:ln>
+                </p:spPr>
+                <p:style>
+                  <a:lnRef idx="2">
+                    <a:schemeClr val="accent1"/>
+                  </a:lnRef>
+                  <a:fillRef idx="0">
+                    <a:schemeClr val="accent1"/>
+                  </a:fillRef>
+                  <a:effectRef idx="1">
+                    <a:schemeClr val="accent1"/>
+                  </a:effectRef>
+                  <a:fontRef idx="minor">
+                    <a:schemeClr val="tx1"/>
+                  </a:fontRef>
+                </p:style>
+              </p:cxnSp>
             </p:grpSp>
             <p:cxnSp>
               <p:nvCxnSpPr>
-                <p:cNvPr id="99" name="Connecteur droit avec flèche 98"/>
+                <p:cNvPr id="109" name="Connecteur droit avec flèche 108"/>
+                <p:cNvCxnSpPr/>
+                <p:nvPr/>
+              </p:nvCxnSpPr>
+              <p:spPr bwMode="auto">
+                <a:xfrm flipH="1" flipV="1">
+                  <a:off x="1541929" y="4465787"/>
+                  <a:ext cx="10492" cy="397062"/>
+                </a:xfrm>
+                <a:prstGeom prst="straightConnector1">
+                  <a:avLst/>
+                </a:prstGeom>
+                <a:solidFill>
+                  <a:schemeClr val="accent1"/>
+                </a:solidFill>
+                <a:ln w="57150" cap="flat" cmpd="sng" algn="ctr">
+                  <a:solidFill>
+                    <a:srgbClr val="FF6600"/>
+                  </a:solidFill>
+                  <a:prstDash val="solid"/>
+                  <a:round/>
+                  <a:headEnd type="none" w="med" len="med"/>
+                  <a:tailEnd type="arrow"/>
+                </a:ln>
+                <a:effectLst/>
+                <a:extLst>
+                  <a:ext uri="{AF507438-7753-43e0-B8FC-AC1667EBCBE1}">
+                    <a14:hiddenEffects xmlns:a14="http://schemas.microsoft.com/office/drawing/2010/main">
+                      <a:effectLst>
+                        <a:outerShdw blurRad="63500" dist="38099" dir="2700000" algn="ctr" rotWithShape="0">
+                          <a:schemeClr val="bg2">
+                            <a:alpha val="74998"/>
+                          </a:schemeClr>
+                        </a:outerShdw>
+                      </a:effectLst>
+                    </a14:hiddenEffects>
+                  </a:ext>
+                </a:extLst>
+              </p:spPr>
+            </p:cxnSp>
+            <p:sp>
+              <p:nvSpPr>
+                <p:cNvPr id="110" name="Rectangle à coins arrondis 109"/>
+                <p:cNvSpPr/>
+                <p:nvPr/>
+              </p:nvSpPr>
+              <p:spPr>
+                <a:xfrm>
+                  <a:off x="972229" y="4885733"/>
+                  <a:ext cx="1160384" cy="892436"/>
+                </a:xfrm>
+                <a:prstGeom prst="roundRect">
+                  <a:avLst/>
+                </a:prstGeom>
+                <a:solidFill>
+                  <a:srgbClr val="660066">
+                    <a:alpha val="60000"/>
+                  </a:srgbClr>
+                </a:solidFill>
+                <a:ln w="76200" cmpd="sng">
+                  <a:solidFill>
+                    <a:srgbClr val="000000"/>
+                  </a:solidFill>
+                </a:ln>
+              </p:spPr>
+              <p:style>
+                <a:lnRef idx="1">
+                  <a:schemeClr val="accent1"/>
+                </a:lnRef>
+                <a:fillRef idx="3">
+                  <a:schemeClr val="accent1"/>
+                </a:fillRef>
+                <a:effectRef idx="2">
+                  <a:schemeClr val="accent1"/>
+                </a:effectRef>
+                <a:fontRef idx="minor">
+                  <a:schemeClr val="lt1"/>
+                </a:fontRef>
+              </p:style>
+              <p:txBody>
+                <a:bodyPr rtlCol="0" anchor="ctr"/>
+                <a:lstStyle/>
+                <a:p>
+                  <a:pPr algn="ctr"/>
+                  <a:r>
+                    <a:rPr lang="eu-ES" sz="1200" dirty="0" smtClean="0"/>
+                    <a:t>openETCS decomposed and derived requirements</a:t>
+                  </a:r>
+                  <a:endParaRPr lang="eu-ES" sz="1200" dirty="0"/>
+                </a:p>
+              </p:txBody>
+            </p:sp>
+            <p:cxnSp>
+              <p:nvCxnSpPr>
+                <p:cNvPr id="113" name="Connecteur droit avec flèche 112"/>
                 <p:cNvCxnSpPr/>
                 <p:nvPr/>
               </p:nvCxnSpPr>
               <p:spPr>
                 <a:xfrm flipH="1">
-                  <a:off x="2132613" y="3142691"/>
-                  <a:ext cx="910620" cy="0"/>
+                  <a:off x="2132614" y="5240399"/>
+                  <a:ext cx="2238509" cy="1"/>
                 </a:xfrm>
                 <a:prstGeom prst="straightConnector1">
                   <a:avLst/>
                 </a:prstGeom>
-                <a:ln w="28575" cmpd="sng">
-                  <a:solidFill>
-                    <a:srgbClr val="FF6600"/>
-                  </a:solidFill>
-                  <a:prstDash val="solid"/>
-                  <a:tailEnd type="arrow"/>
-                </a:ln>
-              </p:spPr>
-              <p:style>
-                <a:lnRef idx="2">
-                  <a:schemeClr val="accent1"/>
-                </a:lnRef>
-                <a:fillRef idx="0">
-                  <a:schemeClr val="accent1"/>
-                </a:fillRef>
-                <a:effectRef idx="1">
-                  <a:schemeClr val="accent1"/>
-                </a:effectRef>
-                <a:fontRef idx="minor">
-                  <a:schemeClr val="tx1"/>
-                </a:fontRef>
-              </p:style>
-            </p:cxnSp>
-            <p:cxnSp>
-              <p:nvCxnSpPr>
-                <p:cNvPr id="101" name="Connecteur droit avec flèche 100"/>
-                <p:cNvCxnSpPr/>
-                <p:nvPr/>
-              </p:nvCxnSpPr>
-              <p:spPr>
-                <a:xfrm flipH="1">
-                  <a:off x="2162880" y="3646469"/>
-                  <a:ext cx="2813836" cy="0"/>
-                </a:xfrm>
-                <a:prstGeom prst="straightConnector1">
-                  <a:avLst/>
-                </a:prstGeom>
-                <a:ln w="28575" cmpd="sng">
+                <a:ln w="57150" cmpd="sng">
                   <a:solidFill>
                     <a:srgbClr val="FF6600"/>
                   </a:solidFill>
@@ -27694,366 +27709,251 @@
               </p:style>
             </p:cxnSp>
           </p:grpSp>
-          <p:cxnSp>
-            <p:nvCxnSpPr>
-              <p:cNvPr id="109" name="Connecteur droit avec flèche 108"/>
-              <p:cNvCxnSpPr/>
+          <p:grpSp>
+            <p:nvGrpSpPr>
+              <p:cNvPr id="125" name="Grouper 124"/>
+              <p:cNvGrpSpPr/>
               <p:nvPr/>
-            </p:nvCxnSpPr>
-            <p:spPr bwMode="auto">
-              <a:xfrm flipH="1" flipV="1">
-                <a:off x="1541929" y="4465787"/>
-                <a:ext cx="10492" cy="397062"/>
+            </p:nvGrpSpPr>
+            <p:grpSpPr>
+              <a:xfrm>
+                <a:off x="1263501" y="1519887"/>
+                <a:ext cx="4845207" cy="844601"/>
+                <a:chOff x="1378239" y="1361250"/>
+                <a:chExt cx="4845207" cy="844601"/>
               </a:xfrm>
-              <a:prstGeom prst="straightConnector1">
-                <a:avLst/>
-              </a:prstGeom>
-              <a:solidFill>
-                <a:schemeClr val="accent1"/>
-              </a:solidFill>
-              <a:ln w="57150" cap="flat" cmpd="sng" algn="ctr">
+            </p:grpSpPr>
+            <p:cxnSp>
+              <p:nvCxnSpPr>
+                <p:cNvPr id="117" name="Connecteur droit avec flèche 116"/>
+                <p:cNvCxnSpPr/>
+                <p:nvPr/>
+              </p:nvCxnSpPr>
+              <p:spPr bwMode="auto">
+                <a:xfrm flipH="1">
+                  <a:off x="1378239" y="1556205"/>
+                  <a:ext cx="583035" cy="0"/>
+                </a:xfrm>
+                <a:prstGeom prst="straightConnector1">
+                  <a:avLst/>
+                </a:prstGeom>
                 <a:solidFill>
-                  <a:srgbClr val="FF6600"/>
+                  <a:schemeClr val="accent1"/>
                 </a:solidFill>
-                <a:prstDash val="solid"/>
-                <a:round/>
-                <a:headEnd type="none" w="med" len="med"/>
-                <a:tailEnd type="arrow"/>
-              </a:ln>
-              <a:effectLst/>
-              <a:extLst>
-                <a:ext uri="{AF507438-7753-43e0-B8FC-AC1667EBCBE1}">
-                  <a14:hiddenEffects xmlns:a14="http://schemas.microsoft.com/office/drawing/2010/main">
-                    <a:effectLst>
-                      <a:outerShdw blurRad="63500" dist="38099" dir="2700000" algn="ctr" rotWithShape="0">
-                        <a:schemeClr val="bg2">
-                          <a:alpha val="74998"/>
-                        </a:schemeClr>
-                      </a:outerShdw>
-                    </a:effectLst>
-                  </a14:hiddenEffects>
-                </a:ext>
-              </a:extLst>
-            </p:spPr>
-          </p:cxnSp>
-          <p:sp>
-            <p:nvSpPr>
-              <p:cNvPr id="110" name="Rectangle à coins arrondis 109"/>
-              <p:cNvSpPr/>
-              <p:nvPr/>
-            </p:nvSpPr>
-            <p:spPr>
-              <a:xfrm>
-                <a:off x="972229" y="4885733"/>
-                <a:ext cx="1160384" cy="892436"/>
-              </a:xfrm>
-              <a:prstGeom prst="roundRect">
-                <a:avLst/>
-              </a:prstGeom>
-              <a:solidFill>
-                <a:srgbClr val="660066">
-                  <a:alpha val="60000"/>
-                </a:srgbClr>
-              </a:solidFill>
-              <a:ln w="76200" cmpd="sng">
-                <a:solidFill>
-                  <a:srgbClr val="000000"/>
-                </a:solidFill>
-              </a:ln>
-            </p:spPr>
-            <p:style>
-              <a:lnRef idx="1">
-                <a:schemeClr val="accent1"/>
-              </a:lnRef>
-              <a:fillRef idx="3">
-                <a:schemeClr val="accent1"/>
-              </a:fillRef>
-              <a:effectRef idx="2">
-                <a:schemeClr val="accent1"/>
-              </a:effectRef>
-              <a:fontRef idx="minor">
-                <a:schemeClr val="lt1"/>
-              </a:fontRef>
-            </p:style>
-            <p:txBody>
-              <a:bodyPr rtlCol="0" anchor="ctr"/>
-              <a:lstStyle/>
-              <a:p>
-                <a:pPr algn="ctr"/>
-                <a:r>
-                  <a:rPr lang="eu-ES" sz="1200" dirty="0" smtClean="0"/>
-                  <a:t>openETCS decomposed and derived requirements</a:t>
-                </a:r>
-                <a:endParaRPr lang="eu-ES" sz="1200" dirty="0"/>
-              </a:p>
-            </p:txBody>
-          </p:sp>
-          <p:cxnSp>
-            <p:nvCxnSpPr>
-              <p:cNvPr id="113" name="Connecteur droit avec flèche 112"/>
-              <p:cNvCxnSpPr/>
-              <p:nvPr/>
-            </p:nvCxnSpPr>
-            <p:spPr>
-              <a:xfrm flipH="1">
-                <a:off x="2132614" y="5240399"/>
-                <a:ext cx="2238509" cy="1"/>
-              </a:xfrm>
-              <a:prstGeom prst="straightConnector1">
-                <a:avLst/>
-              </a:prstGeom>
-              <a:ln w="57150" cmpd="sng">
-                <a:solidFill>
-                  <a:srgbClr val="FF6600"/>
-                </a:solidFill>
-                <a:prstDash val="solid"/>
-                <a:tailEnd type="arrow"/>
-              </a:ln>
-            </p:spPr>
-            <p:style>
-              <a:lnRef idx="2">
-                <a:schemeClr val="accent1"/>
-              </a:lnRef>
-              <a:fillRef idx="0">
-                <a:schemeClr val="accent1"/>
-              </a:fillRef>
-              <a:effectRef idx="1">
-                <a:schemeClr val="accent1"/>
-              </a:effectRef>
-              <a:fontRef idx="minor">
-                <a:schemeClr val="tx1"/>
-              </a:fontRef>
-            </p:style>
-          </p:cxnSp>
-        </p:grpSp>
-        <p:grpSp>
-          <p:nvGrpSpPr>
-            <p:cNvPr id="125" name="Grouper 124"/>
-            <p:cNvGrpSpPr/>
-            <p:nvPr/>
-          </p:nvGrpSpPr>
-          <p:grpSpPr>
-            <a:xfrm>
-              <a:off x="1263501" y="1519887"/>
-              <a:ext cx="4959945" cy="629158"/>
-              <a:chOff x="1378239" y="1361250"/>
-              <a:chExt cx="4959945" cy="629158"/>
-            </a:xfrm>
-          </p:grpSpPr>
-          <p:cxnSp>
-            <p:nvCxnSpPr>
-              <p:cNvPr id="117" name="Connecteur droit avec flèche 116"/>
-              <p:cNvCxnSpPr/>
-              <p:nvPr/>
-            </p:nvCxnSpPr>
-            <p:spPr bwMode="auto">
-              <a:xfrm flipH="1">
-                <a:off x="1378239" y="1556205"/>
-                <a:ext cx="583035" cy="0"/>
-              </a:xfrm>
-              <a:prstGeom prst="straightConnector1">
-                <a:avLst/>
-              </a:prstGeom>
-              <a:solidFill>
-                <a:schemeClr val="accent1"/>
-              </a:solidFill>
-              <a:ln w="28575" cap="flat" cmpd="sng" algn="ctr">
-                <a:solidFill>
-                  <a:srgbClr val="FF6600"/>
-                </a:solidFill>
-                <a:prstDash val="solid"/>
-                <a:round/>
-                <a:headEnd type="none" w="med" len="med"/>
-                <a:tailEnd type="arrow"/>
-              </a:ln>
-              <a:effectLst/>
-              <a:extLst>
-                <a:ext uri="{AF507438-7753-43e0-B8FC-AC1667EBCBE1}">
-                  <a14:hiddenEffects xmlns:a14="http://schemas.microsoft.com/office/drawing/2010/main">
-                    <a:effectLst>
-                      <a:outerShdw blurRad="63500" dist="38099" dir="2700000" algn="ctr" rotWithShape="0">
-                        <a:schemeClr val="bg2">
-                          <a:alpha val="74998"/>
-                        </a:schemeClr>
-                      </a:outerShdw>
-                    </a:effectLst>
-                  </a14:hiddenEffects>
-                </a:ext>
-              </a:extLst>
-            </p:spPr>
-          </p:cxnSp>
-          <p:sp>
-            <p:nvSpPr>
-              <p:cNvPr id="118" name="ZoneTexte 117"/>
-              <p:cNvSpPr txBox="1"/>
-              <p:nvPr/>
-            </p:nvSpPr>
-            <p:spPr>
-              <a:xfrm>
-                <a:off x="2017875" y="1361250"/>
-                <a:ext cx="4205571" cy="307777"/>
-              </a:xfrm>
-              <a:prstGeom prst="rect">
-                <a:avLst/>
-              </a:prstGeom>
-              <a:noFill/>
-            </p:spPr>
-            <p:txBody>
-              <a:bodyPr wrap="square" rtlCol="0">
-                <a:spAutoFit/>
-              </a:bodyPr>
-              <a:lstStyle/>
-              <a:p>
-                <a:r>
-                  <a:rPr lang="en-GB" sz="1400" i="1" dirty="0" smtClean="0">
+                <a:ln w="28575" cap="flat" cmpd="sng" algn="ctr">
+                  <a:solidFill>
+                    <a:srgbClr val="FF6600"/>
+                  </a:solidFill>
+                  <a:prstDash val="solid"/>
+                  <a:round/>
+                  <a:headEnd type="none" w="med" len="med"/>
+                  <a:tailEnd type="arrow"/>
+                </a:ln>
+                <a:effectLst/>
+                <a:extLst>
+                  <a:ext uri="{AF507438-7753-43e0-B8FC-AC1667EBCBE1}">
+                    <a14:hiddenEffects xmlns:a14="http://schemas.microsoft.com/office/drawing/2010/main">
+                      <a:effectLst>
+                        <a:outerShdw blurRad="63500" dist="38099" dir="2700000" algn="ctr" rotWithShape="0">
+                          <a:schemeClr val="bg2">
+                            <a:alpha val="74998"/>
+                          </a:schemeClr>
+                        </a:outerShdw>
+                      </a:effectLst>
+                    </a14:hiddenEffects>
+                  </a:ext>
+                </a:extLst>
+              </p:spPr>
+            </p:cxnSp>
+            <p:sp>
+              <p:nvSpPr>
+                <p:cNvPr id="118" name="ZoneTexte 117"/>
+                <p:cNvSpPr txBox="1"/>
+                <p:nvPr/>
+              </p:nvSpPr>
+              <p:spPr>
+                <a:xfrm>
+                  <a:off x="2017875" y="1361250"/>
+                  <a:ext cx="4205571" cy="307777"/>
+                </a:xfrm>
+                <a:prstGeom prst="rect">
+                  <a:avLst/>
+                </a:prstGeom>
+                <a:noFill/>
+              </p:spPr>
+              <p:txBody>
+                <a:bodyPr wrap="square" rtlCol="0">
+                  <a:spAutoFit/>
+                </a:bodyPr>
+                <a:lstStyle/>
+                <a:p>
+                  <a:r>
+                    <a:rPr lang="en-GB" sz="1400" i="1" dirty="0" smtClean="0">
+                      <a:solidFill>
+                        <a:srgbClr val="FF6600"/>
+                      </a:solidFill>
+                    </a:rPr>
+                    <a:t>Traceability links to define and maintain</a:t>
+                  </a:r>
+                  <a:endParaRPr lang="en-GB" sz="1400" i="1" dirty="0">
                     <a:solidFill>
                       <a:srgbClr val="FF6600"/>
                     </a:solidFill>
-                  </a:rPr>
-                  <a:t>Traceability links to define and maintain</a:t>
-                </a:r>
-                <a:endParaRPr lang="en-GB" sz="1400" i="1" dirty="0">
+                  </a:endParaRPr>
+                </a:p>
+              </p:txBody>
+            </p:sp>
+            <p:cxnSp>
+              <p:nvCxnSpPr>
+                <p:cNvPr id="122" name="Connecteur droit avec flèche 121"/>
+                <p:cNvCxnSpPr/>
+                <p:nvPr/>
+              </p:nvCxnSpPr>
+              <p:spPr bwMode="auto">
+                <a:xfrm flipH="1">
+                  <a:off x="1378239" y="1834466"/>
+                  <a:ext cx="583035" cy="0"/>
+                </a:xfrm>
+                <a:prstGeom prst="straightConnector1">
+                  <a:avLst/>
+                </a:prstGeom>
+                <a:solidFill>
+                  <a:schemeClr val="accent1"/>
+                </a:solidFill>
+                <a:ln w="28575" cap="flat" cmpd="sng" algn="ctr">
                   <a:solidFill>
                     <a:srgbClr val="FF6600"/>
                   </a:solidFill>
-                </a:endParaRPr>
-              </a:p>
-            </p:txBody>
-          </p:sp>
-          <p:cxnSp>
-            <p:nvCxnSpPr>
-              <p:cNvPr id="122" name="Connecteur droit avec flèche 121"/>
-              <p:cNvCxnSpPr/>
-              <p:nvPr/>
-            </p:nvCxnSpPr>
-            <p:spPr bwMode="auto">
-              <a:xfrm flipH="1">
-                <a:off x="1378239" y="1834466"/>
-                <a:ext cx="583035" cy="0"/>
-              </a:xfrm>
-              <a:prstGeom prst="straightConnector1">
-                <a:avLst/>
-              </a:prstGeom>
-              <a:solidFill>
-                <a:schemeClr val="accent1"/>
-              </a:solidFill>
-              <a:ln w="28575" cap="flat" cmpd="sng" algn="ctr">
-                <a:solidFill>
-                  <a:srgbClr val="FF6600"/>
-                </a:solidFill>
-                <a:prstDash val="dash"/>
-                <a:round/>
-                <a:headEnd type="none" w="med" len="med"/>
-                <a:tailEnd type="arrow"/>
-              </a:ln>
-              <a:effectLst/>
-              <a:extLst>
-                <a:ext uri="{AF507438-7753-43e0-B8FC-AC1667EBCBE1}">
-                  <a14:hiddenEffects xmlns:a14="http://schemas.microsoft.com/office/drawing/2010/main">
-                    <a:effectLst>
-                      <a:outerShdw blurRad="63500" dist="38099" dir="2700000" algn="ctr" rotWithShape="0">
-                        <a:schemeClr val="bg2">
-                          <a:alpha val="74998"/>
-                        </a:schemeClr>
-                      </a:outerShdw>
-                    </a:effectLst>
-                  </a14:hiddenEffects>
-                </a:ext>
-              </a:extLst>
-            </p:spPr>
-          </p:cxnSp>
-          <p:sp>
-            <p:nvSpPr>
-              <p:cNvPr id="123" name="ZoneTexte 122"/>
-              <p:cNvSpPr txBox="1"/>
-              <p:nvPr/>
-            </p:nvSpPr>
-            <p:spPr>
-              <a:xfrm>
-                <a:off x="2132613" y="1682631"/>
-                <a:ext cx="4205571" cy="307777"/>
-              </a:xfrm>
-              <a:prstGeom prst="rect">
-                <a:avLst/>
-              </a:prstGeom>
-              <a:noFill/>
-            </p:spPr>
-            <p:txBody>
-              <a:bodyPr wrap="square" rtlCol="0">
-                <a:spAutoFit/>
-              </a:bodyPr>
-              <a:lstStyle/>
-              <a:p>
-                <a:r>
-                  <a:rPr lang="en-GB" sz="1400" i="1" dirty="0" smtClean="0">
+                  <a:prstDash val="dash"/>
+                  <a:round/>
+                  <a:headEnd type="none" w="med" len="med"/>
+                  <a:tailEnd type="arrow"/>
+                </a:ln>
+                <a:effectLst/>
+                <a:extLst>
+                  <a:ext uri="{AF507438-7753-43e0-B8FC-AC1667EBCBE1}">
+                    <a14:hiddenEffects xmlns:a14="http://schemas.microsoft.com/office/drawing/2010/main">
+                      <a:effectLst>
+                        <a:outerShdw blurRad="63500" dist="38099" dir="2700000" algn="ctr" rotWithShape="0">
+                          <a:schemeClr val="bg2">
+                            <a:alpha val="74998"/>
+                          </a:schemeClr>
+                        </a:outerShdw>
+                      </a:effectLst>
+                    </a14:hiddenEffects>
+                  </a:ext>
+                </a:extLst>
+              </p:spPr>
+            </p:cxnSp>
+            <p:sp>
+              <p:nvSpPr>
+                <p:cNvPr id="123" name="ZoneTexte 122"/>
+                <p:cNvSpPr txBox="1"/>
+                <p:nvPr/>
+              </p:nvSpPr>
+              <p:spPr>
+                <a:xfrm>
+                  <a:off x="2132614" y="1682631"/>
+                  <a:ext cx="3382148" cy="523220"/>
+                </a:xfrm>
+                <a:prstGeom prst="rect">
+                  <a:avLst/>
+                </a:prstGeom>
+                <a:noFill/>
+              </p:spPr>
+              <p:txBody>
+                <a:bodyPr wrap="square" rtlCol="0">
+                  <a:spAutoFit/>
+                </a:bodyPr>
+                <a:lstStyle/>
+                <a:p>
+                  <a:r>
+                    <a:rPr lang="en-GB" sz="1400" i="1" dirty="0" smtClean="0">
+                      <a:solidFill>
+                        <a:srgbClr val="FF6600"/>
+                      </a:solidFill>
+                    </a:rPr>
+                    <a:t>Traceability links automatically defined and </a:t>
+                  </a:r>
+                  <a:r>
+                    <a:rPr lang="en-GB" sz="1400" i="1" dirty="0" smtClean="0">
+                      <a:solidFill>
+                        <a:srgbClr val="FF6600"/>
+                      </a:solidFill>
+                    </a:rPr>
+                    <a:t>maintained </a:t>
+                  </a:r>
+                  <a:r>
+                    <a:rPr lang="en-GB" sz="1400" i="1" dirty="0" smtClean="0">
+                      <a:solidFill>
+                        <a:srgbClr val="FF6600"/>
+                      </a:solidFill>
+                    </a:rPr>
+                    <a:t>by generation</a:t>
+                  </a:r>
+                  <a:endParaRPr lang="en-GB" sz="1400" i="1" dirty="0">
                     <a:solidFill>
                       <a:srgbClr val="FF6600"/>
                     </a:solidFill>
-                  </a:rPr>
-                  <a:t>Traceability links automatically defined and maintained</a:t>
-                </a:r>
-                <a:endParaRPr lang="en-GB" sz="1400" i="1" dirty="0">
-                  <a:solidFill>
-                    <a:srgbClr val="FF6600"/>
-                  </a:solidFill>
-                </a:endParaRPr>
-              </a:p>
-            </p:txBody>
-          </p:sp>
+                  </a:endParaRPr>
+                </a:p>
+              </p:txBody>
+            </p:sp>
+          </p:grpSp>
         </p:grpSp>
+        <p:sp>
+          <p:nvSpPr>
+            <p:cNvPr id="137" name="Rectangle à coins arrondis 136"/>
+            <p:cNvSpPr/>
+            <p:nvPr/>
+          </p:nvSpPr>
+          <p:spPr>
+            <a:xfrm>
+              <a:off x="1015767" y="5972909"/>
+              <a:ext cx="953952" cy="416519"/>
+            </a:xfrm>
+            <a:prstGeom prst="roundRect">
+              <a:avLst/>
+            </a:prstGeom>
+            <a:solidFill>
+              <a:srgbClr val="660066">
+                <a:alpha val="60000"/>
+              </a:srgbClr>
+            </a:solidFill>
+            <a:ln>
+              <a:solidFill>
+                <a:srgbClr val="000000"/>
+              </a:solidFill>
+            </a:ln>
+          </p:spPr>
+          <p:style>
+            <a:lnRef idx="1">
+              <a:schemeClr val="accent1"/>
+            </a:lnRef>
+            <a:fillRef idx="3">
+              <a:schemeClr val="accent1"/>
+            </a:fillRef>
+            <a:effectRef idx="2">
+              <a:schemeClr val="accent1"/>
+            </a:effectRef>
+            <a:fontRef idx="minor">
+              <a:schemeClr val="lt1"/>
+            </a:fontRef>
+          </p:style>
+          <p:txBody>
+            <a:bodyPr rtlCol="0" anchor="ctr"/>
+            <a:lstStyle/>
+            <a:p>
+              <a:pPr algn="ctr"/>
+              <a:r>
+                <a:rPr lang="eu-ES" sz="1200" dirty="0" smtClean="0"/>
+                <a:t>OpenETCS API</a:t>
+              </a:r>
+              <a:endParaRPr lang="eu-ES" sz="1200" dirty="0"/>
+            </a:p>
+          </p:txBody>
+        </p:sp>
       </p:grpSp>
-      <p:sp>
-        <p:nvSpPr>
-          <p:cNvPr id="137" name="Rectangle à coins arrondis 136"/>
-          <p:cNvSpPr/>
-          <p:nvPr/>
-        </p:nvSpPr>
-        <p:spPr>
-          <a:xfrm>
-            <a:off x="1015767" y="5972909"/>
-            <a:ext cx="953952" cy="416519"/>
-          </a:xfrm>
-          <a:prstGeom prst="roundRect">
-            <a:avLst/>
-          </a:prstGeom>
-          <a:solidFill>
-            <a:srgbClr val="660066">
-              <a:alpha val="60000"/>
-            </a:srgbClr>
-          </a:solidFill>
-          <a:ln>
-            <a:solidFill>
-              <a:srgbClr val="000000"/>
-            </a:solidFill>
-          </a:ln>
-        </p:spPr>
-        <p:style>
-          <a:lnRef idx="1">
-            <a:schemeClr val="accent1"/>
-          </a:lnRef>
-          <a:fillRef idx="3">
-            <a:schemeClr val="accent1"/>
-          </a:fillRef>
-          <a:effectRef idx="2">
-            <a:schemeClr val="accent1"/>
-          </a:effectRef>
-          <a:fontRef idx="minor">
-            <a:schemeClr val="lt1"/>
-          </a:fontRef>
-        </p:style>
-        <p:txBody>
-          <a:bodyPr rtlCol="0" anchor="ctr"/>
-          <a:lstStyle/>
-          <a:p>
-            <a:pPr algn="ctr"/>
-            <a:r>
-              <a:rPr lang="eu-ES" sz="1200" dirty="0" smtClean="0"/>
-              <a:t>OpenETCS API</a:t>
-            </a:r>
-            <a:endParaRPr lang="eu-ES" sz="1200" dirty="0"/>
-          </a:p>
-        </p:txBody>
-      </p:sp>
     </p:spTree>
     <p:extLst>
       <p:ext uri="{BB962C8B-B14F-4D97-AF65-F5344CB8AC3E}">

</xml_diff>

<commit_message>
Presentation of second traceability solution
</commit_message>
<xml_diff>
--- a/T7.3/TraceabilityArchitecture/images/2015-10-25 openETCS traceability_Figures.pptx
+++ b/T7.3/TraceabilityArchitecture/images/2015-10-25 openETCS traceability_Figures.pptx
@@ -5,10 +5,10 @@
     <p:sldMasterId id="2147483648" r:id="rId1"/>
   </p:sldMasterIdLst>
   <p:notesMasterIdLst>
-    <p:notesMasterId r:id="rId14"/>
+    <p:notesMasterId r:id="rId15"/>
   </p:notesMasterIdLst>
   <p:handoutMasterIdLst>
-    <p:handoutMasterId r:id="rId15"/>
+    <p:handoutMasterId r:id="rId16"/>
   </p:handoutMasterIdLst>
   <p:sldIdLst>
     <p:sldId id="256" r:id="rId2"/>
@@ -18,11 +18,12 @@
     <p:sldId id="261" r:id="rId6"/>
     <p:sldId id="268" r:id="rId7"/>
     <p:sldId id="271" r:id="rId8"/>
-    <p:sldId id="265" r:id="rId9"/>
-    <p:sldId id="266" r:id="rId10"/>
-    <p:sldId id="272" r:id="rId11"/>
-    <p:sldId id="273" r:id="rId12"/>
-    <p:sldId id="274" r:id="rId13"/>
+    <p:sldId id="275" r:id="rId9"/>
+    <p:sldId id="265" r:id="rId10"/>
+    <p:sldId id="266" r:id="rId11"/>
+    <p:sldId id="272" r:id="rId12"/>
+    <p:sldId id="273" r:id="rId13"/>
+    <p:sldId id="274" r:id="rId14"/>
   </p:sldIdLst>
   <p:sldSz cx="9144000" cy="6858000" type="screen4x3"/>
   <p:notesSz cx="6858000" cy="9144000"/>
@@ -206,7 +207,7 @@
           <a:p>
             <a:fld id="{4A18087E-E36A-2A4D-8CB3-3CD1A9D98D8B}" type="datetimeFigureOut">
               <a:rPr lang="fr-FR" smtClean="0"/>
-              <a:t>27/10/2015</a:t>
+              <a:t>28/10/2015</a:t>
             </a:fld>
             <a:endParaRPr lang="fr-FR"/>
           </a:p>
@@ -372,7 +373,7 @@
           <a:p>
             <a:fld id="{D0A69204-F5D6-9145-8B06-239DED8355FC}" type="datetimeFigureOut">
               <a:rPr lang="fr-FR" smtClean="0"/>
-              <a:t>27/10/2015</a:t>
+              <a:t>28/10/2015</a:t>
             </a:fld>
             <a:endParaRPr lang="fr-FR"/>
           </a:p>
@@ -3846,6 +3847,173 @@
         </p:nvSpPr>
         <p:spPr/>
         <p:txBody>
+          <a:bodyPr>
+            <a:normAutofit fontScale="90000"/>
+          </a:bodyPr>
+          <a:lstStyle/>
+          <a:p>
+            <a:r>
+              <a:rPr lang="eu-ES" smtClean="0"/>
+              <a:t>WP3 priorities regarding traceability</a:t>
+            </a:r>
+            <a:endParaRPr lang="eu-ES"/>
+          </a:p>
+        </p:txBody>
+      </p:sp>
+      <p:sp>
+        <p:nvSpPr>
+          <p:cNvPr id="3" name="Espace réservé du contenu 2"/>
+          <p:cNvSpPr>
+            <a:spLocks noGrp="1"/>
+          </p:cNvSpPr>
+          <p:nvPr>
+            <p:ph idx="1"/>
+          </p:nvPr>
+        </p:nvSpPr>
+        <p:spPr>
+          <a:xfrm>
+            <a:off x="457200" y="1600200"/>
+            <a:ext cx="8535210" cy="4525963"/>
+          </a:xfrm>
+        </p:spPr>
+        <p:txBody>
+          <a:bodyPr/>
+          <a:lstStyle/>
+          <a:p>
+            <a:r>
+              <a:rPr lang="eu-ES" smtClean="0"/>
+              <a:t>Urgent: Scade model to SRS traceability</a:t>
+            </a:r>
+          </a:p>
+          <a:p>
+            <a:pPr lvl="1"/>
+            <a:r>
+              <a:rPr lang="eu-ES" smtClean="0"/>
+              <a:t>Either through ReqTify tool</a:t>
+            </a:r>
+          </a:p>
+          <a:p>
+            <a:pPr lvl="1"/>
+            <a:r>
+              <a:rPr lang="eu-ES" smtClean="0"/>
+              <a:t>Else (ideally) through open source solution</a:t>
+            </a:r>
+          </a:p>
+          <a:p>
+            <a:pPr lvl="1"/>
+            <a:endParaRPr lang="eu-ES" smtClean="0"/>
+          </a:p>
+          <a:p>
+            <a:r>
+              <a:rPr lang="eu-ES" smtClean="0"/>
+              <a:t>Nice to have: SysML model to SRS traeability</a:t>
+            </a:r>
+          </a:p>
+          <a:p>
+            <a:pPr lvl="1"/>
+            <a:r>
+              <a:rPr lang="eu-ES" smtClean="0"/>
+              <a:t>Either through ReqIF/ReqCycle</a:t>
+            </a:r>
+          </a:p>
+          <a:p>
+            <a:pPr lvl="1"/>
+            <a:r>
+              <a:rPr lang="eu-ES" smtClean="0"/>
+              <a:t>Else through other open source chain</a:t>
+            </a:r>
+            <a:endParaRPr lang="eu-ES"/>
+          </a:p>
+        </p:txBody>
+      </p:sp>
+      <p:sp>
+        <p:nvSpPr>
+          <p:cNvPr id="4" name="Espace réservé de la date 3"/>
+          <p:cNvSpPr>
+            <a:spLocks noGrp="1"/>
+          </p:cNvSpPr>
+          <p:nvPr>
+            <p:ph type="dt" sz="half" idx="10"/>
+          </p:nvPr>
+        </p:nvSpPr>
+        <p:spPr/>
+        <p:txBody>
+          <a:bodyPr/>
+          <a:lstStyle/>
+          <a:p>
+            <a:r>
+              <a:rPr lang="fr-FR" smtClean="0"/>
+              <a:t>28/09/2015</a:t>
+            </a:r>
+            <a:endParaRPr lang="fr-FR"/>
+          </a:p>
+        </p:txBody>
+      </p:sp>
+      <p:sp>
+        <p:nvSpPr>
+          <p:cNvPr id="5" name="Espace réservé du numéro de diapositive 4"/>
+          <p:cNvSpPr>
+            <a:spLocks noGrp="1"/>
+          </p:cNvSpPr>
+          <p:nvPr>
+            <p:ph type="sldNum" sz="quarter" idx="12"/>
+          </p:nvPr>
+        </p:nvSpPr>
+        <p:spPr/>
+        <p:txBody>
+          <a:bodyPr/>
+          <a:lstStyle/>
+          <a:p>
+            <a:fld id="{692C3D5F-CF0A-C342-86E8-AC8A51E170D1}" type="slidenum">
+              <a:rPr lang="fr-FR" smtClean="0"/>
+              <a:t>10</a:t>
+            </a:fld>
+            <a:endParaRPr lang="fr-FR"/>
+          </a:p>
+        </p:txBody>
+      </p:sp>
+    </p:spTree>
+    <p:extLst>
+      <p:ext uri="{BB962C8B-B14F-4D97-AF65-F5344CB8AC3E}">
+        <p14:creationId xmlns:p14="http://schemas.microsoft.com/office/powerpoint/2010/main" val="3777682253"/>
+      </p:ext>
+    </p:extLst>
+  </p:cSld>
+  <p:clrMapOvr>
+    <a:masterClrMapping/>
+  </p:clrMapOvr>
+</p:sld>
+</file>
+
+<file path=ppt/slides/slide11.xml><?xml version="1.0" encoding="utf-8"?>
+<p:sld xmlns:a="http://schemas.openxmlformats.org/drawingml/2006/main" xmlns:r="http://schemas.openxmlformats.org/officeDocument/2006/relationships" xmlns:p="http://schemas.openxmlformats.org/presentationml/2006/main">
+  <p:cSld>
+    <p:spTree>
+      <p:nvGrpSpPr>
+        <p:cNvPr id="1" name=""/>
+        <p:cNvGrpSpPr/>
+        <p:nvPr/>
+      </p:nvGrpSpPr>
+      <p:grpSpPr>
+        <a:xfrm>
+          <a:off x="0" y="0"/>
+          <a:ext cx="0" cy="0"/>
+          <a:chOff x="0" y="0"/>
+          <a:chExt cx="0" cy="0"/>
+        </a:xfrm>
+      </p:grpSpPr>
+      <p:sp>
+        <p:nvSpPr>
+          <p:cNvPr id="2" name="Titre 1"/>
+          <p:cNvSpPr>
+            <a:spLocks noGrp="1"/>
+          </p:cNvSpPr>
+          <p:nvPr>
+            <p:ph type="title"/>
+          </p:nvPr>
+        </p:nvSpPr>
+        <p:spPr/>
+        <p:txBody>
           <a:bodyPr/>
           <a:lstStyle/>
           <a:p>
@@ -3916,7 +4084,7 @@
           <a:p>
             <a:fld id="{692C3D5F-CF0A-C342-86E8-AC8A51E170D1}" type="slidenum">
               <a:rPr lang="fr-FR" smtClean="0"/>
-              <a:t>10</a:t>
+              <a:t>11</a:t>
             </a:fld>
             <a:endParaRPr lang="fr-FR"/>
           </a:p>
@@ -3935,7 +4103,7 @@
 </p:sld>
 </file>
 
-<file path=ppt/slides/slide11.xml><?xml version="1.0" encoding="utf-8"?>
+<file path=ppt/slides/slide12.xml><?xml version="1.0" encoding="utf-8"?>
 <p:sld xmlns:a="http://schemas.openxmlformats.org/drawingml/2006/main" xmlns:r="http://schemas.openxmlformats.org/officeDocument/2006/relationships" xmlns:p="http://schemas.openxmlformats.org/presentationml/2006/main">
   <p:cSld>
     <p:spTree>
@@ -8836,7 +9004,7 @@
 </p:sld>
 </file>
 
-<file path=ppt/slides/slide12.xml><?xml version="1.0" encoding="utf-8"?>
+<file path=ppt/slides/slide13.xml><?xml version="1.0" encoding="utf-8"?>
 <p:sld xmlns:a="http://schemas.openxmlformats.org/drawingml/2006/main" xmlns:r="http://schemas.openxmlformats.org/officeDocument/2006/relationships" xmlns:p="http://schemas.openxmlformats.org/presentationml/2006/main">
   <p:cSld>
     <p:spTree>
@@ -27227,7 +27395,6 @@
                             <a:rPr lang="eu-ES" sz="1600" dirty="0" smtClean="0"/>
                             <a:t>System architecture </a:t>
                           </a:r>
-                          <a:endParaRPr lang="eu-ES" sz="1600" dirty="0" smtClean="0"/>
                         </a:p>
                         <a:p>
                           <a:pPr algn="ctr"/>
@@ -27340,13 +27507,8 @@
                           <a:pPr algn="ctr"/>
                           <a:r>
                             <a:rPr lang="eu-ES" dirty="0" smtClean="0"/>
-                            <a:t>openETCS </a:t>
+                            <a:t>openETCS OBU functional</a:t>
                           </a:r>
-                          <a:r>
-                            <a:rPr lang="eu-ES" dirty="0" smtClean="0"/>
-                            <a:t>OBU functional</a:t>
-                          </a:r>
-                          <a:endParaRPr lang="eu-ES" dirty="0" smtClean="0"/>
                         </a:p>
                         <a:p>
                           <a:pPr algn="ctr"/>
@@ -27359,11 +27521,7 @@
                           <a:pPr algn="ctr"/>
                           <a:r>
                             <a:rPr lang="eu-ES" dirty="0" smtClean="0"/>
-                            <a:t>executable </a:t>
-                          </a:r>
-                          <a:r>
-                            <a:rPr lang="eu-ES" dirty="0" smtClean="0"/>
-                            <a:t>model</a:t>
+                            <a:t>executable model</a:t>
                           </a:r>
                           <a:endParaRPr lang="eu-ES" dirty="0"/>
                         </a:p>
@@ -27873,23 +28031,7 @@
                         <a:srgbClr val="FF6600"/>
                       </a:solidFill>
                     </a:rPr>
-                    <a:t>Traceability links automatically defined and </a:t>
-                  </a:r>
-                  <a:r>
-                    <a:rPr lang="en-GB" sz="1400" i="1" dirty="0" smtClean="0">
-                      <a:solidFill>
-                        <a:srgbClr val="FF6600"/>
-                      </a:solidFill>
-                    </a:rPr>
-                    <a:t>maintained </a:t>
-                  </a:r>
-                  <a:r>
-                    <a:rPr lang="en-GB" sz="1400" i="1" dirty="0" smtClean="0">
-                      <a:solidFill>
-                        <a:srgbClr val="FF6600"/>
-                      </a:solidFill>
-                    </a:rPr>
-                    <a:t>by generation</a:t>
+                    <a:t>Traceability links automatically defined and maintained by generation</a:t>
                   </a:r>
                   <a:endParaRPr lang="en-GB" sz="1400" i="1" dirty="0">
                     <a:solidFill>
@@ -27968,6 +28110,1274 @@
 </file>
 
 <file path=ppt/slides/slide8.xml><?xml version="1.0" encoding="utf-8"?>
+<p:sld xmlns:a="http://schemas.openxmlformats.org/drawingml/2006/main" xmlns:r="http://schemas.openxmlformats.org/officeDocument/2006/relationships" xmlns:p="http://schemas.openxmlformats.org/presentationml/2006/main">
+  <p:cSld>
+    <p:spTree>
+      <p:nvGrpSpPr>
+        <p:cNvPr id="1" name=""/>
+        <p:cNvGrpSpPr/>
+        <p:nvPr/>
+      </p:nvGrpSpPr>
+      <p:grpSpPr>
+        <a:xfrm>
+          <a:off x="0" y="0"/>
+          <a:ext cx="0" cy="0"/>
+          <a:chOff x="0" y="0"/>
+          <a:chExt cx="0" cy="0"/>
+        </a:xfrm>
+      </p:grpSpPr>
+      <p:sp>
+        <p:nvSpPr>
+          <p:cNvPr id="2" name="Titre 1"/>
+          <p:cNvSpPr>
+            <a:spLocks noGrp="1"/>
+          </p:cNvSpPr>
+          <p:nvPr>
+            <p:ph type="title"/>
+          </p:nvPr>
+        </p:nvSpPr>
+        <p:spPr>
+          <a:xfrm>
+            <a:off x="501533" y="274639"/>
+            <a:ext cx="8229600" cy="549180"/>
+          </a:xfrm>
+        </p:spPr>
+        <p:txBody>
+          <a:bodyPr>
+            <a:normAutofit fontScale="90000"/>
+          </a:bodyPr>
+          <a:lstStyle/>
+          <a:p>
+            <a:r>
+              <a:rPr lang="fr-FR" dirty="0" smtClean="0"/>
+              <a:t>2</a:t>
+            </a:r>
+            <a:r>
+              <a:rPr lang="fr-FR" baseline="30000" dirty="0" smtClean="0"/>
+              <a:t>nd</a:t>
+            </a:r>
+            <a:r>
+              <a:rPr lang="fr-FR" dirty="0" smtClean="0"/>
+              <a:t> solution</a:t>
+            </a:r>
+            <a:endParaRPr lang="fr-FR" dirty="0"/>
+          </a:p>
+        </p:txBody>
+      </p:sp>
+      <p:sp>
+        <p:nvSpPr>
+          <p:cNvPr id="4" name="Espace réservé de la date 3"/>
+          <p:cNvSpPr>
+            <a:spLocks noGrp="1"/>
+          </p:cNvSpPr>
+          <p:nvPr>
+            <p:ph type="dt" sz="half" idx="10"/>
+          </p:nvPr>
+        </p:nvSpPr>
+        <p:spPr/>
+        <p:txBody>
+          <a:bodyPr/>
+          <a:lstStyle/>
+          <a:p>
+            <a:r>
+              <a:rPr lang="fr-FR" smtClean="0"/>
+              <a:t>28/09/2015</a:t>
+            </a:r>
+            <a:endParaRPr lang="fr-FR"/>
+          </a:p>
+        </p:txBody>
+      </p:sp>
+      <p:sp>
+        <p:nvSpPr>
+          <p:cNvPr id="5" name="Espace réservé du numéro de diapositive 4"/>
+          <p:cNvSpPr>
+            <a:spLocks noGrp="1"/>
+          </p:cNvSpPr>
+          <p:nvPr>
+            <p:ph type="sldNum" sz="quarter" idx="12"/>
+          </p:nvPr>
+        </p:nvSpPr>
+        <p:spPr/>
+        <p:txBody>
+          <a:bodyPr/>
+          <a:lstStyle/>
+          <a:p>
+            <a:fld id="{692C3D5F-CF0A-C342-86E8-AC8A51E170D1}" type="slidenum">
+              <a:rPr lang="fr-FR" smtClean="0"/>
+              <a:t>8</a:t>
+            </a:fld>
+            <a:endParaRPr lang="fr-FR"/>
+          </a:p>
+        </p:txBody>
+      </p:sp>
+      <p:grpSp>
+        <p:nvGrpSpPr>
+          <p:cNvPr id="69" name="Grouper 68"/>
+          <p:cNvGrpSpPr/>
+          <p:nvPr/>
+        </p:nvGrpSpPr>
+        <p:grpSpPr>
+          <a:xfrm>
+            <a:off x="953813" y="1044318"/>
+            <a:ext cx="7777320" cy="5113263"/>
+            <a:chOff x="953813" y="1044318"/>
+            <a:chExt cx="7777320" cy="5113263"/>
+          </a:xfrm>
+        </p:grpSpPr>
+        <p:grpSp>
+          <p:nvGrpSpPr>
+            <p:cNvPr id="68" name="Grouper 67"/>
+            <p:cNvGrpSpPr/>
+            <p:nvPr/>
+          </p:nvGrpSpPr>
+          <p:grpSpPr>
+            <a:xfrm>
+              <a:off x="953813" y="1044318"/>
+              <a:ext cx="7698665" cy="5113263"/>
+              <a:chOff x="953813" y="1044318"/>
+              <a:chExt cx="7698665" cy="5113263"/>
+            </a:xfrm>
+          </p:grpSpPr>
+          <p:sp>
+            <p:nvSpPr>
+              <p:cNvPr id="53" name="Ellipse 52"/>
+              <p:cNvSpPr/>
+              <p:nvPr/>
+            </p:nvSpPr>
+            <p:spPr>
+              <a:xfrm>
+                <a:off x="1565892" y="5474721"/>
+                <a:ext cx="2299586" cy="682860"/>
+              </a:xfrm>
+              <a:prstGeom prst="ellipse">
+                <a:avLst/>
+              </a:prstGeom>
+              <a:solidFill>
+                <a:srgbClr val="CCC1DA"/>
+              </a:solidFill>
+              <a:ln>
+                <a:solidFill>
+                  <a:srgbClr val="000000"/>
+                </a:solidFill>
+              </a:ln>
+            </p:spPr>
+            <p:style>
+              <a:lnRef idx="1">
+                <a:schemeClr val="accent1"/>
+              </a:lnRef>
+              <a:fillRef idx="3">
+                <a:schemeClr val="accent1"/>
+              </a:fillRef>
+              <a:effectRef idx="2">
+                <a:schemeClr val="accent1"/>
+              </a:effectRef>
+              <a:fontRef idx="minor">
+                <a:schemeClr val="lt1"/>
+              </a:fontRef>
+            </p:style>
+            <p:txBody>
+              <a:bodyPr rtlCol="0" anchor="ctr"/>
+              <a:lstStyle/>
+              <a:p>
+                <a:pPr algn="ctr"/>
+                <a:r>
+                  <a:rPr lang="fr-FR" dirty="0" smtClean="0">
+                    <a:solidFill>
+                      <a:srgbClr val="000000"/>
+                    </a:solidFill>
+                  </a:rPr>
+                  <a:t>RT-tester</a:t>
+                </a:r>
+                <a:endParaRPr lang="fr-FR" dirty="0">
+                  <a:solidFill>
+                    <a:srgbClr val="000000"/>
+                  </a:solidFill>
+                </a:endParaRPr>
+              </a:p>
+            </p:txBody>
+          </p:sp>
+          <p:grpSp>
+            <p:nvGrpSpPr>
+              <p:cNvPr id="67" name="Grouper 66"/>
+              <p:cNvGrpSpPr/>
+              <p:nvPr/>
+            </p:nvGrpSpPr>
+            <p:grpSpPr>
+              <a:xfrm>
+                <a:off x="953813" y="1044318"/>
+                <a:ext cx="7698665" cy="4430403"/>
+                <a:chOff x="953813" y="1044318"/>
+                <a:chExt cx="7698665" cy="4430403"/>
+              </a:xfrm>
+            </p:grpSpPr>
+            <p:cxnSp>
+              <p:nvCxnSpPr>
+                <p:cNvPr id="9" name="Connecteur droit avec flèche 8"/>
+                <p:cNvCxnSpPr>
+                  <a:stCxn id="6" idx="2"/>
+                  <a:endCxn id="21" idx="0"/>
+                </p:cNvCxnSpPr>
+                <p:nvPr/>
+              </p:nvCxnSpPr>
+              <p:spPr>
+                <a:xfrm>
+                  <a:off x="3283059" y="1945126"/>
+                  <a:ext cx="1333274" cy="875546"/>
+                </a:xfrm>
+                <a:prstGeom prst="straightConnector1">
+                  <a:avLst/>
+                </a:prstGeom>
+                <a:ln>
+                  <a:solidFill>
+                    <a:srgbClr val="000000"/>
+                  </a:solidFill>
+                  <a:tailEnd type="stealth" w="lg" len="lg"/>
+                </a:ln>
+              </p:spPr>
+              <p:style>
+                <a:lnRef idx="2">
+                  <a:schemeClr val="accent1"/>
+                </a:lnRef>
+                <a:fillRef idx="0">
+                  <a:schemeClr val="accent1"/>
+                </a:fillRef>
+                <a:effectRef idx="1">
+                  <a:schemeClr val="accent1"/>
+                </a:effectRef>
+                <a:fontRef idx="minor">
+                  <a:schemeClr val="tx1"/>
+                </a:fontRef>
+              </p:style>
+            </p:cxnSp>
+            <p:sp>
+              <p:nvSpPr>
+                <p:cNvPr id="11" name="ZoneTexte 10"/>
+                <p:cNvSpPr txBox="1"/>
+                <p:nvPr/>
+              </p:nvSpPr>
+              <p:spPr>
+                <a:xfrm>
+                  <a:off x="4087983" y="2115159"/>
+                  <a:ext cx="1189035" cy="369332"/>
+                </a:xfrm>
+                <a:prstGeom prst="rect">
+                  <a:avLst/>
+                </a:prstGeom>
+                <a:noFill/>
+              </p:spPr>
+              <p:txBody>
+                <a:bodyPr wrap="none" rtlCol="0">
+                  <a:spAutoFit/>
+                </a:bodyPr>
+                <a:lstStyle/>
+                <a:p>
+                  <a:r>
+                    <a:rPr lang="fr-FR" dirty="0" smtClean="0"/>
+                    <a:t>1.A Import</a:t>
+                  </a:r>
+                  <a:endParaRPr lang="fr-FR" dirty="0"/>
+                </a:p>
+              </p:txBody>
+            </p:sp>
+            <p:grpSp>
+              <p:nvGrpSpPr>
+                <p:cNvPr id="45" name="Grouper 44"/>
+                <p:cNvGrpSpPr/>
+                <p:nvPr/>
+              </p:nvGrpSpPr>
+              <p:grpSpPr>
+                <a:xfrm>
+                  <a:off x="2521821" y="1107126"/>
+                  <a:ext cx="1373317" cy="838000"/>
+                  <a:chOff x="3855095" y="1107126"/>
+                  <a:chExt cx="1373317" cy="838000"/>
+                </a:xfrm>
+              </p:grpSpPr>
+              <p:sp>
+                <p:nvSpPr>
+                  <p:cNvPr id="6" name="Rectangle 5"/>
+                  <p:cNvSpPr/>
+                  <p:nvPr/>
+                </p:nvSpPr>
+                <p:spPr>
+                  <a:xfrm>
+                    <a:off x="4004254" y="1304379"/>
+                    <a:ext cx="1224158" cy="640747"/>
+                  </a:xfrm>
+                  <a:prstGeom prst="rect">
+                    <a:avLst/>
+                  </a:prstGeom>
+                  <a:solidFill>
+                    <a:schemeClr val="accent1">
+                      <a:lumMod val="20000"/>
+                      <a:lumOff val="80000"/>
+                    </a:schemeClr>
+                  </a:solidFill>
+                  <a:ln>
+                    <a:solidFill>
+                      <a:schemeClr val="tx1"/>
+                    </a:solidFill>
+                  </a:ln>
+                </p:spPr>
+                <p:style>
+                  <a:lnRef idx="1">
+                    <a:schemeClr val="accent1"/>
+                  </a:lnRef>
+                  <a:fillRef idx="3">
+                    <a:schemeClr val="accent1"/>
+                  </a:fillRef>
+                  <a:effectRef idx="2">
+                    <a:schemeClr val="accent1"/>
+                  </a:effectRef>
+                  <a:fontRef idx="minor">
+                    <a:schemeClr val="lt1"/>
+                  </a:fontRef>
+                </p:style>
+                <p:txBody>
+                  <a:bodyPr rtlCol="0" anchor="ctr"/>
+                  <a:lstStyle/>
+                  <a:p>
+                    <a:pPr algn="ctr"/>
+                    <a:r>
+                      <a:rPr lang="fr-FR" dirty="0" err="1" smtClean="0">
+                        <a:solidFill>
+                          <a:schemeClr val="tx1"/>
+                        </a:solidFill>
+                      </a:rPr>
+                      <a:t>Subset</a:t>
+                    </a:r>
+                    <a:r>
+                      <a:rPr lang="fr-FR" dirty="0" smtClean="0">
+                        <a:solidFill>
+                          <a:schemeClr val="tx1"/>
+                        </a:solidFill>
+                      </a:rPr>
+                      <a:t> 026</a:t>
+                    </a:r>
+                    <a:endParaRPr lang="fr-FR" dirty="0">
+                      <a:solidFill>
+                        <a:schemeClr val="tx1"/>
+                      </a:solidFill>
+                    </a:endParaRPr>
+                  </a:p>
+                </p:txBody>
+              </p:sp>
+              <p:pic>
+                <p:nvPicPr>
+                  <p:cNvPr id="12" name="Image 11"/>
+                  <p:cNvPicPr>
+                    <a:picLocks noChangeAspect="1"/>
+                  </p:cNvPicPr>
+                  <p:nvPr/>
+                </p:nvPicPr>
+                <p:blipFill>
+                  <a:blip r:embed="rId2"/>
+                  <a:stretch>
+                    <a:fillRect/>
+                  </a:stretch>
+                </p:blipFill>
+                <p:spPr>
+                  <a:xfrm>
+                    <a:off x="3855095" y="1107126"/>
+                    <a:ext cx="394505" cy="394505"/>
+                  </a:xfrm>
+                  <a:prstGeom prst="rect">
+                    <a:avLst/>
+                  </a:prstGeom>
+                </p:spPr>
+              </p:pic>
+            </p:grpSp>
+            <p:sp>
+              <p:nvSpPr>
+                <p:cNvPr id="21" name="Ellipse 20"/>
+                <p:cNvSpPr/>
+                <p:nvPr/>
+              </p:nvSpPr>
+              <p:spPr>
+                <a:xfrm>
+                  <a:off x="3466540" y="2820672"/>
+                  <a:ext cx="2299586" cy="682860"/>
+                </a:xfrm>
+                <a:prstGeom prst="ellipse">
+                  <a:avLst/>
+                </a:prstGeom>
+                <a:solidFill>
+                  <a:srgbClr val="CCC1DA"/>
+                </a:solidFill>
+                <a:ln>
+                  <a:solidFill>
+                    <a:srgbClr val="000000"/>
+                  </a:solidFill>
+                </a:ln>
+              </p:spPr>
+              <p:style>
+                <a:lnRef idx="1">
+                  <a:schemeClr val="accent1"/>
+                </a:lnRef>
+                <a:fillRef idx="3">
+                  <a:schemeClr val="accent1"/>
+                </a:fillRef>
+                <a:effectRef idx="2">
+                  <a:schemeClr val="accent1"/>
+                </a:effectRef>
+                <a:fontRef idx="minor">
+                  <a:schemeClr val="lt1"/>
+                </a:fontRef>
+              </p:style>
+              <p:txBody>
+                <a:bodyPr rtlCol="0" anchor="ctr"/>
+                <a:lstStyle/>
+                <a:p>
+                  <a:pPr algn="ctr"/>
+                  <a:r>
+                    <a:rPr lang="fr-FR" dirty="0" smtClean="0">
+                      <a:solidFill>
+                        <a:srgbClr val="000000"/>
+                      </a:solidFill>
+                    </a:rPr>
+                    <a:t>ReqCycle</a:t>
+                  </a:r>
+                  <a:endParaRPr lang="fr-FR" dirty="0">
+                    <a:solidFill>
+                      <a:srgbClr val="000000"/>
+                    </a:solidFill>
+                  </a:endParaRPr>
+                </a:p>
+              </p:txBody>
+            </p:sp>
+            <p:sp>
+              <p:nvSpPr>
+                <p:cNvPr id="26" name="Ellipse 25"/>
+                <p:cNvSpPr/>
+                <p:nvPr/>
+              </p:nvSpPr>
+              <p:spPr>
+                <a:xfrm>
+                  <a:off x="5228412" y="4269664"/>
+                  <a:ext cx="2299586" cy="682860"/>
+                </a:xfrm>
+                <a:prstGeom prst="ellipse">
+                  <a:avLst/>
+                </a:prstGeom>
+                <a:solidFill>
+                  <a:srgbClr val="CCC1DA"/>
+                </a:solidFill>
+                <a:ln>
+                  <a:solidFill>
+                    <a:srgbClr val="000000"/>
+                  </a:solidFill>
+                </a:ln>
+              </p:spPr>
+              <p:style>
+                <a:lnRef idx="1">
+                  <a:schemeClr val="accent1"/>
+                </a:lnRef>
+                <a:fillRef idx="3">
+                  <a:schemeClr val="accent1"/>
+                </a:fillRef>
+                <a:effectRef idx="2">
+                  <a:schemeClr val="accent1"/>
+                </a:effectRef>
+                <a:fontRef idx="minor">
+                  <a:schemeClr val="lt1"/>
+                </a:fontRef>
+              </p:style>
+              <p:txBody>
+                <a:bodyPr rtlCol="0" anchor="ctr"/>
+                <a:lstStyle/>
+                <a:p>
+                  <a:pPr algn="ctr"/>
+                  <a:r>
+                    <a:rPr lang="fr-FR" dirty="0" smtClean="0">
+                      <a:solidFill>
+                        <a:srgbClr val="000000"/>
+                      </a:solidFill>
+                    </a:rPr>
+                    <a:t>SCADE</a:t>
+                  </a:r>
+                  <a:endParaRPr lang="fr-FR" dirty="0">
+                    <a:solidFill>
+                      <a:srgbClr val="000000"/>
+                    </a:solidFill>
+                  </a:endParaRPr>
+                </a:p>
+              </p:txBody>
+            </p:sp>
+            <p:sp>
+              <p:nvSpPr>
+                <p:cNvPr id="27" name="Ellipse 26"/>
+                <p:cNvSpPr/>
+                <p:nvPr/>
+              </p:nvSpPr>
+              <p:spPr>
+                <a:xfrm>
+                  <a:off x="1555509" y="4269664"/>
+                  <a:ext cx="2299586" cy="682860"/>
+                </a:xfrm>
+                <a:prstGeom prst="ellipse">
+                  <a:avLst/>
+                </a:prstGeom>
+                <a:solidFill>
+                  <a:srgbClr val="CCC1DA"/>
+                </a:solidFill>
+                <a:ln>
+                  <a:solidFill>
+                    <a:srgbClr val="000000"/>
+                  </a:solidFill>
+                </a:ln>
+              </p:spPr>
+              <p:style>
+                <a:lnRef idx="1">
+                  <a:schemeClr val="accent1"/>
+                </a:lnRef>
+                <a:fillRef idx="3">
+                  <a:schemeClr val="accent1"/>
+                </a:fillRef>
+                <a:effectRef idx="2">
+                  <a:schemeClr val="accent1"/>
+                </a:effectRef>
+                <a:fontRef idx="minor">
+                  <a:schemeClr val="lt1"/>
+                </a:fontRef>
+              </p:style>
+              <p:txBody>
+                <a:bodyPr rtlCol="0" anchor="ctr"/>
+                <a:lstStyle/>
+                <a:p>
+                  <a:pPr algn="ctr"/>
+                  <a:r>
+                    <a:rPr lang="fr-FR" dirty="0" smtClean="0">
+                      <a:solidFill>
+                        <a:srgbClr val="000000"/>
+                      </a:solidFill>
+                    </a:rPr>
+                    <a:t>Papyrus</a:t>
+                  </a:r>
+                  <a:endParaRPr lang="fr-FR" dirty="0">
+                    <a:solidFill>
+                      <a:srgbClr val="000000"/>
+                    </a:solidFill>
+                  </a:endParaRPr>
+                </a:p>
+              </p:txBody>
+            </p:sp>
+            <p:cxnSp>
+              <p:nvCxnSpPr>
+                <p:cNvPr id="29" name="Connecteur droit avec flèche 28"/>
+                <p:cNvCxnSpPr>
+                  <a:endCxn id="27" idx="7"/>
+                </p:cNvCxnSpPr>
+                <p:nvPr/>
+              </p:nvCxnSpPr>
+              <p:spPr>
+                <a:xfrm flipH="1">
+                  <a:off x="3518328" y="3503532"/>
+                  <a:ext cx="863470" cy="866135"/>
+                </a:xfrm>
+                <a:prstGeom prst="straightConnector1">
+                  <a:avLst/>
+                </a:prstGeom>
+                <a:ln>
+                  <a:solidFill>
+                    <a:srgbClr val="008000"/>
+                  </a:solidFill>
+                  <a:headEnd type="stealth" w="lg" len="lg"/>
+                  <a:tailEnd type="stealth" w="lg" len="lg"/>
+                </a:ln>
+              </p:spPr>
+              <p:style>
+                <a:lnRef idx="2">
+                  <a:schemeClr val="accent1"/>
+                </a:lnRef>
+                <a:fillRef idx="0">
+                  <a:schemeClr val="accent1"/>
+                </a:fillRef>
+                <a:effectRef idx="1">
+                  <a:schemeClr val="accent1"/>
+                </a:effectRef>
+                <a:fontRef idx="minor">
+                  <a:schemeClr val="tx1"/>
+                </a:fontRef>
+              </p:style>
+            </p:cxnSp>
+            <p:cxnSp>
+              <p:nvCxnSpPr>
+                <p:cNvPr id="31" name="Connecteur droit avec flèche 30"/>
+                <p:cNvCxnSpPr>
+                  <a:stCxn id="26" idx="0"/>
+                  <a:endCxn id="21" idx="5"/>
+                </p:cNvCxnSpPr>
+                <p:nvPr/>
+              </p:nvCxnSpPr>
+              <p:spPr>
+                <a:xfrm flipH="1" flipV="1">
+                  <a:off x="5429359" y="3403529"/>
+                  <a:ext cx="948846" cy="866135"/>
+                </a:xfrm>
+                <a:prstGeom prst="straightConnector1">
+                  <a:avLst/>
+                </a:prstGeom>
+                <a:ln>
+                  <a:solidFill>
+                    <a:srgbClr val="008000"/>
+                  </a:solidFill>
+                  <a:headEnd type="stealth" w="lg" len="lg"/>
+                  <a:tailEnd type="stealth" w="lg" len="lg"/>
+                </a:ln>
+              </p:spPr>
+              <p:style>
+                <a:lnRef idx="2">
+                  <a:schemeClr val="accent1"/>
+                </a:lnRef>
+                <a:fillRef idx="0">
+                  <a:schemeClr val="accent1"/>
+                </a:fillRef>
+                <a:effectRef idx="1">
+                  <a:schemeClr val="accent1"/>
+                </a:effectRef>
+                <a:fontRef idx="minor">
+                  <a:schemeClr val="tx1"/>
+                </a:fontRef>
+              </p:style>
+            </p:cxnSp>
+            <p:sp>
+              <p:nvSpPr>
+                <p:cNvPr id="34" name="ZoneTexte 33"/>
+                <p:cNvSpPr txBox="1"/>
+                <p:nvPr/>
+              </p:nvSpPr>
+              <p:spPr>
+                <a:xfrm>
+                  <a:off x="3384765" y="3653627"/>
+                  <a:ext cx="560896" cy="369332"/>
+                </a:xfrm>
+                <a:prstGeom prst="rect">
+                  <a:avLst/>
+                </a:prstGeom>
+                <a:noFill/>
+              </p:spPr>
+              <p:txBody>
+                <a:bodyPr wrap="none" rtlCol="0">
+                  <a:spAutoFit/>
+                </a:bodyPr>
+                <a:lstStyle/>
+                <a:p>
+                  <a:r>
+                    <a:rPr lang="fr-FR" dirty="0" smtClean="0"/>
+                    <a:t>Link</a:t>
+                  </a:r>
+                  <a:endParaRPr lang="fr-FR" dirty="0"/>
+                </a:p>
+              </p:txBody>
+            </p:sp>
+            <p:sp>
+              <p:nvSpPr>
+                <p:cNvPr id="35" name="ZoneTexte 34"/>
+                <p:cNvSpPr txBox="1"/>
+                <p:nvPr/>
+              </p:nvSpPr>
+              <p:spPr>
+                <a:xfrm>
+                  <a:off x="5940821" y="3503532"/>
+                  <a:ext cx="560896" cy="369332"/>
+                </a:xfrm>
+                <a:prstGeom prst="rect">
+                  <a:avLst/>
+                </a:prstGeom>
+                <a:noFill/>
+              </p:spPr>
+              <p:txBody>
+                <a:bodyPr wrap="none" rtlCol="0">
+                  <a:spAutoFit/>
+                </a:bodyPr>
+                <a:lstStyle/>
+                <a:p>
+                  <a:r>
+                    <a:rPr lang="fr-FR" dirty="0" smtClean="0"/>
+                    <a:t>Link</a:t>
+                  </a:r>
+                  <a:endParaRPr lang="fr-FR" dirty="0"/>
+                </a:p>
+              </p:txBody>
+            </p:sp>
+            <p:sp>
+              <p:nvSpPr>
+                <p:cNvPr id="37" name="Rectangle 36"/>
+                <p:cNvSpPr/>
+                <p:nvPr/>
+              </p:nvSpPr>
+              <p:spPr>
+                <a:xfrm>
+                  <a:off x="6802465" y="2834419"/>
+                  <a:ext cx="1850013" cy="640747"/>
+                </a:xfrm>
+                <a:prstGeom prst="rect">
+                  <a:avLst/>
+                </a:prstGeom>
+                <a:solidFill>
+                  <a:srgbClr val="CCC1DA"/>
+                </a:solidFill>
+                <a:ln>
+                  <a:solidFill>
+                    <a:schemeClr val="tx1"/>
+                  </a:solidFill>
+                </a:ln>
+              </p:spPr>
+              <p:style>
+                <a:lnRef idx="1">
+                  <a:schemeClr val="accent1"/>
+                </a:lnRef>
+                <a:fillRef idx="3">
+                  <a:schemeClr val="accent1"/>
+                </a:fillRef>
+                <a:effectRef idx="2">
+                  <a:schemeClr val="accent1"/>
+                </a:effectRef>
+                <a:fontRef idx="minor">
+                  <a:schemeClr val="lt1"/>
+                </a:fontRef>
+              </p:style>
+              <p:txBody>
+                <a:bodyPr rtlCol="0" anchor="ctr"/>
+                <a:lstStyle/>
+                <a:p>
+                  <a:pPr algn="ctr"/>
+                  <a:r>
+                    <a:rPr lang="fr-FR" dirty="0" smtClean="0">
+                      <a:solidFill>
+                        <a:schemeClr val="tx1"/>
+                      </a:solidFill>
+                    </a:rPr>
+                    <a:t>Requirement Data Base</a:t>
+                  </a:r>
+                  <a:endParaRPr lang="fr-FR" dirty="0">
+                    <a:solidFill>
+                      <a:schemeClr val="tx1"/>
+                    </a:solidFill>
+                  </a:endParaRPr>
+                </a:p>
+              </p:txBody>
+            </p:sp>
+            <p:cxnSp>
+              <p:nvCxnSpPr>
+                <p:cNvPr id="38" name="Connecteur droit avec flèche 37"/>
+                <p:cNvCxnSpPr>
+                  <a:stCxn id="21" idx="6"/>
+                  <a:endCxn id="37" idx="1"/>
+                </p:cNvCxnSpPr>
+                <p:nvPr/>
+              </p:nvCxnSpPr>
+              <p:spPr>
+                <a:xfrm flipV="1">
+                  <a:off x="5766126" y="3154793"/>
+                  <a:ext cx="1036339" cy="7309"/>
+                </a:xfrm>
+                <a:prstGeom prst="straightConnector1">
+                  <a:avLst/>
+                </a:prstGeom>
+                <a:ln>
+                  <a:solidFill>
+                    <a:srgbClr val="000000"/>
+                  </a:solidFill>
+                  <a:tailEnd type="stealth" w="lg" len="lg"/>
+                </a:ln>
+              </p:spPr>
+              <p:style>
+                <a:lnRef idx="2">
+                  <a:schemeClr val="accent1"/>
+                </a:lnRef>
+                <a:fillRef idx="0">
+                  <a:schemeClr val="accent1"/>
+                </a:fillRef>
+                <a:effectRef idx="1">
+                  <a:schemeClr val="accent1"/>
+                </a:effectRef>
+                <a:fontRef idx="minor">
+                  <a:schemeClr val="tx1"/>
+                </a:fontRef>
+              </p:style>
+            </p:cxnSp>
+            <p:sp>
+              <p:nvSpPr>
+                <p:cNvPr id="43" name="ZoneTexte 42"/>
+                <p:cNvSpPr txBox="1"/>
+                <p:nvPr/>
+              </p:nvSpPr>
+              <p:spPr>
+                <a:xfrm>
+                  <a:off x="5846463" y="2785461"/>
+                  <a:ext cx="947946" cy="369332"/>
+                </a:xfrm>
+                <a:prstGeom prst="rect">
+                  <a:avLst/>
+                </a:prstGeom>
+                <a:noFill/>
+              </p:spPr>
+              <p:txBody>
+                <a:bodyPr wrap="none" rtlCol="0">
+                  <a:spAutoFit/>
+                </a:bodyPr>
+                <a:lstStyle/>
+                <a:p>
+                  <a:r>
+                    <a:rPr lang="fr-FR" dirty="0" smtClean="0"/>
+                    <a:t>Manage</a:t>
+                  </a:r>
+                  <a:endParaRPr lang="fr-FR" dirty="0"/>
+                </a:p>
+              </p:txBody>
+            </p:sp>
+            <p:sp>
+              <p:nvSpPr>
+                <p:cNvPr id="44" name="Rectangle 43"/>
+                <p:cNvSpPr/>
+                <p:nvPr/>
+              </p:nvSpPr>
+              <p:spPr>
+                <a:xfrm>
+                  <a:off x="5429358" y="1304379"/>
+                  <a:ext cx="2098639" cy="640747"/>
+                </a:xfrm>
+                <a:prstGeom prst="rect">
+                  <a:avLst/>
+                </a:prstGeom>
+                <a:solidFill>
+                  <a:schemeClr val="accent1">
+                    <a:lumMod val="20000"/>
+                    <a:lumOff val="80000"/>
+                  </a:schemeClr>
+                </a:solidFill>
+                <a:ln>
+                  <a:solidFill>
+                    <a:schemeClr val="tx1"/>
+                  </a:solidFill>
+                </a:ln>
+              </p:spPr>
+              <p:style>
+                <a:lnRef idx="1">
+                  <a:schemeClr val="accent1"/>
+                </a:lnRef>
+                <a:fillRef idx="3">
+                  <a:schemeClr val="accent1"/>
+                </a:fillRef>
+                <a:effectRef idx="2">
+                  <a:schemeClr val="accent1"/>
+                </a:effectRef>
+                <a:fontRef idx="minor">
+                  <a:schemeClr val="lt1"/>
+                </a:fontRef>
+              </p:style>
+              <p:txBody>
+                <a:bodyPr rtlCol="0" anchor="ctr"/>
+                <a:lstStyle/>
+                <a:p>
+                  <a:pPr algn="ctr"/>
+                  <a:r>
+                    <a:rPr lang="fr-FR" dirty="0" err="1" smtClean="0">
+                      <a:solidFill>
+                        <a:schemeClr val="tx1"/>
+                      </a:solidFill>
+                    </a:rPr>
+                    <a:t>Subset</a:t>
+                  </a:r>
+                  <a:r>
+                    <a:rPr lang="fr-FR" dirty="0" smtClean="0">
+                      <a:solidFill>
+                        <a:schemeClr val="tx1"/>
+                      </a:solidFill>
+                    </a:rPr>
+                    <a:t> 026 </a:t>
+                  </a:r>
+                  <a:r>
+                    <a:rPr lang="fr-FR" dirty="0" err="1" smtClean="0">
+                      <a:solidFill>
+                        <a:schemeClr val="tx1"/>
+                      </a:solidFill>
+                    </a:rPr>
+                    <a:t>requirements</a:t>
+                  </a:r>
+                  <a:endParaRPr lang="fr-FR" dirty="0">
+                    <a:solidFill>
+                      <a:schemeClr val="tx1"/>
+                    </a:solidFill>
+                  </a:endParaRPr>
+                </a:p>
+              </p:txBody>
+            </p:sp>
+            <p:pic>
+              <p:nvPicPr>
+                <p:cNvPr id="18" name="Image 17"/>
+                <p:cNvPicPr>
+                  <a:picLocks noChangeAspect="1"/>
+                </p:cNvPicPr>
+                <p:nvPr/>
+              </p:nvPicPr>
+              <p:blipFill>
+                <a:blip r:embed="rId3"/>
+                <a:stretch>
+                  <a:fillRect/>
+                </a:stretch>
+              </p:blipFill>
+              <p:spPr>
+                <a:xfrm>
+                  <a:off x="7108238" y="1044318"/>
+                  <a:ext cx="1106203" cy="455718"/>
+                </a:xfrm>
+                <a:prstGeom prst="rect">
+                  <a:avLst/>
+                </a:prstGeom>
+              </p:spPr>
+            </p:pic>
+            <p:cxnSp>
+              <p:nvCxnSpPr>
+                <p:cNvPr id="46" name="Connecteur droit avec flèche 45"/>
+                <p:cNvCxnSpPr>
+                  <a:endCxn id="44" idx="1"/>
+                </p:cNvCxnSpPr>
+                <p:nvPr/>
+              </p:nvCxnSpPr>
+              <p:spPr>
+                <a:xfrm>
+                  <a:off x="3895138" y="1608945"/>
+                  <a:ext cx="1534220" cy="15808"/>
+                </a:xfrm>
+                <a:prstGeom prst="straightConnector1">
+                  <a:avLst/>
+                </a:prstGeom>
+                <a:ln>
+                  <a:solidFill>
+                    <a:srgbClr val="000000"/>
+                  </a:solidFill>
+                  <a:tailEnd type="stealth" w="lg" len="lg"/>
+                </a:ln>
+              </p:spPr>
+              <p:style>
+                <a:lnRef idx="2">
+                  <a:schemeClr val="accent1"/>
+                </a:lnRef>
+                <a:fillRef idx="0">
+                  <a:schemeClr val="accent1"/>
+                </a:fillRef>
+                <a:effectRef idx="1">
+                  <a:schemeClr val="accent1"/>
+                </a:effectRef>
+                <a:fontRef idx="minor">
+                  <a:schemeClr val="tx1"/>
+                </a:fontRef>
+              </p:style>
+            </p:cxnSp>
+            <p:sp>
+              <p:nvSpPr>
+                <p:cNvPr id="48" name="ZoneTexte 47"/>
+                <p:cNvSpPr txBox="1"/>
+                <p:nvPr/>
+              </p:nvSpPr>
+              <p:spPr>
+                <a:xfrm>
+                  <a:off x="4128641" y="1239613"/>
+                  <a:ext cx="1300356" cy="369332"/>
+                </a:xfrm>
+                <a:prstGeom prst="rect">
+                  <a:avLst/>
+                </a:prstGeom>
+                <a:noFill/>
+              </p:spPr>
+              <p:txBody>
+                <a:bodyPr wrap="none" rtlCol="0">
+                  <a:spAutoFit/>
+                </a:bodyPr>
+                <a:lstStyle/>
+                <a:p>
+                  <a:r>
+                    <a:rPr lang="fr-FR" dirty="0" smtClean="0"/>
+                    <a:t>1.B1 Import</a:t>
+                  </a:r>
+                  <a:endParaRPr lang="fr-FR" dirty="0"/>
+                </a:p>
+              </p:txBody>
+            </p:sp>
+            <p:cxnSp>
+              <p:nvCxnSpPr>
+                <p:cNvPr id="49" name="Connecteur droit avec flèche 48"/>
+                <p:cNvCxnSpPr>
+                  <a:stCxn id="44" idx="2"/>
+                  <a:endCxn id="21" idx="7"/>
+                </p:cNvCxnSpPr>
+                <p:nvPr/>
+              </p:nvCxnSpPr>
+              <p:spPr>
+                <a:xfrm flipH="1">
+                  <a:off x="5429359" y="1945126"/>
+                  <a:ext cx="1049319" cy="975549"/>
+                </a:xfrm>
+                <a:prstGeom prst="straightConnector1">
+                  <a:avLst/>
+                </a:prstGeom>
+                <a:ln>
+                  <a:solidFill>
+                    <a:srgbClr val="000000"/>
+                  </a:solidFill>
+                  <a:tailEnd type="stealth" w="lg" len="lg"/>
+                </a:ln>
+              </p:spPr>
+              <p:style>
+                <a:lnRef idx="2">
+                  <a:schemeClr val="accent1"/>
+                </a:lnRef>
+                <a:fillRef idx="0">
+                  <a:schemeClr val="accent1"/>
+                </a:fillRef>
+                <a:effectRef idx="1">
+                  <a:schemeClr val="accent1"/>
+                </a:effectRef>
+                <a:fontRef idx="minor">
+                  <a:schemeClr val="tx1"/>
+                </a:fontRef>
+              </p:style>
+            </p:cxnSp>
+            <p:sp>
+              <p:nvSpPr>
+                <p:cNvPr id="52" name="ZoneTexte 51"/>
+                <p:cNvSpPr txBox="1"/>
+                <p:nvPr/>
+              </p:nvSpPr>
+              <p:spPr>
+                <a:xfrm>
+                  <a:off x="5958682" y="2299825"/>
+                  <a:ext cx="1300356" cy="369332"/>
+                </a:xfrm>
+                <a:prstGeom prst="rect">
+                  <a:avLst/>
+                </a:prstGeom>
+                <a:noFill/>
+              </p:spPr>
+              <p:txBody>
+                <a:bodyPr wrap="none" rtlCol="0">
+                  <a:spAutoFit/>
+                </a:bodyPr>
+                <a:lstStyle/>
+                <a:p>
+                  <a:r>
+                    <a:rPr lang="fr-FR" dirty="0" smtClean="0"/>
+                    <a:t>1.B2 Import</a:t>
+                  </a:r>
+                  <a:endParaRPr lang="fr-FR" dirty="0"/>
+                </a:p>
+              </p:txBody>
+            </p:sp>
+            <p:cxnSp>
+              <p:nvCxnSpPr>
+                <p:cNvPr id="54" name="Connecteur droit avec flèche 53"/>
+                <p:cNvCxnSpPr>
+                  <a:stCxn id="27" idx="4"/>
+                  <a:endCxn id="53" idx="0"/>
+                </p:cNvCxnSpPr>
+                <p:nvPr/>
+              </p:nvCxnSpPr>
+              <p:spPr>
+                <a:xfrm>
+                  <a:off x="2705302" y="4952524"/>
+                  <a:ext cx="10383" cy="522197"/>
+                </a:xfrm>
+                <a:prstGeom prst="straightConnector1">
+                  <a:avLst/>
+                </a:prstGeom>
+                <a:ln>
+                  <a:solidFill>
+                    <a:srgbClr val="000000"/>
+                  </a:solidFill>
+                  <a:tailEnd type="stealth" w="lg" len="lg"/>
+                </a:ln>
+              </p:spPr>
+              <p:style>
+                <a:lnRef idx="2">
+                  <a:schemeClr val="accent1"/>
+                </a:lnRef>
+                <a:fillRef idx="0">
+                  <a:schemeClr val="accent1"/>
+                </a:fillRef>
+                <a:effectRef idx="1">
+                  <a:schemeClr val="accent1"/>
+                </a:effectRef>
+                <a:fontRef idx="minor">
+                  <a:schemeClr val="tx1"/>
+                </a:fontRef>
+              </p:style>
+            </p:cxnSp>
+            <p:sp>
+              <p:nvSpPr>
+                <p:cNvPr id="59" name="Rectangle 58"/>
+                <p:cNvSpPr/>
+                <p:nvPr/>
+              </p:nvSpPr>
+              <p:spPr>
+                <a:xfrm>
+                  <a:off x="953813" y="2841728"/>
+                  <a:ext cx="1224158" cy="640747"/>
+                </a:xfrm>
+                <a:prstGeom prst="rect">
+                  <a:avLst/>
+                </a:prstGeom>
+                <a:solidFill>
+                  <a:schemeClr val="accent1">
+                    <a:lumMod val="20000"/>
+                    <a:lumOff val="80000"/>
+                  </a:schemeClr>
+                </a:solidFill>
+                <a:ln>
+                  <a:solidFill>
+                    <a:schemeClr val="tx1"/>
+                  </a:solidFill>
+                </a:ln>
+              </p:spPr>
+              <p:style>
+                <a:lnRef idx="1">
+                  <a:schemeClr val="accent1"/>
+                </a:lnRef>
+                <a:fillRef idx="3">
+                  <a:schemeClr val="accent1"/>
+                </a:fillRef>
+                <a:effectRef idx="2">
+                  <a:schemeClr val="accent1"/>
+                </a:effectRef>
+                <a:fontRef idx="minor">
+                  <a:schemeClr val="lt1"/>
+                </a:fontRef>
+              </p:style>
+              <p:txBody>
+                <a:bodyPr rtlCol="0" anchor="ctr"/>
+                <a:lstStyle/>
+                <a:p>
+                  <a:pPr algn="ctr"/>
+                  <a:r>
+                    <a:rPr lang="fr-FR" dirty="0" smtClean="0">
+                      <a:solidFill>
+                        <a:schemeClr val="tx1"/>
+                      </a:solidFill>
+                    </a:rPr>
+                    <a:t>OpenETCS API</a:t>
+                  </a:r>
+                  <a:endParaRPr lang="fr-FR" dirty="0">
+                    <a:solidFill>
+                      <a:schemeClr val="tx1"/>
+                    </a:solidFill>
+                  </a:endParaRPr>
+                </a:p>
+              </p:txBody>
+            </p:sp>
+            <p:cxnSp>
+              <p:nvCxnSpPr>
+                <p:cNvPr id="61" name="Connecteur droit avec flèche 60"/>
+                <p:cNvCxnSpPr>
+                  <a:stCxn id="59" idx="3"/>
+                  <a:endCxn id="21" idx="2"/>
+                </p:cNvCxnSpPr>
+                <p:nvPr/>
+              </p:nvCxnSpPr>
+              <p:spPr>
+                <a:xfrm>
+                  <a:off x="2177971" y="3162102"/>
+                  <a:ext cx="1288569" cy="0"/>
+                </a:xfrm>
+                <a:prstGeom prst="straightConnector1">
+                  <a:avLst/>
+                </a:prstGeom>
+                <a:ln>
+                  <a:solidFill>
+                    <a:srgbClr val="000000"/>
+                  </a:solidFill>
+                  <a:tailEnd type="stealth" w="lg" len="lg"/>
+                </a:ln>
+              </p:spPr>
+              <p:style>
+                <a:lnRef idx="2">
+                  <a:schemeClr val="accent1"/>
+                </a:lnRef>
+                <a:fillRef idx="0">
+                  <a:schemeClr val="accent1"/>
+                </a:fillRef>
+                <a:effectRef idx="1">
+                  <a:schemeClr val="accent1"/>
+                </a:effectRef>
+                <a:fontRef idx="minor">
+                  <a:schemeClr val="tx1"/>
+                </a:fontRef>
+              </p:style>
+            </p:cxnSp>
+            <p:sp>
+              <p:nvSpPr>
+                <p:cNvPr id="65" name="ZoneTexte 64"/>
+                <p:cNvSpPr txBox="1"/>
+                <p:nvPr/>
+              </p:nvSpPr>
+              <p:spPr>
+                <a:xfrm>
+                  <a:off x="2280348" y="2736009"/>
+                  <a:ext cx="1056700" cy="369332"/>
+                </a:xfrm>
+                <a:prstGeom prst="rect">
+                  <a:avLst/>
+                </a:prstGeom>
+                <a:noFill/>
+              </p:spPr>
+              <p:txBody>
+                <a:bodyPr wrap="none" rtlCol="0">
+                  <a:spAutoFit/>
+                </a:bodyPr>
+                <a:lstStyle/>
+                <a:p>
+                  <a:r>
+                    <a:rPr lang="fr-FR" dirty="0" smtClean="0"/>
+                    <a:t>2. Import</a:t>
+                  </a:r>
+                  <a:endParaRPr lang="fr-FR" dirty="0"/>
+                </a:p>
+              </p:txBody>
+            </p:sp>
+          </p:grpSp>
+        </p:grpSp>
+        <p:pic>
+          <p:nvPicPr>
+            <p:cNvPr id="66" name="Image 65"/>
+            <p:cNvPicPr>
+              <a:picLocks noChangeAspect="1"/>
+            </p:cNvPicPr>
+            <p:nvPr/>
+          </p:nvPicPr>
+          <p:blipFill>
+            <a:blip r:embed="rId4"/>
+            <a:stretch>
+              <a:fillRect/>
+            </a:stretch>
+          </p:blipFill>
+          <p:spPr>
+            <a:xfrm>
+              <a:off x="7935533" y="2484491"/>
+              <a:ext cx="795600" cy="429624"/>
+            </a:xfrm>
+            <a:prstGeom prst="rect">
+              <a:avLst/>
+            </a:prstGeom>
+            <a:ln>
+              <a:noFill/>
+            </a:ln>
+          </p:spPr>
+        </p:pic>
+      </p:grpSp>
+    </p:spTree>
+    <p:extLst>
+      <p:ext uri="{BB962C8B-B14F-4D97-AF65-F5344CB8AC3E}">
+        <p14:creationId xmlns:p14="http://schemas.microsoft.com/office/powerpoint/2010/main" val="1282625707"/>
+      </p:ext>
+    </p:extLst>
+  </p:cSld>
+  <p:clrMapOvr>
+    <a:masterClrMapping/>
+  </p:clrMapOvr>
+</p:sld>
+</file>
+
+<file path=ppt/slides/slide9.xml><?xml version="1.0" encoding="utf-8"?>
 <p:sld xmlns:a="http://schemas.openxmlformats.org/drawingml/2006/main" xmlns:r="http://schemas.openxmlformats.org/officeDocument/2006/relationships" xmlns:p="http://schemas.openxmlformats.org/presentationml/2006/main">
   <p:cSld>
     <p:spTree>
@@ -29465,7 +30875,7 @@
           <a:p>
             <a:fld id="{692C3D5F-CF0A-C342-86E8-AC8A51E170D1}" type="slidenum">
               <a:rPr lang="fr-FR" smtClean="0"/>
-              <a:t>8</a:t>
+              <a:t>9</a:t>
             </a:fld>
             <a:endParaRPr lang="fr-FR"/>
           </a:p>
@@ -29930,173 +31340,6 @@
     <p:extLst>
       <p:ext uri="{BB962C8B-B14F-4D97-AF65-F5344CB8AC3E}">
         <p14:creationId xmlns:p14="http://schemas.microsoft.com/office/powerpoint/2010/main" val="3005800288"/>
-      </p:ext>
-    </p:extLst>
-  </p:cSld>
-  <p:clrMapOvr>
-    <a:masterClrMapping/>
-  </p:clrMapOvr>
-</p:sld>
-</file>
-
-<file path=ppt/slides/slide9.xml><?xml version="1.0" encoding="utf-8"?>
-<p:sld xmlns:a="http://schemas.openxmlformats.org/drawingml/2006/main" xmlns:r="http://schemas.openxmlformats.org/officeDocument/2006/relationships" xmlns:p="http://schemas.openxmlformats.org/presentationml/2006/main">
-  <p:cSld>
-    <p:spTree>
-      <p:nvGrpSpPr>
-        <p:cNvPr id="1" name=""/>
-        <p:cNvGrpSpPr/>
-        <p:nvPr/>
-      </p:nvGrpSpPr>
-      <p:grpSpPr>
-        <a:xfrm>
-          <a:off x="0" y="0"/>
-          <a:ext cx="0" cy="0"/>
-          <a:chOff x="0" y="0"/>
-          <a:chExt cx="0" cy="0"/>
-        </a:xfrm>
-      </p:grpSpPr>
-      <p:sp>
-        <p:nvSpPr>
-          <p:cNvPr id="2" name="Titre 1"/>
-          <p:cNvSpPr>
-            <a:spLocks noGrp="1"/>
-          </p:cNvSpPr>
-          <p:nvPr>
-            <p:ph type="title"/>
-          </p:nvPr>
-        </p:nvSpPr>
-        <p:spPr/>
-        <p:txBody>
-          <a:bodyPr>
-            <a:normAutofit fontScale="90000"/>
-          </a:bodyPr>
-          <a:lstStyle/>
-          <a:p>
-            <a:r>
-              <a:rPr lang="eu-ES" smtClean="0"/>
-              <a:t>WP3 priorities regarding traceability</a:t>
-            </a:r>
-            <a:endParaRPr lang="eu-ES"/>
-          </a:p>
-        </p:txBody>
-      </p:sp>
-      <p:sp>
-        <p:nvSpPr>
-          <p:cNvPr id="3" name="Espace réservé du contenu 2"/>
-          <p:cNvSpPr>
-            <a:spLocks noGrp="1"/>
-          </p:cNvSpPr>
-          <p:nvPr>
-            <p:ph idx="1"/>
-          </p:nvPr>
-        </p:nvSpPr>
-        <p:spPr>
-          <a:xfrm>
-            <a:off x="457200" y="1600200"/>
-            <a:ext cx="8535210" cy="4525963"/>
-          </a:xfrm>
-        </p:spPr>
-        <p:txBody>
-          <a:bodyPr/>
-          <a:lstStyle/>
-          <a:p>
-            <a:r>
-              <a:rPr lang="eu-ES" smtClean="0"/>
-              <a:t>Urgent: Scade model to SRS traceability</a:t>
-            </a:r>
-          </a:p>
-          <a:p>
-            <a:pPr lvl="1"/>
-            <a:r>
-              <a:rPr lang="eu-ES" smtClean="0"/>
-              <a:t>Either through ReqTify tool</a:t>
-            </a:r>
-          </a:p>
-          <a:p>
-            <a:pPr lvl="1"/>
-            <a:r>
-              <a:rPr lang="eu-ES" smtClean="0"/>
-              <a:t>Else (ideally) through open source solution</a:t>
-            </a:r>
-          </a:p>
-          <a:p>
-            <a:pPr lvl="1"/>
-            <a:endParaRPr lang="eu-ES" smtClean="0"/>
-          </a:p>
-          <a:p>
-            <a:r>
-              <a:rPr lang="eu-ES" smtClean="0"/>
-              <a:t>Nice to have: SysML model to SRS traeability</a:t>
-            </a:r>
-          </a:p>
-          <a:p>
-            <a:pPr lvl="1"/>
-            <a:r>
-              <a:rPr lang="eu-ES" smtClean="0"/>
-              <a:t>Either through ReqIF/ReqCycle</a:t>
-            </a:r>
-          </a:p>
-          <a:p>
-            <a:pPr lvl="1"/>
-            <a:r>
-              <a:rPr lang="eu-ES" smtClean="0"/>
-              <a:t>Else through other open source chain</a:t>
-            </a:r>
-            <a:endParaRPr lang="eu-ES"/>
-          </a:p>
-        </p:txBody>
-      </p:sp>
-      <p:sp>
-        <p:nvSpPr>
-          <p:cNvPr id="4" name="Espace réservé de la date 3"/>
-          <p:cNvSpPr>
-            <a:spLocks noGrp="1"/>
-          </p:cNvSpPr>
-          <p:nvPr>
-            <p:ph type="dt" sz="half" idx="10"/>
-          </p:nvPr>
-        </p:nvSpPr>
-        <p:spPr/>
-        <p:txBody>
-          <a:bodyPr/>
-          <a:lstStyle/>
-          <a:p>
-            <a:r>
-              <a:rPr lang="fr-FR" smtClean="0"/>
-              <a:t>28/09/2015</a:t>
-            </a:r>
-            <a:endParaRPr lang="fr-FR"/>
-          </a:p>
-        </p:txBody>
-      </p:sp>
-      <p:sp>
-        <p:nvSpPr>
-          <p:cNvPr id="5" name="Espace réservé du numéro de diapositive 4"/>
-          <p:cNvSpPr>
-            <a:spLocks noGrp="1"/>
-          </p:cNvSpPr>
-          <p:nvPr>
-            <p:ph type="sldNum" sz="quarter" idx="12"/>
-          </p:nvPr>
-        </p:nvSpPr>
-        <p:spPr/>
-        <p:txBody>
-          <a:bodyPr/>
-          <a:lstStyle/>
-          <a:p>
-            <a:fld id="{692C3D5F-CF0A-C342-86E8-AC8A51E170D1}" type="slidenum">
-              <a:rPr lang="fr-FR" smtClean="0"/>
-              <a:t>9</a:t>
-            </a:fld>
-            <a:endParaRPr lang="fr-FR"/>
-          </a:p>
-        </p:txBody>
-      </p:sp>
-    </p:spTree>
-    <p:extLst>
-      <p:ext uri="{BB962C8B-B14F-4D97-AF65-F5344CB8AC3E}">
-        <p14:creationId xmlns:p14="http://schemas.microsoft.com/office/powerpoint/2010/main" val="3777682253"/>
       </p:ext>
     </p:extLst>
   </p:cSld>

</xml_diff>

<commit_message>
Detailed creation of link with Scade element from ReqCycle
</commit_message>
<xml_diff>
--- a/T7.3/TraceabilityArchitecture/images/2015-10-25 openETCS traceability_Figures.pptx
+++ b/T7.3/TraceabilityArchitecture/images/2015-10-25 openETCS traceability_Figures.pptx
@@ -5,10 +5,10 @@
     <p:sldMasterId id="2147483648" r:id="rId1"/>
   </p:sldMasterIdLst>
   <p:notesMasterIdLst>
-    <p:notesMasterId r:id="rId16"/>
+    <p:notesMasterId r:id="rId17"/>
   </p:notesMasterIdLst>
   <p:handoutMasterIdLst>
-    <p:handoutMasterId r:id="rId17"/>
+    <p:handoutMasterId r:id="rId18"/>
   </p:handoutMasterIdLst>
   <p:sldIdLst>
     <p:sldId id="256" r:id="rId2"/>
@@ -17,14 +17,15 @@
     <p:sldId id="267" r:id="rId5"/>
     <p:sldId id="261" r:id="rId6"/>
     <p:sldId id="268" r:id="rId7"/>
-    <p:sldId id="271" r:id="rId8"/>
-    <p:sldId id="275" r:id="rId9"/>
-    <p:sldId id="276" r:id="rId10"/>
-    <p:sldId id="265" r:id="rId11"/>
-    <p:sldId id="266" r:id="rId12"/>
-    <p:sldId id="272" r:id="rId13"/>
-    <p:sldId id="273" r:id="rId14"/>
-    <p:sldId id="274" r:id="rId15"/>
+    <p:sldId id="266" r:id="rId8"/>
+    <p:sldId id="271" r:id="rId9"/>
+    <p:sldId id="275" r:id="rId10"/>
+    <p:sldId id="277" r:id="rId11"/>
+    <p:sldId id="276" r:id="rId12"/>
+    <p:sldId id="265" r:id="rId13"/>
+    <p:sldId id="272" r:id="rId14"/>
+    <p:sldId id="273" r:id="rId15"/>
+    <p:sldId id="274" r:id="rId16"/>
   </p:sldIdLst>
   <p:sldSz cx="9144000" cy="6858000" type="screen4x3"/>
   <p:notesSz cx="6858000" cy="9144000"/>
@@ -3848,6 +3849,1769 @@
         </p:nvSpPr>
         <p:spPr>
           <a:xfrm>
+            <a:off x="457200" y="83563"/>
+            <a:ext cx="8229600" cy="514854"/>
+          </a:xfrm>
+        </p:spPr>
+        <p:txBody>
+          <a:bodyPr>
+            <a:normAutofit fontScale="90000"/>
+          </a:bodyPr>
+          <a:lstStyle/>
+          <a:p>
+            <a:r>
+              <a:rPr lang="fr-FR" sz="3600" dirty="0" err="1" smtClean="0"/>
+              <a:t>Reqcycle</a:t>
+            </a:r>
+            <a:r>
+              <a:rPr lang="fr-FR" sz="3600" dirty="0" smtClean="0"/>
+              <a:t> – </a:t>
+            </a:r>
+            <a:r>
+              <a:rPr lang="fr-FR" sz="3600" dirty="0" err="1" smtClean="0"/>
+              <a:t>prepare</a:t>
+            </a:r>
+            <a:r>
+              <a:rPr lang="fr-FR" sz="3600" dirty="0" smtClean="0"/>
+              <a:t> trace </a:t>
+            </a:r>
+            <a:r>
+              <a:rPr lang="fr-FR" sz="3600" dirty="0" err="1" smtClean="0"/>
+              <a:t>link</a:t>
+            </a:r>
+            <a:r>
+              <a:rPr lang="fr-FR" sz="3600" dirty="0" smtClean="0"/>
+              <a:t> </a:t>
+            </a:r>
+            <a:r>
+              <a:rPr lang="fr-FR" sz="3600" dirty="0" err="1" smtClean="0"/>
+              <a:t>with</a:t>
+            </a:r>
+            <a:r>
+              <a:rPr lang="fr-FR" sz="3600" dirty="0" smtClean="0"/>
+              <a:t> SCADE</a:t>
+            </a:r>
+            <a:endParaRPr lang="fr-FR" sz="3600" dirty="0"/>
+          </a:p>
+        </p:txBody>
+      </p:sp>
+      <p:grpSp>
+        <p:nvGrpSpPr>
+          <p:cNvPr id="16" name="Grouper 15"/>
+          <p:cNvGrpSpPr/>
+          <p:nvPr/>
+        </p:nvGrpSpPr>
+        <p:grpSpPr>
+          <a:xfrm>
+            <a:off x="250836" y="826990"/>
+            <a:ext cx="6785211" cy="5895268"/>
+            <a:chOff x="250836" y="826990"/>
+            <a:chExt cx="6785211" cy="5895268"/>
+          </a:xfrm>
+        </p:grpSpPr>
+        <p:grpSp>
+          <p:nvGrpSpPr>
+            <p:cNvPr id="12" name="Grouper 11"/>
+            <p:cNvGrpSpPr/>
+            <p:nvPr/>
+          </p:nvGrpSpPr>
+          <p:grpSpPr>
+            <a:xfrm>
+              <a:off x="250836" y="826990"/>
+              <a:ext cx="6785211" cy="5895268"/>
+              <a:chOff x="1589400" y="941391"/>
+              <a:chExt cx="6785211" cy="5895268"/>
+            </a:xfrm>
+          </p:grpSpPr>
+          <p:pic>
+            <p:nvPicPr>
+              <p:cNvPr id="10" name="Image 9"/>
+              <p:cNvPicPr>
+                <a:picLocks noChangeAspect="1"/>
+              </p:cNvPicPr>
+              <p:nvPr/>
+            </p:nvPicPr>
+            <p:blipFill>
+              <a:blip r:embed="rId2"/>
+              <a:stretch>
+                <a:fillRect/>
+              </a:stretch>
+            </p:blipFill>
+            <p:spPr>
+              <a:xfrm>
+                <a:off x="1589400" y="943004"/>
+                <a:ext cx="6785211" cy="5893655"/>
+              </a:xfrm>
+              <a:prstGeom prst="rect">
+                <a:avLst/>
+              </a:prstGeom>
+              <a:ln>
+                <a:solidFill>
+                  <a:schemeClr val="tx1"/>
+                </a:solidFill>
+              </a:ln>
+            </p:spPr>
+          </p:pic>
+          <p:grpSp>
+            <p:nvGrpSpPr>
+              <p:cNvPr id="11" name="Grouper 10"/>
+              <p:cNvGrpSpPr/>
+              <p:nvPr/>
+            </p:nvGrpSpPr>
+            <p:grpSpPr>
+              <a:xfrm>
+                <a:off x="1589401" y="941391"/>
+                <a:ext cx="4378122" cy="1538572"/>
+                <a:chOff x="1589401" y="941391"/>
+                <a:chExt cx="4378122" cy="1538572"/>
+              </a:xfrm>
+            </p:grpSpPr>
+            <p:sp>
+              <p:nvSpPr>
+                <p:cNvPr id="7" name="ZoneTexte 6"/>
+                <p:cNvSpPr txBox="1"/>
+                <p:nvPr/>
+              </p:nvSpPr>
+              <p:spPr>
+                <a:xfrm>
+                  <a:off x="1589401" y="941391"/>
+                  <a:ext cx="4378122" cy="276999"/>
+                </a:xfrm>
+                <a:prstGeom prst="rect">
+                  <a:avLst/>
+                </a:prstGeom>
+                <a:solidFill>
+                  <a:schemeClr val="accent1">
+                    <a:lumMod val="20000"/>
+                    <a:lumOff val="80000"/>
+                  </a:schemeClr>
+                </a:solidFill>
+                <a:ln>
+                  <a:noFill/>
+                </a:ln>
+              </p:spPr>
+              <p:txBody>
+                <a:bodyPr wrap="none" rtlCol="0">
+                  <a:spAutoFit/>
+                </a:bodyPr>
+                <a:lstStyle/>
+                <a:p>
+                  <a:r>
+                    <a:rPr lang="eu-ES" sz="1200" dirty="0" smtClean="0"/>
+                    <a:t>Generate requirement traceability annotation for external element</a:t>
+                  </a:r>
+                  <a:endParaRPr lang="eu-ES" sz="1200" dirty="0"/>
+                </a:p>
+              </p:txBody>
+            </p:sp>
+            <p:pic>
+              <p:nvPicPr>
+                <p:cNvPr id="8" name="Image 7"/>
+                <p:cNvPicPr>
+                  <a:picLocks noChangeAspect="1"/>
+                </p:cNvPicPr>
+                <p:nvPr/>
+              </p:nvPicPr>
+              <p:blipFill>
+                <a:blip r:embed="rId3"/>
+                <a:stretch>
+                  <a:fillRect/>
+                </a:stretch>
+              </p:blipFill>
+              <p:spPr>
+                <a:xfrm>
+                  <a:off x="2224658" y="2311267"/>
+                  <a:ext cx="463913" cy="168696"/>
+                </a:xfrm>
+                <a:prstGeom prst="rect">
+                  <a:avLst/>
+                </a:prstGeom>
+              </p:spPr>
+            </p:pic>
+          </p:grpSp>
+        </p:grpSp>
+        <p:sp>
+          <p:nvSpPr>
+            <p:cNvPr id="14" name="ZoneTexte 13"/>
+            <p:cNvSpPr txBox="1"/>
+            <p:nvPr/>
+          </p:nvSpPr>
+          <p:spPr>
+            <a:xfrm>
+              <a:off x="4628959" y="3681724"/>
+              <a:ext cx="2320540" cy="830997"/>
+            </a:xfrm>
+            <a:prstGeom prst="rect">
+              <a:avLst/>
+            </a:prstGeom>
+            <a:solidFill>
+              <a:srgbClr val="F79646"/>
+            </a:solidFill>
+            <a:ln w="19050" cmpd="sng">
+              <a:solidFill>
+                <a:srgbClr val="000000"/>
+              </a:solidFill>
+            </a:ln>
+          </p:spPr>
+          <p:txBody>
+            <a:bodyPr wrap="square" rtlCol="0">
+              <a:spAutoFit/>
+            </a:bodyPr>
+            <a:lstStyle/>
+            <a:p>
+              <a:pPr algn="ctr"/>
+              <a:r>
+                <a:rPr lang="fr-FR" sz="1600" dirty="0" smtClean="0"/>
+                <a:t>Copies traceability string annotation (</a:t>
+              </a:r>
+              <a:r>
+                <a:rPr lang="fr-FR" sz="1600" dirty="0" err="1" smtClean="0"/>
+                <a:t>ReqID</a:t>
+              </a:r>
+              <a:r>
+                <a:rPr lang="fr-FR" sz="1600" dirty="0" smtClean="0"/>
+                <a:t> + </a:t>
+              </a:r>
+              <a:r>
+                <a:rPr lang="fr-FR" sz="1600" dirty="0" err="1" smtClean="0"/>
+                <a:t>Satisfy</a:t>
+              </a:r>
+              <a:r>
+                <a:rPr lang="fr-FR" sz="1600" dirty="0" smtClean="0"/>
+                <a:t> ID) to clipboard</a:t>
+              </a:r>
+              <a:endParaRPr lang="fr-FR" sz="1600" dirty="0"/>
+            </a:p>
+          </p:txBody>
+        </p:sp>
+        <p:sp>
+          <p:nvSpPr>
+            <p:cNvPr id="15" name="Flèche vers la droite 14"/>
+            <p:cNvSpPr/>
+            <p:nvPr/>
+          </p:nvSpPr>
+          <p:spPr>
+            <a:xfrm rot="3271653">
+              <a:off x="4636981" y="3109549"/>
+              <a:ext cx="1007686" cy="235108"/>
+            </a:xfrm>
+            <a:prstGeom prst="rightArrow">
+              <a:avLst/>
+            </a:prstGeom>
+            <a:solidFill>
+              <a:schemeClr val="accent6"/>
+            </a:solidFill>
+            <a:ln>
+              <a:solidFill>
+                <a:schemeClr val="tx1"/>
+              </a:solidFill>
+            </a:ln>
+          </p:spPr>
+          <p:style>
+            <a:lnRef idx="1">
+              <a:schemeClr val="accent1"/>
+            </a:lnRef>
+            <a:fillRef idx="3">
+              <a:schemeClr val="accent1"/>
+            </a:fillRef>
+            <a:effectRef idx="2">
+              <a:schemeClr val="accent1"/>
+            </a:effectRef>
+            <a:fontRef idx="minor">
+              <a:schemeClr val="lt1"/>
+            </a:fontRef>
+          </p:style>
+          <p:txBody>
+            <a:bodyPr rtlCol="0" anchor="ctr"/>
+            <a:lstStyle/>
+            <a:p>
+              <a:pPr algn="ctr"/>
+              <a:endParaRPr lang="fr-FR"/>
+            </a:p>
+          </p:txBody>
+        </p:sp>
+      </p:grpSp>
+    </p:spTree>
+    <p:extLst>
+      <p:ext uri="{BB962C8B-B14F-4D97-AF65-F5344CB8AC3E}">
+        <p14:creationId xmlns:p14="http://schemas.microsoft.com/office/powerpoint/2010/main" val="1507287878"/>
+      </p:ext>
+    </p:extLst>
+  </p:cSld>
+  <p:clrMapOvr>
+    <a:masterClrMapping/>
+  </p:clrMapOvr>
+</p:sld>
+</file>
+
+<file path=ppt/slides/slide11.xml><?xml version="1.0" encoding="utf-8"?>
+<p:sld xmlns:a="http://schemas.openxmlformats.org/drawingml/2006/main" xmlns:r="http://schemas.openxmlformats.org/officeDocument/2006/relationships" xmlns:p="http://schemas.openxmlformats.org/presentationml/2006/main">
+  <p:cSld>
+    <p:spTree>
+      <p:nvGrpSpPr>
+        <p:cNvPr id="1" name=""/>
+        <p:cNvGrpSpPr/>
+        <p:nvPr/>
+      </p:nvGrpSpPr>
+      <p:grpSpPr>
+        <a:xfrm>
+          <a:off x="0" y="0"/>
+          <a:ext cx="0" cy="0"/>
+          <a:chOff x="0" y="0"/>
+          <a:chExt cx="0" cy="0"/>
+        </a:xfrm>
+      </p:grpSpPr>
+      <p:sp>
+        <p:nvSpPr>
+          <p:cNvPr id="2" name="Titre 1"/>
+          <p:cNvSpPr>
+            <a:spLocks noGrp="1"/>
+          </p:cNvSpPr>
+          <p:nvPr>
+            <p:ph type="title"/>
+          </p:nvPr>
+        </p:nvSpPr>
+        <p:spPr>
+          <a:xfrm>
+            <a:off x="501533" y="274639"/>
+            <a:ext cx="8229600" cy="549180"/>
+          </a:xfrm>
+        </p:spPr>
+        <p:txBody>
+          <a:bodyPr>
+            <a:normAutofit fontScale="90000"/>
+          </a:bodyPr>
+          <a:lstStyle/>
+          <a:p>
+            <a:r>
+              <a:rPr lang="fr-FR" dirty="0" smtClean="0"/>
+              <a:t>3rd solution – ReqCycle </a:t>
+            </a:r>
+            <a:r>
+              <a:rPr lang="fr-FR" dirty="0" err="1" smtClean="0"/>
+              <a:t>only</a:t>
+            </a:r>
+            <a:endParaRPr lang="fr-FR" dirty="0"/>
+          </a:p>
+        </p:txBody>
+      </p:sp>
+      <p:sp>
+        <p:nvSpPr>
+          <p:cNvPr id="4" name="Espace réservé de la date 3"/>
+          <p:cNvSpPr>
+            <a:spLocks noGrp="1"/>
+          </p:cNvSpPr>
+          <p:nvPr>
+            <p:ph type="dt" sz="half" idx="10"/>
+          </p:nvPr>
+        </p:nvSpPr>
+        <p:spPr/>
+        <p:txBody>
+          <a:bodyPr/>
+          <a:lstStyle/>
+          <a:p>
+            <a:r>
+              <a:rPr lang="fr-FR" smtClean="0"/>
+              <a:t>28/09/2015</a:t>
+            </a:r>
+            <a:endParaRPr lang="fr-FR"/>
+          </a:p>
+        </p:txBody>
+      </p:sp>
+      <p:sp>
+        <p:nvSpPr>
+          <p:cNvPr id="5" name="Espace réservé du numéro de diapositive 4"/>
+          <p:cNvSpPr>
+            <a:spLocks noGrp="1"/>
+          </p:cNvSpPr>
+          <p:nvPr>
+            <p:ph type="sldNum" sz="quarter" idx="12"/>
+          </p:nvPr>
+        </p:nvSpPr>
+        <p:spPr/>
+        <p:txBody>
+          <a:bodyPr/>
+          <a:lstStyle/>
+          <a:p>
+            <a:fld id="{692C3D5F-CF0A-C342-86E8-AC8A51E170D1}" type="slidenum">
+              <a:rPr lang="fr-FR" smtClean="0"/>
+              <a:t>11</a:t>
+            </a:fld>
+            <a:endParaRPr lang="fr-FR"/>
+          </a:p>
+        </p:txBody>
+      </p:sp>
+      <p:grpSp>
+        <p:nvGrpSpPr>
+          <p:cNvPr id="14" name="Grouper 13"/>
+          <p:cNvGrpSpPr/>
+          <p:nvPr/>
+        </p:nvGrpSpPr>
+        <p:grpSpPr>
+          <a:xfrm>
+            <a:off x="953813" y="1044318"/>
+            <a:ext cx="7866986" cy="5170472"/>
+            <a:chOff x="953813" y="1044318"/>
+            <a:chExt cx="7866986" cy="5170472"/>
+          </a:xfrm>
+        </p:grpSpPr>
+        <p:grpSp>
+          <p:nvGrpSpPr>
+            <p:cNvPr id="69" name="Grouper 68"/>
+            <p:cNvGrpSpPr/>
+            <p:nvPr/>
+          </p:nvGrpSpPr>
+          <p:grpSpPr>
+            <a:xfrm>
+              <a:off x="953813" y="1044318"/>
+              <a:ext cx="7866986" cy="5113263"/>
+              <a:chOff x="953813" y="1044318"/>
+              <a:chExt cx="7866986" cy="5113263"/>
+            </a:xfrm>
+          </p:grpSpPr>
+          <p:grpSp>
+            <p:nvGrpSpPr>
+              <p:cNvPr id="68" name="Grouper 67"/>
+              <p:cNvGrpSpPr/>
+              <p:nvPr/>
+            </p:nvGrpSpPr>
+            <p:grpSpPr>
+              <a:xfrm>
+                <a:off x="953813" y="1044318"/>
+                <a:ext cx="7866986" cy="5113263"/>
+                <a:chOff x="953813" y="1044318"/>
+                <a:chExt cx="7866986" cy="5113263"/>
+              </a:xfrm>
+            </p:grpSpPr>
+            <p:sp>
+              <p:nvSpPr>
+                <p:cNvPr id="53" name="Ellipse 52"/>
+                <p:cNvSpPr/>
+                <p:nvPr/>
+              </p:nvSpPr>
+              <p:spPr>
+                <a:xfrm>
+                  <a:off x="1565892" y="5474721"/>
+                  <a:ext cx="2163785" cy="682860"/>
+                </a:xfrm>
+                <a:prstGeom prst="ellipse">
+                  <a:avLst/>
+                </a:prstGeom>
+                <a:solidFill>
+                  <a:srgbClr val="CCC1DA"/>
+                </a:solidFill>
+                <a:ln>
+                  <a:solidFill>
+                    <a:srgbClr val="000000"/>
+                  </a:solidFill>
+                </a:ln>
+              </p:spPr>
+              <p:style>
+                <a:lnRef idx="1">
+                  <a:schemeClr val="accent1"/>
+                </a:lnRef>
+                <a:fillRef idx="3">
+                  <a:schemeClr val="accent1"/>
+                </a:fillRef>
+                <a:effectRef idx="2">
+                  <a:schemeClr val="accent1"/>
+                </a:effectRef>
+                <a:fontRef idx="minor">
+                  <a:schemeClr val="lt1"/>
+                </a:fontRef>
+              </p:style>
+              <p:txBody>
+                <a:bodyPr rtlCol="0" anchor="ctr"/>
+                <a:lstStyle/>
+                <a:p>
+                  <a:pPr algn="ctr"/>
+                  <a:r>
+                    <a:rPr lang="fr-FR" dirty="0" smtClean="0">
+                      <a:solidFill>
+                        <a:srgbClr val="000000"/>
+                      </a:solidFill>
+                    </a:rPr>
+                    <a:t>RT-tester</a:t>
+                  </a:r>
+                  <a:endParaRPr lang="fr-FR" dirty="0">
+                    <a:solidFill>
+                      <a:srgbClr val="000000"/>
+                    </a:solidFill>
+                  </a:endParaRPr>
+                </a:p>
+              </p:txBody>
+            </p:sp>
+            <p:grpSp>
+              <p:nvGrpSpPr>
+                <p:cNvPr id="67" name="Grouper 66"/>
+                <p:cNvGrpSpPr/>
+                <p:nvPr/>
+              </p:nvGrpSpPr>
+              <p:grpSpPr>
+                <a:xfrm>
+                  <a:off x="953813" y="1044318"/>
+                  <a:ext cx="7866986" cy="4430403"/>
+                  <a:chOff x="953813" y="1044318"/>
+                  <a:chExt cx="7866986" cy="4430403"/>
+                </a:xfrm>
+              </p:grpSpPr>
+              <p:cxnSp>
+                <p:nvCxnSpPr>
+                  <p:cNvPr id="9" name="Connecteur droit avec flèche 8"/>
+                  <p:cNvCxnSpPr>
+                    <a:stCxn id="6" idx="2"/>
+                    <a:endCxn id="21" idx="0"/>
+                  </p:cNvCxnSpPr>
+                  <p:nvPr/>
+                </p:nvCxnSpPr>
+                <p:spPr>
+                  <a:xfrm>
+                    <a:off x="3283059" y="1945126"/>
+                    <a:ext cx="1333274" cy="875546"/>
+                  </a:xfrm>
+                  <a:prstGeom prst="straightConnector1">
+                    <a:avLst/>
+                  </a:prstGeom>
+                  <a:ln>
+                    <a:solidFill>
+                      <a:srgbClr val="000000"/>
+                    </a:solidFill>
+                    <a:tailEnd type="stealth" w="lg" len="lg"/>
+                  </a:ln>
+                </p:spPr>
+                <p:style>
+                  <a:lnRef idx="2">
+                    <a:schemeClr val="accent1"/>
+                  </a:lnRef>
+                  <a:fillRef idx="0">
+                    <a:schemeClr val="accent1"/>
+                  </a:fillRef>
+                  <a:effectRef idx="1">
+                    <a:schemeClr val="accent1"/>
+                  </a:effectRef>
+                  <a:fontRef idx="minor">
+                    <a:schemeClr val="tx1"/>
+                  </a:fontRef>
+                </p:style>
+              </p:cxnSp>
+              <p:sp>
+                <p:nvSpPr>
+                  <p:cNvPr id="11" name="ZoneTexte 10"/>
+                  <p:cNvSpPr txBox="1"/>
+                  <p:nvPr/>
+                </p:nvSpPr>
+                <p:spPr>
+                  <a:xfrm>
+                    <a:off x="4087983" y="2115159"/>
+                    <a:ext cx="1189035" cy="369332"/>
+                  </a:xfrm>
+                  <a:prstGeom prst="rect">
+                    <a:avLst/>
+                  </a:prstGeom>
+                  <a:noFill/>
+                </p:spPr>
+                <p:txBody>
+                  <a:bodyPr wrap="none" rtlCol="0">
+                    <a:spAutoFit/>
+                  </a:bodyPr>
+                  <a:lstStyle/>
+                  <a:p>
+                    <a:r>
+                      <a:rPr lang="fr-FR" dirty="0" smtClean="0"/>
+                      <a:t>1.A Import</a:t>
+                    </a:r>
+                    <a:endParaRPr lang="fr-FR" dirty="0"/>
+                  </a:p>
+                </p:txBody>
+              </p:sp>
+              <p:grpSp>
+                <p:nvGrpSpPr>
+                  <p:cNvPr id="45" name="Grouper 44"/>
+                  <p:cNvGrpSpPr/>
+                  <p:nvPr/>
+                </p:nvGrpSpPr>
+                <p:grpSpPr>
+                  <a:xfrm>
+                    <a:off x="2521821" y="1107126"/>
+                    <a:ext cx="1373317" cy="838000"/>
+                    <a:chOff x="3855095" y="1107126"/>
+                    <a:chExt cx="1373317" cy="838000"/>
+                  </a:xfrm>
+                </p:grpSpPr>
+                <p:sp>
+                  <p:nvSpPr>
+                    <p:cNvPr id="6" name="Rectangle 5"/>
+                    <p:cNvSpPr/>
+                    <p:nvPr/>
+                  </p:nvSpPr>
+                  <p:spPr>
+                    <a:xfrm>
+                      <a:off x="4004254" y="1304379"/>
+                      <a:ext cx="1224158" cy="640747"/>
+                    </a:xfrm>
+                    <a:prstGeom prst="rect">
+                      <a:avLst/>
+                    </a:prstGeom>
+                    <a:solidFill>
+                      <a:schemeClr val="accent1">
+                        <a:lumMod val="20000"/>
+                        <a:lumOff val="80000"/>
+                      </a:schemeClr>
+                    </a:solidFill>
+                    <a:ln>
+                      <a:solidFill>
+                        <a:schemeClr val="tx1"/>
+                      </a:solidFill>
+                    </a:ln>
+                  </p:spPr>
+                  <p:style>
+                    <a:lnRef idx="1">
+                      <a:schemeClr val="accent1"/>
+                    </a:lnRef>
+                    <a:fillRef idx="3">
+                      <a:schemeClr val="accent1"/>
+                    </a:fillRef>
+                    <a:effectRef idx="2">
+                      <a:schemeClr val="accent1"/>
+                    </a:effectRef>
+                    <a:fontRef idx="minor">
+                      <a:schemeClr val="lt1"/>
+                    </a:fontRef>
+                  </p:style>
+                  <p:txBody>
+                    <a:bodyPr rtlCol="0" anchor="ctr"/>
+                    <a:lstStyle/>
+                    <a:p>
+                      <a:pPr algn="ctr"/>
+                      <a:r>
+                        <a:rPr lang="fr-FR" dirty="0" err="1" smtClean="0">
+                          <a:solidFill>
+                            <a:schemeClr val="tx1"/>
+                          </a:solidFill>
+                        </a:rPr>
+                        <a:t>Subset</a:t>
+                      </a:r>
+                      <a:r>
+                        <a:rPr lang="fr-FR" dirty="0" smtClean="0">
+                          <a:solidFill>
+                            <a:schemeClr val="tx1"/>
+                          </a:solidFill>
+                        </a:rPr>
+                        <a:t> 026</a:t>
+                      </a:r>
+                      <a:endParaRPr lang="fr-FR" dirty="0">
+                        <a:solidFill>
+                          <a:schemeClr val="tx1"/>
+                        </a:solidFill>
+                      </a:endParaRPr>
+                    </a:p>
+                  </p:txBody>
+                </p:sp>
+                <p:pic>
+                  <p:nvPicPr>
+                    <p:cNvPr id="12" name="Image 11"/>
+                    <p:cNvPicPr>
+                      <a:picLocks noChangeAspect="1"/>
+                    </p:cNvPicPr>
+                    <p:nvPr/>
+                  </p:nvPicPr>
+                  <p:blipFill>
+                    <a:blip r:embed="rId2"/>
+                    <a:stretch>
+                      <a:fillRect/>
+                    </a:stretch>
+                  </p:blipFill>
+                  <p:spPr>
+                    <a:xfrm>
+                      <a:off x="3855095" y="1107126"/>
+                      <a:ext cx="394505" cy="394505"/>
+                    </a:xfrm>
+                    <a:prstGeom prst="rect">
+                      <a:avLst/>
+                    </a:prstGeom>
+                  </p:spPr>
+                </p:pic>
+              </p:grpSp>
+              <p:sp>
+                <p:nvSpPr>
+                  <p:cNvPr id="21" name="Ellipse 20"/>
+                  <p:cNvSpPr/>
+                  <p:nvPr/>
+                </p:nvSpPr>
+                <p:spPr>
+                  <a:xfrm>
+                    <a:off x="3466540" y="2820672"/>
+                    <a:ext cx="2299586" cy="682860"/>
+                  </a:xfrm>
+                  <a:prstGeom prst="ellipse">
+                    <a:avLst/>
+                  </a:prstGeom>
+                  <a:solidFill>
+                    <a:srgbClr val="CCC1DA"/>
+                  </a:solidFill>
+                  <a:ln>
+                    <a:solidFill>
+                      <a:srgbClr val="000000"/>
+                    </a:solidFill>
+                  </a:ln>
+                </p:spPr>
+                <p:style>
+                  <a:lnRef idx="1">
+                    <a:schemeClr val="accent1"/>
+                  </a:lnRef>
+                  <a:fillRef idx="3">
+                    <a:schemeClr val="accent1"/>
+                  </a:fillRef>
+                  <a:effectRef idx="2">
+                    <a:schemeClr val="accent1"/>
+                  </a:effectRef>
+                  <a:fontRef idx="minor">
+                    <a:schemeClr val="lt1"/>
+                  </a:fontRef>
+                </p:style>
+                <p:txBody>
+                  <a:bodyPr rtlCol="0" anchor="ctr"/>
+                  <a:lstStyle/>
+                  <a:p>
+                    <a:pPr algn="ctr"/>
+                    <a:r>
+                      <a:rPr lang="fr-FR" dirty="0" smtClean="0">
+                        <a:solidFill>
+                          <a:srgbClr val="000000"/>
+                        </a:solidFill>
+                      </a:rPr>
+                      <a:t>ReqCycle</a:t>
+                    </a:r>
+                    <a:endParaRPr lang="fr-FR" dirty="0">
+                      <a:solidFill>
+                        <a:srgbClr val="000000"/>
+                      </a:solidFill>
+                    </a:endParaRPr>
+                  </a:p>
+                </p:txBody>
+              </p:sp>
+              <p:sp>
+                <p:nvSpPr>
+                  <p:cNvPr id="26" name="Ellipse 25"/>
+                  <p:cNvSpPr/>
+                  <p:nvPr/>
+                </p:nvSpPr>
+                <p:spPr>
+                  <a:xfrm>
+                    <a:off x="5228412" y="4269664"/>
+                    <a:ext cx="2299586" cy="682860"/>
+                  </a:xfrm>
+                  <a:prstGeom prst="ellipse">
+                    <a:avLst/>
+                  </a:prstGeom>
+                  <a:solidFill>
+                    <a:srgbClr val="CCC1DA"/>
+                  </a:solidFill>
+                  <a:ln>
+                    <a:solidFill>
+                      <a:srgbClr val="000000"/>
+                    </a:solidFill>
+                  </a:ln>
+                </p:spPr>
+                <p:style>
+                  <a:lnRef idx="1">
+                    <a:schemeClr val="accent1"/>
+                  </a:lnRef>
+                  <a:fillRef idx="3">
+                    <a:schemeClr val="accent1"/>
+                  </a:fillRef>
+                  <a:effectRef idx="2">
+                    <a:schemeClr val="accent1"/>
+                  </a:effectRef>
+                  <a:fontRef idx="minor">
+                    <a:schemeClr val="lt1"/>
+                  </a:fontRef>
+                </p:style>
+                <p:txBody>
+                  <a:bodyPr rtlCol="0" anchor="ctr"/>
+                  <a:lstStyle/>
+                  <a:p>
+                    <a:pPr algn="ctr"/>
+                    <a:r>
+                      <a:rPr lang="fr-FR" dirty="0" smtClean="0">
+                        <a:solidFill>
+                          <a:srgbClr val="000000"/>
+                        </a:solidFill>
+                      </a:rPr>
+                      <a:t>SCADE</a:t>
+                    </a:r>
+                    <a:endParaRPr lang="fr-FR" dirty="0">
+                      <a:solidFill>
+                        <a:srgbClr val="000000"/>
+                      </a:solidFill>
+                    </a:endParaRPr>
+                  </a:p>
+                </p:txBody>
+              </p:sp>
+              <p:sp>
+                <p:nvSpPr>
+                  <p:cNvPr id="27" name="Ellipse 26"/>
+                  <p:cNvSpPr/>
+                  <p:nvPr/>
+                </p:nvSpPr>
+                <p:spPr>
+                  <a:xfrm>
+                    <a:off x="1555509" y="4269664"/>
+                    <a:ext cx="2174168" cy="682860"/>
+                  </a:xfrm>
+                  <a:prstGeom prst="ellipse">
+                    <a:avLst/>
+                  </a:prstGeom>
+                  <a:solidFill>
+                    <a:srgbClr val="CCC1DA"/>
+                  </a:solidFill>
+                  <a:ln>
+                    <a:solidFill>
+                      <a:srgbClr val="000000"/>
+                    </a:solidFill>
+                  </a:ln>
+                </p:spPr>
+                <p:style>
+                  <a:lnRef idx="1">
+                    <a:schemeClr val="accent1"/>
+                  </a:lnRef>
+                  <a:fillRef idx="3">
+                    <a:schemeClr val="accent1"/>
+                  </a:fillRef>
+                  <a:effectRef idx="2">
+                    <a:schemeClr val="accent1"/>
+                  </a:effectRef>
+                  <a:fontRef idx="minor">
+                    <a:schemeClr val="lt1"/>
+                  </a:fontRef>
+                </p:style>
+                <p:txBody>
+                  <a:bodyPr rtlCol="0" anchor="ctr"/>
+                  <a:lstStyle/>
+                  <a:p>
+                    <a:pPr algn="ctr"/>
+                    <a:r>
+                      <a:rPr lang="fr-FR" dirty="0" smtClean="0">
+                        <a:solidFill>
+                          <a:srgbClr val="000000"/>
+                        </a:solidFill>
+                      </a:rPr>
+                      <a:t>Papyrus</a:t>
+                    </a:r>
+                    <a:endParaRPr lang="fr-FR" dirty="0">
+                      <a:solidFill>
+                        <a:srgbClr val="000000"/>
+                      </a:solidFill>
+                    </a:endParaRPr>
+                  </a:p>
+                </p:txBody>
+              </p:sp>
+              <p:cxnSp>
+                <p:nvCxnSpPr>
+                  <p:cNvPr id="29" name="Connecteur droit avec flèche 28"/>
+                  <p:cNvCxnSpPr>
+                    <a:endCxn id="27" idx="7"/>
+                  </p:cNvCxnSpPr>
+                  <p:nvPr/>
+                </p:nvCxnSpPr>
+                <p:spPr>
+                  <a:xfrm flipH="1">
+                    <a:off x="3411277" y="3503532"/>
+                    <a:ext cx="970522" cy="866135"/>
+                  </a:xfrm>
+                  <a:prstGeom prst="straightConnector1">
+                    <a:avLst/>
+                  </a:prstGeom>
+                  <a:ln>
+                    <a:solidFill>
+                      <a:srgbClr val="008000"/>
+                    </a:solidFill>
+                    <a:headEnd type="stealth" w="lg" len="lg"/>
+                    <a:tailEnd type="stealth" w="lg" len="lg"/>
+                  </a:ln>
+                </p:spPr>
+                <p:style>
+                  <a:lnRef idx="2">
+                    <a:schemeClr val="accent1"/>
+                  </a:lnRef>
+                  <a:fillRef idx="0">
+                    <a:schemeClr val="accent1"/>
+                  </a:fillRef>
+                  <a:effectRef idx="1">
+                    <a:schemeClr val="accent1"/>
+                  </a:effectRef>
+                  <a:fontRef idx="minor">
+                    <a:schemeClr val="tx1"/>
+                  </a:fontRef>
+                </p:style>
+              </p:cxnSp>
+              <p:cxnSp>
+                <p:nvCxnSpPr>
+                  <p:cNvPr id="31" name="Connecteur droit avec flèche 30"/>
+                  <p:cNvCxnSpPr>
+                    <a:stCxn id="26" idx="0"/>
+                    <a:endCxn id="21" idx="5"/>
+                  </p:cNvCxnSpPr>
+                  <p:nvPr/>
+                </p:nvCxnSpPr>
+                <p:spPr>
+                  <a:xfrm flipH="1" flipV="1">
+                    <a:off x="5429359" y="3403529"/>
+                    <a:ext cx="948846" cy="866135"/>
+                  </a:xfrm>
+                  <a:prstGeom prst="straightConnector1">
+                    <a:avLst/>
+                  </a:prstGeom>
+                  <a:ln>
+                    <a:solidFill>
+                      <a:srgbClr val="008000"/>
+                    </a:solidFill>
+                    <a:headEnd type="stealth" w="lg" len="lg"/>
+                    <a:tailEnd type="stealth" w="lg" len="lg"/>
+                  </a:ln>
+                </p:spPr>
+                <p:style>
+                  <a:lnRef idx="2">
+                    <a:schemeClr val="accent1"/>
+                  </a:lnRef>
+                  <a:fillRef idx="0">
+                    <a:schemeClr val="accent1"/>
+                  </a:fillRef>
+                  <a:effectRef idx="1">
+                    <a:schemeClr val="accent1"/>
+                  </a:effectRef>
+                  <a:fontRef idx="minor">
+                    <a:schemeClr val="tx1"/>
+                  </a:fontRef>
+                </p:style>
+              </p:cxnSp>
+              <p:sp>
+                <p:nvSpPr>
+                  <p:cNvPr id="34" name="ZoneTexte 33"/>
+                  <p:cNvSpPr txBox="1"/>
+                  <p:nvPr/>
+                </p:nvSpPr>
+                <p:spPr>
+                  <a:xfrm>
+                    <a:off x="3384765" y="3653627"/>
+                    <a:ext cx="560896" cy="369332"/>
+                  </a:xfrm>
+                  <a:prstGeom prst="rect">
+                    <a:avLst/>
+                  </a:prstGeom>
+                  <a:noFill/>
+                </p:spPr>
+                <p:txBody>
+                  <a:bodyPr wrap="none" rtlCol="0">
+                    <a:spAutoFit/>
+                  </a:bodyPr>
+                  <a:lstStyle/>
+                  <a:p>
+                    <a:r>
+                      <a:rPr lang="fr-FR" dirty="0" smtClean="0"/>
+                      <a:t>Link</a:t>
+                    </a:r>
+                    <a:endParaRPr lang="fr-FR" dirty="0"/>
+                  </a:p>
+                </p:txBody>
+              </p:sp>
+              <p:sp>
+                <p:nvSpPr>
+                  <p:cNvPr id="35" name="ZoneTexte 34"/>
+                  <p:cNvSpPr txBox="1"/>
+                  <p:nvPr/>
+                </p:nvSpPr>
+                <p:spPr>
+                  <a:xfrm>
+                    <a:off x="5940821" y="3503532"/>
+                    <a:ext cx="560896" cy="369332"/>
+                  </a:xfrm>
+                  <a:prstGeom prst="rect">
+                    <a:avLst/>
+                  </a:prstGeom>
+                  <a:noFill/>
+                </p:spPr>
+                <p:txBody>
+                  <a:bodyPr wrap="none" rtlCol="0">
+                    <a:spAutoFit/>
+                  </a:bodyPr>
+                  <a:lstStyle/>
+                  <a:p>
+                    <a:r>
+                      <a:rPr lang="fr-FR" dirty="0" smtClean="0"/>
+                      <a:t>Link</a:t>
+                    </a:r>
+                    <a:endParaRPr lang="fr-FR" dirty="0"/>
+                  </a:p>
+                </p:txBody>
+              </p:sp>
+              <p:sp>
+                <p:nvSpPr>
+                  <p:cNvPr id="37" name="Rectangle 36"/>
+                  <p:cNvSpPr/>
+                  <p:nvPr/>
+                </p:nvSpPr>
+                <p:spPr>
+                  <a:xfrm>
+                    <a:off x="6692825" y="2834419"/>
+                    <a:ext cx="2127974" cy="640747"/>
+                  </a:xfrm>
+                  <a:prstGeom prst="rect">
+                    <a:avLst/>
+                  </a:prstGeom>
+                  <a:solidFill>
+                    <a:srgbClr val="CCC1DA"/>
+                  </a:solidFill>
+                  <a:ln>
+                    <a:solidFill>
+                      <a:schemeClr val="tx1"/>
+                    </a:solidFill>
+                  </a:ln>
+                </p:spPr>
+                <p:style>
+                  <a:lnRef idx="1">
+                    <a:schemeClr val="accent1"/>
+                  </a:lnRef>
+                  <a:fillRef idx="3">
+                    <a:schemeClr val="accent1"/>
+                  </a:fillRef>
+                  <a:effectRef idx="2">
+                    <a:schemeClr val="accent1"/>
+                  </a:effectRef>
+                  <a:fontRef idx="minor">
+                    <a:schemeClr val="lt1"/>
+                  </a:fontRef>
+                </p:style>
+                <p:txBody>
+                  <a:bodyPr rtlCol="0" anchor="ctr"/>
+                  <a:lstStyle/>
+                  <a:p>
+                    <a:pPr algn="ctr"/>
+                    <a:r>
+                      <a:rPr lang="fr-FR" sz="1600" dirty="0" smtClean="0">
+                        <a:solidFill>
+                          <a:schemeClr val="tx1"/>
+                        </a:solidFill>
+                      </a:rPr>
+                      <a:t>Reference Requirement </a:t>
+                    </a:r>
+                    <a:r>
+                      <a:rPr lang="fr-FR" sz="1600" dirty="0" smtClean="0">
+                        <a:solidFill>
+                          <a:schemeClr val="tx1"/>
+                        </a:solidFill>
+                      </a:rPr>
+                      <a:t>Data Base</a:t>
+                    </a:r>
+                    <a:endParaRPr lang="fr-FR" sz="1600" dirty="0">
+                      <a:solidFill>
+                        <a:schemeClr val="tx1"/>
+                      </a:solidFill>
+                    </a:endParaRPr>
+                  </a:p>
+                </p:txBody>
+              </p:sp>
+              <p:cxnSp>
+                <p:nvCxnSpPr>
+                  <p:cNvPr id="38" name="Connecteur droit avec flèche 37"/>
+                  <p:cNvCxnSpPr>
+                    <a:stCxn id="21" idx="6"/>
+                    <a:endCxn id="37" idx="1"/>
+                  </p:cNvCxnSpPr>
+                  <p:nvPr/>
+                </p:nvCxnSpPr>
+                <p:spPr>
+                  <a:xfrm flipV="1">
+                    <a:off x="5766126" y="3154793"/>
+                    <a:ext cx="926699" cy="7309"/>
+                  </a:xfrm>
+                  <a:prstGeom prst="straightConnector1">
+                    <a:avLst/>
+                  </a:prstGeom>
+                  <a:ln>
+                    <a:solidFill>
+                      <a:srgbClr val="000000"/>
+                    </a:solidFill>
+                    <a:tailEnd type="stealth" w="lg" len="lg"/>
+                  </a:ln>
+                </p:spPr>
+                <p:style>
+                  <a:lnRef idx="2">
+                    <a:schemeClr val="accent1"/>
+                  </a:lnRef>
+                  <a:fillRef idx="0">
+                    <a:schemeClr val="accent1"/>
+                  </a:fillRef>
+                  <a:effectRef idx="1">
+                    <a:schemeClr val="accent1"/>
+                  </a:effectRef>
+                  <a:fontRef idx="minor">
+                    <a:schemeClr val="tx1"/>
+                  </a:fontRef>
+                </p:style>
+              </p:cxnSp>
+              <p:sp>
+                <p:nvSpPr>
+                  <p:cNvPr id="43" name="ZoneTexte 42"/>
+                  <p:cNvSpPr txBox="1"/>
+                  <p:nvPr/>
+                </p:nvSpPr>
+                <p:spPr>
+                  <a:xfrm>
+                    <a:off x="5786672" y="2785461"/>
+                    <a:ext cx="878065" cy="369332"/>
+                  </a:xfrm>
+                  <a:prstGeom prst="rect">
+                    <a:avLst/>
+                  </a:prstGeom>
+                  <a:noFill/>
+                </p:spPr>
+                <p:txBody>
+                  <a:bodyPr wrap="none" rtlCol="0">
+                    <a:spAutoFit/>
+                  </a:bodyPr>
+                  <a:lstStyle/>
+                  <a:p>
+                    <a:r>
+                      <a:rPr lang="fr-FR" dirty="0" smtClean="0"/>
+                      <a:t>Update</a:t>
+                    </a:r>
+                    <a:endParaRPr lang="fr-FR" dirty="0"/>
+                  </a:p>
+                </p:txBody>
+              </p:sp>
+              <p:sp>
+                <p:nvSpPr>
+                  <p:cNvPr id="44" name="Rectangle 43"/>
+                  <p:cNvSpPr/>
+                  <p:nvPr/>
+                </p:nvSpPr>
+                <p:spPr>
+                  <a:xfrm>
+                    <a:off x="5429358" y="1304379"/>
+                    <a:ext cx="2098639" cy="640747"/>
+                  </a:xfrm>
+                  <a:prstGeom prst="rect">
+                    <a:avLst/>
+                  </a:prstGeom>
+                  <a:solidFill>
+                    <a:schemeClr val="accent1">
+                      <a:lumMod val="20000"/>
+                      <a:lumOff val="80000"/>
+                    </a:schemeClr>
+                  </a:solidFill>
+                  <a:ln>
+                    <a:solidFill>
+                      <a:schemeClr val="tx1"/>
+                    </a:solidFill>
+                  </a:ln>
+                </p:spPr>
+                <p:style>
+                  <a:lnRef idx="1">
+                    <a:schemeClr val="accent1"/>
+                  </a:lnRef>
+                  <a:fillRef idx="3">
+                    <a:schemeClr val="accent1"/>
+                  </a:fillRef>
+                  <a:effectRef idx="2">
+                    <a:schemeClr val="accent1"/>
+                  </a:effectRef>
+                  <a:fontRef idx="minor">
+                    <a:schemeClr val="lt1"/>
+                  </a:fontRef>
+                </p:style>
+                <p:txBody>
+                  <a:bodyPr rtlCol="0" anchor="ctr"/>
+                  <a:lstStyle/>
+                  <a:p>
+                    <a:pPr algn="ctr"/>
+                    <a:r>
+                      <a:rPr lang="fr-FR" dirty="0" err="1" smtClean="0">
+                        <a:solidFill>
+                          <a:schemeClr val="tx1"/>
+                        </a:solidFill>
+                      </a:rPr>
+                      <a:t>Subset</a:t>
+                    </a:r>
+                    <a:r>
+                      <a:rPr lang="fr-FR" dirty="0" smtClean="0">
+                        <a:solidFill>
+                          <a:schemeClr val="tx1"/>
+                        </a:solidFill>
+                      </a:rPr>
+                      <a:t> 026 </a:t>
+                    </a:r>
+                    <a:r>
+                      <a:rPr lang="fr-FR" dirty="0" err="1" smtClean="0">
+                        <a:solidFill>
+                          <a:schemeClr val="tx1"/>
+                        </a:solidFill>
+                      </a:rPr>
+                      <a:t>requirements</a:t>
+                    </a:r>
+                    <a:endParaRPr lang="fr-FR" dirty="0">
+                      <a:solidFill>
+                        <a:schemeClr val="tx1"/>
+                      </a:solidFill>
+                    </a:endParaRPr>
+                  </a:p>
+                </p:txBody>
+              </p:sp>
+              <p:pic>
+                <p:nvPicPr>
+                  <p:cNvPr id="18" name="Image 17"/>
+                  <p:cNvPicPr>
+                    <a:picLocks noChangeAspect="1"/>
+                  </p:cNvPicPr>
+                  <p:nvPr/>
+                </p:nvPicPr>
+                <p:blipFill>
+                  <a:blip r:embed="rId3"/>
+                  <a:stretch>
+                    <a:fillRect/>
+                  </a:stretch>
+                </p:blipFill>
+                <p:spPr>
+                  <a:xfrm>
+                    <a:off x="7108238" y="1044318"/>
+                    <a:ext cx="1106203" cy="455718"/>
+                  </a:xfrm>
+                  <a:prstGeom prst="rect">
+                    <a:avLst/>
+                  </a:prstGeom>
+                </p:spPr>
+              </p:pic>
+              <p:cxnSp>
+                <p:nvCxnSpPr>
+                  <p:cNvPr id="46" name="Connecteur droit avec flèche 45"/>
+                  <p:cNvCxnSpPr>
+                    <a:endCxn id="44" idx="1"/>
+                  </p:cNvCxnSpPr>
+                  <p:nvPr/>
+                </p:nvCxnSpPr>
+                <p:spPr>
+                  <a:xfrm>
+                    <a:off x="3895138" y="1608945"/>
+                    <a:ext cx="1534220" cy="15808"/>
+                  </a:xfrm>
+                  <a:prstGeom prst="straightConnector1">
+                    <a:avLst/>
+                  </a:prstGeom>
+                  <a:ln>
+                    <a:solidFill>
+                      <a:srgbClr val="000000"/>
+                    </a:solidFill>
+                    <a:tailEnd type="stealth" w="lg" len="lg"/>
+                  </a:ln>
+                </p:spPr>
+                <p:style>
+                  <a:lnRef idx="2">
+                    <a:schemeClr val="accent1"/>
+                  </a:lnRef>
+                  <a:fillRef idx="0">
+                    <a:schemeClr val="accent1"/>
+                  </a:fillRef>
+                  <a:effectRef idx="1">
+                    <a:schemeClr val="accent1"/>
+                  </a:effectRef>
+                  <a:fontRef idx="minor">
+                    <a:schemeClr val="tx1"/>
+                  </a:fontRef>
+                </p:style>
+              </p:cxnSp>
+              <p:sp>
+                <p:nvSpPr>
+                  <p:cNvPr id="48" name="ZoneTexte 47"/>
+                  <p:cNvSpPr txBox="1"/>
+                  <p:nvPr/>
+                </p:nvSpPr>
+                <p:spPr>
+                  <a:xfrm>
+                    <a:off x="4128641" y="1239613"/>
+                    <a:ext cx="1300356" cy="369332"/>
+                  </a:xfrm>
+                  <a:prstGeom prst="rect">
+                    <a:avLst/>
+                  </a:prstGeom>
+                  <a:noFill/>
+                </p:spPr>
+                <p:txBody>
+                  <a:bodyPr wrap="none" rtlCol="0">
+                    <a:spAutoFit/>
+                  </a:bodyPr>
+                  <a:lstStyle/>
+                  <a:p>
+                    <a:r>
+                      <a:rPr lang="fr-FR" dirty="0" smtClean="0"/>
+                      <a:t>1.B1 Import</a:t>
+                    </a:r>
+                    <a:endParaRPr lang="fr-FR" dirty="0"/>
+                  </a:p>
+                </p:txBody>
+              </p:sp>
+              <p:cxnSp>
+                <p:nvCxnSpPr>
+                  <p:cNvPr id="49" name="Connecteur droit avec flèche 48"/>
+                  <p:cNvCxnSpPr>
+                    <a:stCxn id="44" idx="2"/>
+                    <a:endCxn id="21" idx="7"/>
+                  </p:cNvCxnSpPr>
+                  <p:nvPr/>
+                </p:nvCxnSpPr>
+                <p:spPr>
+                  <a:xfrm flipH="1">
+                    <a:off x="5429359" y="1945126"/>
+                    <a:ext cx="1049319" cy="975549"/>
+                  </a:xfrm>
+                  <a:prstGeom prst="straightConnector1">
+                    <a:avLst/>
+                  </a:prstGeom>
+                  <a:ln>
+                    <a:solidFill>
+                      <a:srgbClr val="000000"/>
+                    </a:solidFill>
+                    <a:tailEnd type="stealth" w="lg" len="lg"/>
+                  </a:ln>
+                </p:spPr>
+                <p:style>
+                  <a:lnRef idx="2">
+                    <a:schemeClr val="accent1"/>
+                  </a:lnRef>
+                  <a:fillRef idx="0">
+                    <a:schemeClr val="accent1"/>
+                  </a:fillRef>
+                  <a:effectRef idx="1">
+                    <a:schemeClr val="accent1"/>
+                  </a:effectRef>
+                  <a:fontRef idx="minor">
+                    <a:schemeClr val="tx1"/>
+                  </a:fontRef>
+                </p:style>
+              </p:cxnSp>
+              <p:sp>
+                <p:nvSpPr>
+                  <p:cNvPr id="52" name="ZoneTexte 51"/>
+                  <p:cNvSpPr txBox="1"/>
+                  <p:nvPr/>
+                </p:nvSpPr>
+                <p:spPr>
+                  <a:xfrm>
+                    <a:off x="5958682" y="2299825"/>
+                    <a:ext cx="1300356" cy="369332"/>
+                  </a:xfrm>
+                  <a:prstGeom prst="rect">
+                    <a:avLst/>
+                  </a:prstGeom>
+                  <a:noFill/>
+                </p:spPr>
+                <p:txBody>
+                  <a:bodyPr wrap="none" rtlCol="0">
+                    <a:spAutoFit/>
+                  </a:bodyPr>
+                  <a:lstStyle/>
+                  <a:p>
+                    <a:r>
+                      <a:rPr lang="fr-FR" dirty="0" smtClean="0"/>
+                      <a:t>1.B2 Import</a:t>
+                    </a:r>
+                    <a:endParaRPr lang="fr-FR" dirty="0"/>
+                  </a:p>
+                </p:txBody>
+              </p:sp>
+              <p:cxnSp>
+                <p:nvCxnSpPr>
+                  <p:cNvPr id="54" name="Connecteur droit avec flèche 53"/>
+                  <p:cNvCxnSpPr>
+                    <a:stCxn id="27" idx="4"/>
+                    <a:endCxn id="53" idx="0"/>
+                  </p:cNvCxnSpPr>
+                  <p:nvPr/>
+                </p:nvCxnSpPr>
+                <p:spPr>
+                  <a:xfrm>
+                    <a:off x="2642593" y="4952524"/>
+                    <a:ext cx="5192" cy="522197"/>
+                  </a:xfrm>
+                  <a:prstGeom prst="straightConnector1">
+                    <a:avLst/>
+                  </a:prstGeom>
+                  <a:ln>
+                    <a:solidFill>
+                      <a:srgbClr val="000000"/>
+                    </a:solidFill>
+                    <a:tailEnd type="stealth" w="lg" len="lg"/>
+                  </a:ln>
+                </p:spPr>
+                <p:style>
+                  <a:lnRef idx="2">
+                    <a:schemeClr val="accent1"/>
+                  </a:lnRef>
+                  <a:fillRef idx="0">
+                    <a:schemeClr val="accent1"/>
+                  </a:fillRef>
+                  <a:effectRef idx="1">
+                    <a:schemeClr val="accent1"/>
+                  </a:effectRef>
+                  <a:fontRef idx="minor">
+                    <a:schemeClr val="tx1"/>
+                  </a:fontRef>
+                </p:style>
+              </p:cxnSp>
+              <p:sp>
+                <p:nvSpPr>
+                  <p:cNvPr id="59" name="Rectangle 58"/>
+                  <p:cNvSpPr/>
+                  <p:nvPr/>
+                </p:nvSpPr>
+                <p:spPr>
+                  <a:xfrm>
+                    <a:off x="953813" y="2841728"/>
+                    <a:ext cx="1224158" cy="640747"/>
+                  </a:xfrm>
+                  <a:prstGeom prst="rect">
+                    <a:avLst/>
+                  </a:prstGeom>
+                  <a:solidFill>
+                    <a:schemeClr val="accent1">
+                      <a:lumMod val="20000"/>
+                      <a:lumOff val="80000"/>
+                    </a:schemeClr>
+                  </a:solidFill>
+                  <a:ln>
+                    <a:solidFill>
+                      <a:schemeClr val="tx1"/>
+                    </a:solidFill>
+                  </a:ln>
+                </p:spPr>
+                <p:style>
+                  <a:lnRef idx="1">
+                    <a:schemeClr val="accent1"/>
+                  </a:lnRef>
+                  <a:fillRef idx="3">
+                    <a:schemeClr val="accent1"/>
+                  </a:fillRef>
+                  <a:effectRef idx="2">
+                    <a:schemeClr val="accent1"/>
+                  </a:effectRef>
+                  <a:fontRef idx="minor">
+                    <a:schemeClr val="lt1"/>
+                  </a:fontRef>
+                </p:style>
+                <p:txBody>
+                  <a:bodyPr rtlCol="0" anchor="ctr"/>
+                  <a:lstStyle/>
+                  <a:p>
+                    <a:pPr algn="ctr"/>
+                    <a:r>
+                      <a:rPr lang="fr-FR" dirty="0" smtClean="0">
+                        <a:solidFill>
+                          <a:schemeClr val="tx1"/>
+                        </a:solidFill>
+                      </a:rPr>
+                      <a:t>OpenETCS API</a:t>
+                    </a:r>
+                    <a:endParaRPr lang="fr-FR" dirty="0">
+                      <a:solidFill>
+                        <a:schemeClr val="tx1"/>
+                      </a:solidFill>
+                    </a:endParaRPr>
+                  </a:p>
+                </p:txBody>
+              </p:sp>
+              <p:cxnSp>
+                <p:nvCxnSpPr>
+                  <p:cNvPr id="61" name="Connecteur droit avec flèche 60"/>
+                  <p:cNvCxnSpPr>
+                    <a:stCxn id="59" idx="3"/>
+                    <a:endCxn id="21" idx="2"/>
+                  </p:cNvCxnSpPr>
+                  <p:nvPr/>
+                </p:nvCxnSpPr>
+                <p:spPr>
+                  <a:xfrm>
+                    <a:off x="2177971" y="3162102"/>
+                    <a:ext cx="1288569" cy="0"/>
+                  </a:xfrm>
+                  <a:prstGeom prst="straightConnector1">
+                    <a:avLst/>
+                  </a:prstGeom>
+                  <a:ln>
+                    <a:solidFill>
+                      <a:srgbClr val="000000"/>
+                    </a:solidFill>
+                    <a:tailEnd type="stealth" w="lg" len="lg"/>
+                  </a:ln>
+                </p:spPr>
+                <p:style>
+                  <a:lnRef idx="2">
+                    <a:schemeClr val="accent1"/>
+                  </a:lnRef>
+                  <a:fillRef idx="0">
+                    <a:schemeClr val="accent1"/>
+                  </a:fillRef>
+                  <a:effectRef idx="1">
+                    <a:schemeClr val="accent1"/>
+                  </a:effectRef>
+                  <a:fontRef idx="minor">
+                    <a:schemeClr val="tx1"/>
+                  </a:fontRef>
+                </p:style>
+              </p:cxnSp>
+              <p:sp>
+                <p:nvSpPr>
+                  <p:cNvPr id="65" name="ZoneTexte 64"/>
+                  <p:cNvSpPr txBox="1"/>
+                  <p:nvPr/>
+                </p:nvSpPr>
+                <p:spPr>
+                  <a:xfrm>
+                    <a:off x="2280348" y="2736009"/>
+                    <a:ext cx="1056700" cy="369332"/>
+                  </a:xfrm>
+                  <a:prstGeom prst="rect">
+                    <a:avLst/>
+                  </a:prstGeom>
+                  <a:noFill/>
+                </p:spPr>
+                <p:txBody>
+                  <a:bodyPr wrap="none" rtlCol="0">
+                    <a:spAutoFit/>
+                  </a:bodyPr>
+                  <a:lstStyle/>
+                  <a:p>
+                    <a:r>
+                      <a:rPr lang="fr-FR" dirty="0" smtClean="0"/>
+                      <a:t>2. Import</a:t>
+                    </a:r>
+                    <a:endParaRPr lang="fr-FR" dirty="0"/>
+                  </a:p>
+                </p:txBody>
+              </p:sp>
+            </p:grpSp>
+          </p:grpSp>
+          <p:pic>
+            <p:nvPicPr>
+              <p:cNvPr id="66" name="Image 65"/>
+              <p:cNvPicPr>
+                <a:picLocks noChangeAspect="1"/>
+              </p:cNvPicPr>
+              <p:nvPr/>
+            </p:nvPicPr>
+            <p:blipFill>
+              <a:blip r:embed="rId4"/>
+              <a:stretch>
+                <a:fillRect/>
+              </a:stretch>
+            </p:blipFill>
+            <p:spPr>
+              <a:xfrm>
+                <a:off x="7935533" y="2484491"/>
+                <a:ext cx="795600" cy="429624"/>
+              </a:xfrm>
+              <a:prstGeom prst="rect">
+                <a:avLst/>
+              </a:prstGeom>
+              <a:ln>
+                <a:noFill/>
+              </a:ln>
+            </p:spPr>
+          </p:pic>
+        </p:grpSp>
+        <p:sp>
+          <p:nvSpPr>
+            <p:cNvPr id="39" name="Ellipse 38"/>
+            <p:cNvSpPr/>
+            <p:nvPr/>
+          </p:nvSpPr>
+          <p:spPr>
+            <a:xfrm>
+              <a:off x="3945660" y="5531930"/>
+              <a:ext cx="1889109" cy="682860"/>
+            </a:xfrm>
+            <a:prstGeom prst="ellipse">
+              <a:avLst/>
+            </a:prstGeom>
+            <a:solidFill>
+              <a:srgbClr val="CCC1DA"/>
+            </a:solidFill>
+            <a:ln>
+              <a:solidFill>
+                <a:srgbClr val="000000"/>
+              </a:solidFill>
+            </a:ln>
+          </p:spPr>
+          <p:style>
+            <a:lnRef idx="1">
+              <a:schemeClr val="accent1"/>
+            </a:lnRef>
+            <a:fillRef idx="3">
+              <a:schemeClr val="accent1"/>
+            </a:fillRef>
+            <a:effectRef idx="2">
+              <a:schemeClr val="accent1"/>
+            </a:effectRef>
+            <a:fontRef idx="minor">
+              <a:schemeClr val="lt1"/>
+            </a:fontRef>
+          </p:style>
+          <p:txBody>
+            <a:bodyPr rtlCol="0" anchor="ctr"/>
+            <a:lstStyle/>
+            <a:p>
+              <a:pPr algn="ctr"/>
+              <a:r>
+                <a:rPr lang="fr-FR" dirty="0" err="1" smtClean="0">
+                  <a:solidFill>
+                    <a:srgbClr val="000000"/>
+                  </a:solidFill>
+                </a:rPr>
+                <a:t>GenDoc</a:t>
+              </a:r>
+              <a:endParaRPr lang="fr-FR" dirty="0">
+                <a:solidFill>
+                  <a:srgbClr val="000000"/>
+                </a:solidFill>
+              </a:endParaRPr>
+            </a:p>
+          </p:txBody>
+        </p:sp>
+        <p:cxnSp>
+          <p:nvCxnSpPr>
+            <p:cNvPr id="40" name="Connecteur droit avec flèche 39"/>
+            <p:cNvCxnSpPr/>
+            <p:nvPr/>
+          </p:nvCxnSpPr>
+          <p:spPr>
+            <a:xfrm>
+              <a:off x="4854993" y="3501197"/>
+              <a:ext cx="0" cy="2059575"/>
+            </a:xfrm>
+            <a:prstGeom prst="straightConnector1">
+              <a:avLst/>
+            </a:prstGeom>
+            <a:ln>
+              <a:solidFill>
+                <a:srgbClr val="000000"/>
+              </a:solidFill>
+              <a:tailEnd type="stealth" w="lg" len="lg"/>
+            </a:ln>
+          </p:spPr>
+          <p:style>
+            <a:lnRef idx="2">
+              <a:schemeClr val="accent1"/>
+            </a:lnRef>
+            <a:fillRef idx="0">
+              <a:schemeClr val="accent1"/>
+            </a:fillRef>
+            <a:effectRef idx="1">
+              <a:schemeClr val="accent1"/>
+            </a:effectRef>
+            <a:fontRef idx="minor">
+              <a:schemeClr val="tx1"/>
+            </a:fontRef>
+          </p:style>
+        </p:cxnSp>
+        <p:sp>
+          <p:nvSpPr>
+            <p:cNvPr id="41" name="ZoneTexte 40"/>
+            <p:cNvSpPr txBox="1"/>
+            <p:nvPr/>
+          </p:nvSpPr>
+          <p:spPr>
+            <a:xfrm>
+              <a:off x="3823942" y="4503099"/>
+              <a:ext cx="1031051" cy="369332"/>
+            </a:xfrm>
+            <a:prstGeom prst="rect">
+              <a:avLst/>
+            </a:prstGeom>
+            <a:noFill/>
+          </p:spPr>
+          <p:txBody>
+            <a:bodyPr wrap="none" rtlCol="0">
+              <a:spAutoFit/>
+            </a:bodyPr>
+            <a:lstStyle/>
+            <a:p>
+              <a:r>
+                <a:rPr lang="fr-FR" dirty="0"/>
+                <a:t>7</a:t>
+              </a:r>
+              <a:r>
+                <a:rPr lang="fr-FR" dirty="0" smtClean="0"/>
+                <a:t>. export</a:t>
+              </a:r>
+              <a:endParaRPr lang="fr-FR" dirty="0"/>
+            </a:p>
+          </p:txBody>
+        </p:sp>
+        <p:pic>
+          <p:nvPicPr>
+            <p:cNvPr id="42" name="Image 41"/>
+            <p:cNvPicPr>
+              <a:picLocks noChangeAspect="1"/>
+            </p:cNvPicPr>
+            <p:nvPr/>
+          </p:nvPicPr>
+          <p:blipFill>
+            <a:blip r:embed="rId5"/>
+            <a:stretch>
+              <a:fillRect/>
+            </a:stretch>
+          </p:blipFill>
+          <p:spPr>
+            <a:xfrm>
+              <a:off x="4436984" y="4952524"/>
+              <a:ext cx="831894" cy="369332"/>
+            </a:xfrm>
+            <a:prstGeom prst="rect">
+              <a:avLst/>
+            </a:prstGeom>
+          </p:spPr>
+        </p:pic>
+      </p:grpSp>
+    </p:spTree>
+    <p:extLst>
+      <p:ext uri="{BB962C8B-B14F-4D97-AF65-F5344CB8AC3E}">
+        <p14:creationId xmlns:p14="http://schemas.microsoft.com/office/powerpoint/2010/main" val="3972746041"/>
+      </p:ext>
+    </p:extLst>
+  </p:cSld>
+  <p:clrMapOvr>
+    <a:masterClrMapping/>
+  </p:clrMapOvr>
+</p:sld>
+</file>
+
+<file path=ppt/slides/slide12.xml><?xml version="1.0" encoding="utf-8"?>
+<p:sld xmlns:a="http://schemas.openxmlformats.org/drawingml/2006/main" xmlns:r="http://schemas.openxmlformats.org/officeDocument/2006/relationships" xmlns:p="http://schemas.openxmlformats.org/presentationml/2006/main">
+  <p:cSld>
+    <p:spTree>
+      <p:nvGrpSpPr>
+        <p:cNvPr id="1" name=""/>
+        <p:cNvGrpSpPr/>
+        <p:nvPr/>
+      </p:nvGrpSpPr>
+      <p:grpSpPr>
+        <a:xfrm>
+          <a:off x="0" y="0"/>
+          <a:ext cx="0" cy="0"/>
+          <a:chOff x="0" y="0"/>
+          <a:chExt cx="0" cy="0"/>
+        </a:xfrm>
+      </p:grpSpPr>
+      <p:sp>
+        <p:nvSpPr>
+          <p:cNvPr id="2" name="Titre 1"/>
+          <p:cNvSpPr>
+            <a:spLocks noGrp="1"/>
+          </p:cNvSpPr>
+          <p:nvPr>
+            <p:ph type="title"/>
+          </p:nvPr>
+        </p:nvSpPr>
+        <p:spPr>
+          <a:xfrm>
             <a:off x="457200" y="274639"/>
             <a:ext cx="8229600" cy="560622"/>
           </a:xfrm>
@@ -5317,7 +7081,7 @@
           <a:p>
             <a:fld id="{692C3D5F-CF0A-C342-86E8-AC8A51E170D1}" type="slidenum">
               <a:rPr lang="fr-FR" smtClean="0"/>
-              <a:t>10</a:t>
+              <a:t>12</a:t>
             </a:fld>
             <a:endParaRPr lang="fr-FR"/>
           </a:p>
@@ -5791,174 +7555,7 @@
 </p:sld>
 </file>
 
-<file path=ppt/slides/slide11.xml><?xml version="1.0" encoding="utf-8"?>
-<p:sld xmlns:a="http://schemas.openxmlformats.org/drawingml/2006/main" xmlns:r="http://schemas.openxmlformats.org/officeDocument/2006/relationships" xmlns:p="http://schemas.openxmlformats.org/presentationml/2006/main">
-  <p:cSld>
-    <p:spTree>
-      <p:nvGrpSpPr>
-        <p:cNvPr id="1" name=""/>
-        <p:cNvGrpSpPr/>
-        <p:nvPr/>
-      </p:nvGrpSpPr>
-      <p:grpSpPr>
-        <a:xfrm>
-          <a:off x="0" y="0"/>
-          <a:ext cx="0" cy="0"/>
-          <a:chOff x="0" y="0"/>
-          <a:chExt cx="0" cy="0"/>
-        </a:xfrm>
-      </p:grpSpPr>
-      <p:sp>
-        <p:nvSpPr>
-          <p:cNvPr id="2" name="Titre 1"/>
-          <p:cNvSpPr>
-            <a:spLocks noGrp="1"/>
-          </p:cNvSpPr>
-          <p:nvPr>
-            <p:ph type="title"/>
-          </p:nvPr>
-        </p:nvSpPr>
-        <p:spPr/>
-        <p:txBody>
-          <a:bodyPr>
-            <a:normAutofit fontScale="90000"/>
-          </a:bodyPr>
-          <a:lstStyle/>
-          <a:p>
-            <a:r>
-              <a:rPr lang="eu-ES" smtClean="0"/>
-              <a:t>WP3 priorities regarding traceability</a:t>
-            </a:r>
-            <a:endParaRPr lang="eu-ES"/>
-          </a:p>
-        </p:txBody>
-      </p:sp>
-      <p:sp>
-        <p:nvSpPr>
-          <p:cNvPr id="3" name="Espace réservé du contenu 2"/>
-          <p:cNvSpPr>
-            <a:spLocks noGrp="1"/>
-          </p:cNvSpPr>
-          <p:nvPr>
-            <p:ph idx="1"/>
-          </p:nvPr>
-        </p:nvSpPr>
-        <p:spPr>
-          <a:xfrm>
-            <a:off x="457200" y="1600200"/>
-            <a:ext cx="8535210" cy="4525963"/>
-          </a:xfrm>
-        </p:spPr>
-        <p:txBody>
-          <a:bodyPr/>
-          <a:lstStyle/>
-          <a:p>
-            <a:r>
-              <a:rPr lang="eu-ES" smtClean="0"/>
-              <a:t>Urgent: Scade model to SRS traceability</a:t>
-            </a:r>
-          </a:p>
-          <a:p>
-            <a:pPr lvl="1"/>
-            <a:r>
-              <a:rPr lang="eu-ES" smtClean="0"/>
-              <a:t>Either through ReqTify tool</a:t>
-            </a:r>
-          </a:p>
-          <a:p>
-            <a:pPr lvl="1"/>
-            <a:r>
-              <a:rPr lang="eu-ES" smtClean="0"/>
-              <a:t>Else (ideally) through open source solution</a:t>
-            </a:r>
-          </a:p>
-          <a:p>
-            <a:pPr lvl="1"/>
-            <a:endParaRPr lang="eu-ES" smtClean="0"/>
-          </a:p>
-          <a:p>
-            <a:r>
-              <a:rPr lang="eu-ES" smtClean="0"/>
-              <a:t>Nice to have: SysML model to SRS traeability</a:t>
-            </a:r>
-          </a:p>
-          <a:p>
-            <a:pPr lvl="1"/>
-            <a:r>
-              <a:rPr lang="eu-ES" smtClean="0"/>
-              <a:t>Either through ReqIF/ReqCycle</a:t>
-            </a:r>
-          </a:p>
-          <a:p>
-            <a:pPr lvl="1"/>
-            <a:r>
-              <a:rPr lang="eu-ES" smtClean="0"/>
-              <a:t>Else through other open source chain</a:t>
-            </a:r>
-            <a:endParaRPr lang="eu-ES"/>
-          </a:p>
-        </p:txBody>
-      </p:sp>
-      <p:sp>
-        <p:nvSpPr>
-          <p:cNvPr id="4" name="Espace réservé de la date 3"/>
-          <p:cNvSpPr>
-            <a:spLocks noGrp="1"/>
-          </p:cNvSpPr>
-          <p:nvPr>
-            <p:ph type="dt" sz="half" idx="10"/>
-          </p:nvPr>
-        </p:nvSpPr>
-        <p:spPr/>
-        <p:txBody>
-          <a:bodyPr/>
-          <a:lstStyle/>
-          <a:p>
-            <a:r>
-              <a:rPr lang="fr-FR" smtClean="0"/>
-              <a:t>28/09/2015</a:t>
-            </a:r>
-            <a:endParaRPr lang="fr-FR"/>
-          </a:p>
-        </p:txBody>
-      </p:sp>
-      <p:sp>
-        <p:nvSpPr>
-          <p:cNvPr id="5" name="Espace réservé du numéro de diapositive 4"/>
-          <p:cNvSpPr>
-            <a:spLocks noGrp="1"/>
-          </p:cNvSpPr>
-          <p:nvPr>
-            <p:ph type="sldNum" sz="quarter" idx="12"/>
-          </p:nvPr>
-        </p:nvSpPr>
-        <p:spPr/>
-        <p:txBody>
-          <a:bodyPr/>
-          <a:lstStyle/>
-          <a:p>
-            <a:fld id="{692C3D5F-CF0A-C342-86E8-AC8A51E170D1}" type="slidenum">
-              <a:rPr lang="fr-FR" smtClean="0"/>
-              <a:t>11</a:t>
-            </a:fld>
-            <a:endParaRPr lang="fr-FR"/>
-          </a:p>
-        </p:txBody>
-      </p:sp>
-    </p:spTree>
-    <p:extLst>
-      <p:ext uri="{BB962C8B-B14F-4D97-AF65-F5344CB8AC3E}">
-        <p14:creationId xmlns:p14="http://schemas.microsoft.com/office/powerpoint/2010/main" val="3777682253"/>
-      </p:ext>
-    </p:extLst>
-  </p:cSld>
-  <p:clrMapOvr>
-    <a:masterClrMapping/>
-  </p:clrMapOvr>
-</p:sld>
-</file>
-
-<file path=ppt/slides/slide12.xml><?xml version="1.0" encoding="utf-8"?>
+<file path=ppt/slides/slide13.xml><?xml version="1.0" encoding="utf-8"?>
 <p:sld xmlns:a="http://schemas.openxmlformats.org/drawingml/2006/main" xmlns:r="http://schemas.openxmlformats.org/officeDocument/2006/relationships" xmlns:p="http://schemas.openxmlformats.org/presentationml/2006/main">
   <p:cSld>
     <p:spTree>
@@ -6057,7 +7654,7 @@
           <a:p>
             <a:fld id="{692C3D5F-CF0A-C342-86E8-AC8A51E170D1}" type="slidenum">
               <a:rPr lang="fr-FR" smtClean="0"/>
-              <a:t>12</a:t>
+              <a:t>13</a:t>
             </a:fld>
             <a:endParaRPr lang="fr-FR"/>
           </a:p>
@@ -6076,7 +7673,7 @@
 </p:sld>
 </file>
 
-<file path=ppt/slides/slide13.xml><?xml version="1.0" encoding="utf-8"?>
+<file path=ppt/slides/slide14.xml><?xml version="1.0" encoding="utf-8"?>
 <p:sld xmlns:a="http://schemas.openxmlformats.org/drawingml/2006/main" xmlns:r="http://schemas.openxmlformats.org/officeDocument/2006/relationships" xmlns:p="http://schemas.openxmlformats.org/presentationml/2006/main">
   <p:cSld>
     <p:spTree>
@@ -10977,7 +12574,7 @@
 </p:sld>
 </file>
 
-<file path=ppt/slides/slide14.xml><?xml version="1.0" encoding="utf-8"?>
+<file path=ppt/slides/slide15.xml><?xml version="1.0" encoding="utf-8"?>
 <p:sld xmlns:a="http://schemas.openxmlformats.org/drawingml/2006/main" xmlns:r="http://schemas.openxmlformats.org/officeDocument/2006/relationships" xmlns:p="http://schemas.openxmlformats.org/presentationml/2006/main">
   <p:cSld>
     <p:spTree>
@@ -29143,6 +30740,173 @@
             <p:ph type="title"/>
           </p:nvPr>
         </p:nvSpPr>
+        <p:spPr/>
+        <p:txBody>
+          <a:bodyPr>
+            <a:normAutofit fontScale="90000"/>
+          </a:bodyPr>
+          <a:lstStyle/>
+          <a:p>
+            <a:r>
+              <a:rPr lang="eu-ES" smtClean="0"/>
+              <a:t>WP3 priorities regarding traceability</a:t>
+            </a:r>
+            <a:endParaRPr lang="eu-ES"/>
+          </a:p>
+        </p:txBody>
+      </p:sp>
+      <p:sp>
+        <p:nvSpPr>
+          <p:cNvPr id="3" name="Espace réservé du contenu 2"/>
+          <p:cNvSpPr>
+            <a:spLocks noGrp="1"/>
+          </p:cNvSpPr>
+          <p:nvPr>
+            <p:ph idx="1"/>
+          </p:nvPr>
+        </p:nvSpPr>
+        <p:spPr>
+          <a:xfrm>
+            <a:off x="457200" y="1600200"/>
+            <a:ext cx="8535210" cy="4525963"/>
+          </a:xfrm>
+        </p:spPr>
+        <p:txBody>
+          <a:bodyPr/>
+          <a:lstStyle/>
+          <a:p>
+            <a:r>
+              <a:rPr lang="eu-ES" smtClean="0"/>
+              <a:t>Urgent: Scade model to SRS traceability</a:t>
+            </a:r>
+          </a:p>
+          <a:p>
+            <a:pPr lvl="1"/>
+            <a:r>
+              <a:rPr lang="eu-ES" smtClean="0"/>
+              <a:t>Either through ReqTify tool</a:t>
+            </a:r>
+          </a:p>
+          <a:p>
+            <a:pPr lvl="1"/>
+            <a:r>
+              <a:rPr lang="eu-ES" smtClean="0"/>
+              <a:t>Else (ideally) through open source solution</a:t>
+            </a:r>
+          </a:p>
+          <a:p>
+            <a:pPr lvl="1"/>
+            <a:endParaRPr lang="eu-ES" smtClean="0"/>
+          </a:p>
+          <a:p>
+            <a:r>
+              <a:rPr lang="eu-ES" smtClean="0"/>
+              <a:t>Nice to have: SysML model to SRS traeability</a:t>
+            </a:r>
+          </a:p>
+          <a:p>
+            <a:pPr lvl="1"/>
+            <a:r>
+              <a:rPr lang="eu-ES" smtClean="0"/>
+              <a:t>Either through ReqIF/ReqCycle</a:t>
+            </a:r>
+          </a:p>
+          <a:p>
+            <a:pPr lvl="1"/>
+            <a:r>
+              <a:rPr lang="eu-ES" smtClean="0"/>
+              <a:t>Else through other open source chain</a:t>
+            </a:r>
+            <a:endParaRPr lang="eu-ES"/>
+          </a:p>
+        </p:txBody>
+      </p:sp>
+      <p:sp>
+        <p:nvSpPr>
+          <p:cNvPr id="4" name="Espace réservé de la date 3"/>
+          <p:cNvSpPr>
+            <a:spLocks noGrp="1"/>
+          </p:cNvSpPr>
+          <p:nvPr>
+            <p:ph type="dt" sz="half" idx="10"/>
+          </p:nvPr>
+        </p:nvSpPr>
+        <p:spPr/>
+        <p:txBody>
+          <a:bodyPr/>
+          <a:lstStyle/>
+          <a:p>
+            <a:r>
+              <a:rPr lang="fr-FR" smtClean="0"/>
+              <a:t>28/09/2015</a:t>
+            </a:r>
+            <a:endParaRPr lang="fr-FR"/>
+          </a:p>
+        </p:txBody>
+      </p:sp>
+      <p:sp>
+        <p:nvSpPr>
+          <p:cNvPr id="5" name="Espace réservé du numéro de diapositive 4"/>
+          <p:cNvSpPr>
+            <a:spLocks noGrp="1"/>
+          </p:cNvSpPr>
+          <p:nvPr>
+            <p:ph type="sldNum" sz="quarter" idx="12"/>
+          </p:nvPr>
+        </p:nvSpPr>
+        <p:spPr/>
+        <p:txBody>
+          <a:bodyPr/>
+          <a:lstStyle/>
+          <a:p>
+            <a:fld id="{692C3D5F-CF0A-C342-86E8-AC8A51E170D1}" type="slidenum">
+              <a:rPr lang="fr-FR" smtClean="0"/>
+              <a:t>7</a:t>
+            </a:fld>
+            <a:endParaRPr lang="fr-FR"/>
+          </a:p>
+        </p:txBody>
+      </p:sp>
+    </p:spTree>
+    <p:extLst>
+      <p:ext uri="{BB962C8B-B14F-4D97-AF65-F5344CB8AC3E}">
+        <p14:creationId xmlns:p14="http://schemas.microsoft.com/office/powerpoint/2010/main" val="3777682253"/>
+      </p:ext>
+    </p:extLst>
+  </p:cSld>
+  <p:clrMapOvr>
+    <a:masterClrMapping/>
+  </p:clrMapOvr>
+</p:sld>
+</file>
+
+<file path=ppt/slides/slide8.xml><?xml version="1.0" encoding="utf-8"?>
+<p:sld xmlns:a="http://schemas.openxmlformats.org/drawingml/2006/main" xmlns:r="http://schemas.openxmlformats.org/officeDocument/2006/relationships" xmlns:p="http://schemas.openxmlformats.org/presentationml/2006/main">
+  <p:cSld>
+    <p:spTree>
+      <p:nvGrpSpPr>
+        <p:cNvPr id="1" name=""/>
+        <p:cNvGrpSpPr/>
+        <p:nvPr/>
+      </p:nvGrpSpPr>
+      <p:grpSpPr>
+        <a:xfrm>
+          <a:off x="0" y="0"/>
+          <a:ext cx="0" cy="0"/>
+          <a:chOff x="0" y="0"/>
+          <a:chExt cx="0" cy="0"/>
+        </a:xfrm>
+      </p:grpSpPr>
+      <p:sp>
+        <p:nvSpPr>
+          <p:cNvPr id="2" name="Titre 1"/>
+          <p:cNvSpPr>
+            <a:spLocks noGrp="1"/>
+          </p:cNvSpPr>
+          <p:nvPr>
+            <p:ph type="title"/>
+          </p:nvPr>
+        </p:nvSpPr>
         <p:spPr>
           <a:xfrm>
             <a:off x="182463" y="252032"/>
@@ -30082,7 +31846,7 @@
 </p:sld>
 </file>
 
-<file path=ppt/slides/slide8.xml><?xml version="1.0" encoding="utf-8"?>
+<file path=ppt/slides/slide9.xml><?xml version="1.0" encoding="utf-8"?>
 <p:sld xmlns:a="http://schemas.openxmlformats.org/drawingml/2006/main" xmlns:r="http://schemas.openxmlformats.org/officeDocument/2006/relationships" xmlns:p="http://schemas.openxmlformats.org/presentationml/2006/main">
   <p:cSld>
     <p:spTree>
@@ -30194,7 +31958,7 @@
           <a:p>
             <a:fld id="{692C3D5F-CF0A-C342-86E8-AC8A51E170D1}" type="slidenum">
               <a:rPr lang="fr-FR" smtClean="0"/>
-              <a:t>8</a:t>
+              <a:t>9</a:t>
             </a:fld>
             <a:endParaRPr lang="fr-FR"/>
           </a:p>
@@ -31658,1430 +33422,6 @@
 </p:sld>
 </file>
 
-<file path=ppt/slides/slide9.xml><?xml version="1.0" encoding="utf-8"?>
-<p:sld xmlns:a="http://schemas.openxmlformats.org/drawingml/2006/main" xmlns:r="http://schemas.openxmlformats.org/officeDocument/2006/relationships" xmlns:p="http://schemas.openxmlformats.org/presentationml/2006/main">
-  <p:cSld>
-    <p:spTree>
-      <p:nvGrpSpPr>
-        <p:cNvPr id="1" name=""/>
-        <p:cNvGrpSpPr/>
-        <p:nvPr/>
-      </p:nvGrpSpPr>
-      <p:grpSpPr>
-        <a:xfrm>
-          <a:off x="0" y="0"/>
-          <a:ext cx="0" cy="0"/>
-          <a:chOff x="0" y="0"/>
-          <a:chExt cx="0" cy="0"/>
-        </a:xfrm>
-      </p:grpSpPr>
-      <p:sp>
-        <p:nvSpPr>
-          <p:cNvPr id="2" name="Titre 1"/>
-          <p:cNvSpPr>
-            <a:spLocks noGrp="1"/>
-          </p:cNvSpPr>
-          <p:nvPr>
-            <p:ph type="title"/>
-          </p:nvPr>
-        </p:nvSpPr>
-        <p:spPr>
-          <a:xfrm>
-            <a:off x="501533" y="274639"/>
-            <a:ext cx="8229600" cy="549180"/>
-          </a:xfrm>
-        </p:spPr>
-        <p:txBody>
-          <a:bodyPr>
-            <a:normAutofit fontScale="90000"/>
-          </a:bodyPr>
-          <a:lstStyle/>
-          <a:p>
-            <a:r>
-              <a:rPr lang="fr-FR" dirty="0" smtClean="0"/>
-              <a:t>3rd solution – ReqCycle </a:t>
-            </a:r>
-            <a:r>
-              <a:rPr lang="fr-FR" dirty="0" err="1" smtClean="0"/>
-              <a:t>only</a:t>
-            </a:r>
-            <a:endParaRPr lang="fr-FR" dirty="0"/>
-          </a:p>
-        </p:txBody>
-      </p:sp>
-      <p:sp>
-        <p:nvSpPr>
-          <p:cNvPr id="4" name="Espace réservé de la date 3"/>
-          <p:cNvSpPr>
-            <a:spLocks noGrp="1"/>
-          </p:cNvSpPr>
-          <p:nvPr>
-            <p:ph type="dt" sz="half" idx="10"/>
-          </p:nvPr>
-        </p:nvSpPr>
-        <p:spPr/>
-        <p:txBody>
-          <a:bodyPr/>
-          <a:lstStyle/>
-          <a:p>
-            <a:r>
-              <a:rPr lang="fr-FR" smtClean="0"/>
-              <a:t>28/09/2015</a:t>
-            </a:r>
-            <a:endParaRPr lang="fr-FR"/>
-          </a:p>
-        </p:txBody>
-      </p:sp>
-      <p:sp>
-        <p:nvSpPr>
-          <p:cNvPr id="5" name="Espace réservé du numéro de diapositive 4"/>
-          <p:cNvSpPr>
-            <a:spLocks noGrp="1"/>
-          </p:cNvSpPr>
-          <p:nvPr>
-            <p:ph type="sldNum" sz="quarter" idx="12"/>
-          </p:nvPr>
-        </p:nvSpPr>
-        <p:spPr/>
-        <p:txBody>
-          <a:bodyPr/>
-          <a:lstStyle/>
-          <a:p>
-            <a:fld id="{692C3D5F-CF0A-C342-86E8-AC8A51E170D1}" type="slidenum">
-              <a:rPr lang="fr-FR" smtClean="0"/>
-              <a:t>9</a:t>
-            </a:fld>
-            <a:endParaRPr lang="fr-FR"/>
-          </a:p>
-        </p:txBody>
-      </p:sp>
-      <p:grpSp>
-        <p:nvGrpSpPr>
-          <p:cNvPr id="69" name="Grouper 68"/>
-          <p:cNvGrpSpPr/>
-          <p:nvPr/>
-        </p:nvGrpSpPr>
-        <p:grpSpPr>
-          <a:xfrm>
-            <a:off x="953813" y="1044318"/>
-            <a:ext cx="7866986" cy="5113263"/>
-            <a:chOff x="953813" y="1044318"/>
-            <a:chExt cx="7866986" cy="5113263"/>
-          </a:xfrm>
-        </p:grpSpPr>
-        <p:grpSp>
-          <p:nvGrpSpPr>
-            <p:cNvPr id="68" name="Grouper 67"/>
-            <p:cNvGrpSpPr/>
-            <p:nvPr/>
-          </p:nvGrpSpPr>
-          <p:grpSpPr>
-            <a:xfrm>
-              <a:off x="953813" y="1044318"/>
-              <a:ext cx="7866986" cy="5113263"/>
-              <a:chOff x="953813" y="1044318"/>
-              <a:chExt cx="7866986" cy="5113263"/>
-            </a:xfrm>
-          </p:grpSpPr>
-          <p:sp>
-            <p:nvSpPr>
-              <p:cNvPr id="53" name="Ellipse 52"/>
-              <p:cNvSpPr/>
-              <p:nvPr/>
-            </p:nvSpPr>
-            <p:spPr>
-              <a:xfrm>
-                <a:off x="1565892" y="5474721"/>
-                <a:ext cx="2163785" cy="682860"/>
-              </a:xfrm>
-              <a:prstGeom prst="ellipse">
-                <a:avLst/>
-              </a:prstGeom>
-              <a:solidFill>
-                <a:srgbClr val="CCC1DA"/>
-              </a:solidFill>
-              <a:ln>
-                <a:solidFill>
-                  <a:srgbClr val="000000"/>
-                </a:solidFill>
-              </a:ln>
-            </p:spPr>
-            <p:style>
-              <a:lnRef idx="1">
-                <a:schemeClr val="accent1"/>
-              </a:lnRef>
-              <a:fillRef idx="3">
-                <a:schemeClr val="accent1"/>
-              </a:fillRef>
-              <a:effectRef idx="2">
-                <a:schemeClr val="accent1"/>
-              </a:effectRef>
-              <a:fontRef idx="minor">
-                <a:schemeClr val="lt1"/>
-              </a:fontRef>
-            </p:style>
-            <p:txBody>
-              <a:bodyPr rtlCol="0" anchor="ctr"/>
-              <a:lstStyle/>
-              <a:p>
-                <a:pPr algn="ctr"/>
-                <a:r>
-                  <a:rPr lang="fr-FR" dirty="0" smtClean="0">
-                    <a:solidFill>
-                      <a:srgbClr val="000000"/>
-                    </a:solidFill>
-                  </a:rPr>
-                  <a:t>RT-tester</a:t>
-                </a:r>
-                <a:endParaRPr lang="fr-FR" dirty="0">
-                  <a:solidFill>
-                    <a:srgbClr val="000000"/>
-                  </a:solidFill>
-                </a:endParaRPr>
-              </a:p>
-            </p:txBody>
-          </p:sp>
-          <p:grpSp>
-            <p:nvGrpSpPr>
-              <p:cNvPr id="67" name="Grouper 66"/>
-              <p:cNvGrpSpPr/>
-              <p:nvPr/>
-            </p:nvGrpSpPr>
-            <p:grpSpPr>
-              <a:xfrm>
-                <a:off x="953813" y="1044318"/>
-                <a:ext cx="7866986" cy="4430403"/>
-                <a:chOff x="953813" y="1044318"/>
-                <a:chExt cx="7866986" cy="4430403"/>
-              </a:xfrm>
-            </p:grpSpPr>
-            <p:cxnSp>
-              <p:nvCxnSpPr>
-                <p:cNvPr id="9" name="Connecteur droit avec flèche 8"/>
-                <p:cNvCxnSpPr>
-                  <a:stCxn id="6" idx="2"/>
-                  <a:endCxn id="21" idx="0"/>
-                </p:cNvCxnSpPr>
-                <p:nvPr/>
-              </p:nvCxnSpPr>
-              <p:spPr>
-                <a:xfrm>
-                  <a:off x="3283059" y="1945126"/>
-                  <a:ext cx="1333274" cy="875546"/>
-                </a:xfrm>
-                <a:prstGeom prst="straightConnector1">
-                  <a:avLst/>
-                </a:prstGeom>
-                <a:ln>
-                  <a:solidFill>
-                    <a:srgbClr val="000000"/>
-                  </a:solidFill>
-                  <a:tailEnd type="stealth" w="lg" len="lg"/>
-                </a:ln>
-              </p:spPr>
-              <p:style>
-                <a:lnRef idx="2">
-                  <a:schemeClr val="accent1"/>
-                </a:lnRef>
-                <a:fillRef idx="0">
-                  <a:schemeClr val="accent1"/>
-                </a:fillRef>
-                <a:effectRef idx="1">
-                  <a:schemeClr val="accent1"/>
-                </a:effectRef>
-                <a:fontRef idx="minor">
-                  <a:schemeClr val="tx1"/>
-                </a:fontRef>
-              </p:style>
-            </p:cxnSp>
-            <p:sp>
-              <p:nvSpPr>
-                <p:cNvPr id="11" name="ZoneTexte 10"/>
-                <p:cNvSpPr txBox="1"/>
-                <p:nvPr/>
-              </p:nvSpPr>
-              <p:spPr>
-                <a:xfrm>
-                  <a:off x="4087983" y="2115159"/>
-                  <a:ext cx="1189035" cy="369332"/>
-                </a:xfrm>
-                <a:prstGeom prst="rect">
-                  <a:avLst/>
-                </a:prstGeom>
-                <a:noFill/>
-              </p:spPr>
-              <p:txBody>
-                <a:bodyPr wrap="none" rtlCol="0">
-                  <a:spAutoFit/>
-                </a:bodyPr>
-                <a:lstStyle/>
-                <a:p>
-                  <a:r>
-                    <a:rPr lang="fr-FR" dirty="0" smtClean="0"/>
-                    <a:t>1.A Import</a:t>
-                  </a:r>
-                  <a:endParaRPr lang="fr-FR" dirty="0"/>
-                </a:p>
-              </p:txBody>
-            </p:sp>
-            <p:grpSp>
-              <p:nvGrpSpPr>
-                <p:cNvPr id="45" name="Grouper 44"/>
-                <p:cNvGrpSpPr/>
-                <p:nvPr/>
-              </p:nvGrpSpPr>
-              <p:grpSpPr>
-                <a:xfrm>
-                  <a:off x="2521821" y="1107126"/>
-                  <a:ext cx="1373317" cy="838000"/>
-                  <a:chOff x="3855095" y="1107126"/>
-                  <a:chExt cx="1373317" cy="838000"/>
-                </a:xfrm>
-              </p:grpSpPr>
-              <p:sp>
-                <p:nvSpPr>
-                  <p:cNvPr id="6" name="Rectangle 5"/>
-                  <p:cNvSpPr/>
-                  <p:nvPr/>
-                </p:nvSpPr>
-                <p:spPr>
-                  <a:xfrm>
-                    <a:off x="4004254" y="1304379"/>
-                    <a:ext cx="1224158" cy="640747"/>
-                  </a:xfrm>
-                  <a:prstGeom prst="rect">
-                    <a:avLst/>
-                  </a:prstGeom>
-                  <a:solidFill>
-                    <a:schemeClr val="accent1">
-                      <a:lumMod val="20000"/>
-                      <a:lumOff val="80000"/>
-                    </a:schemeClr>
-                  </a:solidFill>
-                  <a:ln>
-                    <a:solidFill>
-                      <a:schemeClr val="tx1"/>
-                    </a:solidFill>
-                  </a:ln>
-                </p:spPr>
-                <p:style>
-                  <a:lnRef idx="1">
-                    <a:schemeClr val="accent1"/>
-                  </a:lnRef>
-                  <a:fillRef idx="3">
-                    <a:schemeClr val="accent1"/>
-                  </a:fillRef>
-                  <a:effectRef idx="2">
-                    <a:schemeClr val="accent1"/>
-                  </a:effectRef>
-                  <a:fontRef idx="minor">
-                    <a:schemeClr val="lt1"/>
-                  </a:fontRef>
-                </p:style>
-                <p:txBody>
-                  <a:bodyPr rtlCol="0" anchor="ctr"/>
-                  <a:lstStyle/>
-                  <a:p>
-                    <a:pPr algn="ctr"/>
-                    <a:r>
-                      <a:rPr lang="fr-FR" dirty="0" err="1" smtClean="0">
-                        <a:solidFill>
-                          <a:schemeClr val="tx1"/>
-                        </a:solidFill>
-                      </a:rPr>
-                      <a:t>Subset</a:t>
-                    </a:r>
-                    <a:r>
-                      <a:rPr lang="fr-FR" dirty="0" smtClean="0">
-                        <a:solidFill>
-                          <a:schemeClr val="tx1"/>
-                        </a:solidFill>
-                      </a:rPr>
-                      <a:t> 026</a:t>
-                    </a:r>
-                    <a:endParaRPr lang="fr-FR" dirty="0">
-                      <a:solidFill>
-                        <a:schemeClr val="tx1"/>
-                      </a:solidFill>
-                    </a:endParaRPr>
-                  </a:p>
-                </p:txBody>
-              </p:sp>
-              <p:pic>
-                <p:nvPicPr>
-                  <p:cNvPr id="12" name="Image 11"/>
-                  <p:cNvPicPr>
-                    <a:picLocks noChangeAspect="1"/>
-                  </p:cNvPicPr>
-                  <p:nvPr/>
-                </p:nvPicPr>
-                <p:blipFill>
-                  <a:blip r:embed="rId2"/>
-                  <a:stretch>
-                    <a:fillRect/>
-                  </a:stretch>
-                </p:blipFill>
-                <p:spPr>
-                  <a:xfrm>
-                    <a:off x="3855095" y="1107126"/>
-                    <a:ext cx="394505" cy="394505"/>
-                  </a:xfrm>
-                  <a:prstGeom prst="rect">
-                    <a:avLst/>
-                  </a:prstGeom>
-                </p:spPr>
-              </p:pic>
-            </p:grpSp>
-            <p:sp>
-              <p:nvSpPr>
-                <p:cNvPr id="21" name="Ellipse 20"/>
-                <p:cNvSpPr/>
-                <p:nvPr/>
-              </p:nvSpPr>
-              <p:spPr>
-                <a:xfrm>
-                  <a:off x="3466540" y="2820672"/>
-                  <a:ext cx="2299586" cy="682860"/>
-                </a:xfrm>
-                <a:prstGeom prst="ellipse">
-                  <a:avLst/>
-                </a:prstGeom>
-                <a:solidFill>
-                  <a:srgbClr val="CCC1DA"/>
-                </a:solidFill>
-                <a:ln>
-                  <a:solidFill>
-                    <a:srgbClr val="000000"/>
-                  </a:solidFill>
-                </a:ln>
-              </p:spPr>
-              <p:style>
-                <a:lnRef idx="1">
-                  <a:schemeClr val="accent1"/>
-                </a:lnRef>
-                <a:fillRef idx="3">
-                  <a:schemeClr val="accent1"/>
-                </a:fillRef>
-                <a:effectRef idx="2">
-                  <a:schemeClr val="accent1"/>
-                </a:effectRef>
-                <a:fontRef idx="minor">
-                  <a:schemeClr val="lt1"/>
-                </a:fontRef>
-              </p:style>
-              <p:txBody>
-                <a:bodyPr rtlCol="0" anchor="ctr"/>
-                <a:lstStyle/>
-                <a:p>
-                  <a:pPr algn="ctr"/>
-                  <a:r>
-                    <a:rPr lang="fr-FR" dirty="0" smtClean="0">
-                      <a:solidFill>
-                        <a:srgbClr val="000000"/>
-                      </a:solidFill>
-                    </a:rPr>
-                    <a:t>ReqCycle</a:t>
-                  </a:r>
-                  <a:endParaRPr lang="fr-FR" dirty="0">
-                    <a:solidFill>
-                      <a:srgbClr val="000000"/>
-                    </a:solidFill>
-                  </a:endParaRPr>
-                </a:p>
-              </p:txBody>
-            </p:sp>
-            <p:sp>
-              <p:nvSpPr>
-                <p:cNvPr id="26" name="Ellipse 25"/>
-                <p:cNvSpPr/>
-                <p:nvPr/>
-              </p:nvSpPr>
-              <p:spPr>
-                <a:xfrm>
-                  <a:off x="5228412" y="4269664"/>
-                  <a:ext cx="2299586" cy="682860"/>
-                </a:xfrm>
-                <a:prstGeom prst="ellipse">
-                  <a:avLst/>
-                </a:prstGeom>
-                <a:solidFill>
-                  <a:srgbClr val="CCC1DA"/>
-                </a:solidFill>
-                <a:ln>
-                  <a:solidFill>
-                    <a:srgbClr val="000000"/>
-                  </a:solidFill>
-                </a:ln>
-              </p:spPr>
-              <p:style>
-                <a:lnRef idx="1">
-                  <a:schemeClr val="accent1"/>
-                </a:lnRef>
-                <a:fillRef idx="3">
-                  <a:schemeClr val="accent1"/>
-                </a:fillRef>
-                <a:effectRef idx="2">
-                  <a:schemeClr val="accent1"/>
-                </a:effectRef>
-                <a:fontRef idx="minor">
-                  <a:schemeClr val="lt1"/>
-                </a:fontRef>
-              </p:style>
-              <p:txBody>
-                <a:bodyPr rtlCol="0" anchor="ctr"/>
-                <a:lstStyle/>
-                <a:p>
-                  <a:pPr algn="ctr"/>
-                  <a:r>
-                    <a:rPr lang="fr-FR" dirty="0" smtClean="0">
-                      <a:solidFill>
-                        <a:srgbClr val="000000"/>
-                      </a:solidFill>
-                    </a:rPr>
-                    <a:t>SCADE</a:t>
-                  </a:r>
-                  <a:endParaRPr lang="fr-FR" dirty="0">
-                    <a:solidFill>
-                      <a:srgbClr val="000000"/>
-                    </a:solidFill>
-                  </a:endParaRPr>
-                </a:p>
-              </p:txBody>
-            </p:sp>
-            <p:sp>
-              <p:nvSpPr>
-                <p:cNvPr id="27" name="Ellipse 26"/>
-                <p:cNvSpPr/>
-                <p:nvPr/>
-              </p:nvSpPr>
-              <p:spPr>
-                <a:xfrm>
-                  <a:off x="1555509" y="4269664"/>
-                  <a:ext cx="2174168" cy="682860"/>
-                </a:xfrm>
-                <a:prstGeom prst="ellipse">
-                  <a:avLst/>
-                </a:prstGeom>
-                <a:solidFill>
-                  <a:srgbClr val="CCC1DA"/>
-                </a:solidFill>
-                <a:ln>
-                  <a:solidFill>
-                    <a:srgbClr val="000000"/>
-                  </a:solidFill>
-                </a:ln>
-              </p:spPr>
-              <p:style>
-                <a:lnRef idx="1">
-                  <a:schemeClr val="accent1"/>
-                </a:lnRef>
-                <a:fillRef idx="3">
-                  <a:schemeClr val="accent1"/>
-                </a:fillRef>
-                <a:effectRef idx="2">
-                  <a:schemeClr val="accent1"/>
-                </a:effectRef>
-                <a:fontRef idx="minor">
-                  <a:schemeClr val="lt1"/>
-                </a:fontRef>
-              </p:style>
-              <p:txBody>
-                <a:bodyPr rtlCol="0" anchor="ctr"/>
-                <a:lstStyle/>
-                <a:p>
-                  <a:pPr algn="ctr"/>
-                  <a:r>
-                    <a:rPr lang="fr-FR" dirty="0" smtClean="0">
-                      <a:solidFill>
-                        <a:srgbClr val="000000"/>
-                      </a:solidFill>
-                    </a:rPr>
-                    <a:t>Papyrus</a:t>
-                  </a:r>
-                  <a:endParaRPr lang="fr-FR" dirty="0">
-                    <a:solidFill>
-                      <a:srgbClr val="000000"/>
-                    </a:solidFill>
-                  </a:endParaRPr>
-                </a:p>
-              </p:txBody>
-            </p:sp>
-            <p:cxnSp>
-              <p:nvCxnSpPr>
-                <p:cNvPr id="29" name="Connecteur droit avec flèche 28"/>
-                <p:cNvCxnSpPr>
-                  <a:endCxn id="27" idx="7"/>
-                </p:cNvCxnSpPr>
-                <p:nvPr/>
-              </p:nvCxnSpPr>
-              <p:spPr>
-                <a:xfrm flipH="1">
-                  <a:off x="3411277" y="3503532"/>
-                  <a:ext cx="970522" cy="866135"/>
-                </a:xfrm>
-                <a:prstGeom prst="straightConnector1">
-                  <a:avLst/>
-                </a:prstGeom>
-                <a:ln>
-                  <a:solidFill>
-                    <a:srgbClr val="008000"/>
-                  </a:solidFill>
-                  <a:headEnd type="stealth" w="lg" len="lg"/>
-                  <a:tailEnd type="stealth" w="lg" len="lg"/>
-                </a:ln>
-              </p:spPr>
-              <p:style>
-                <a:lnRef idx="2">
-                  <a:schemeClr val="accent1"/>
-                </a:lnRef>
-                <a:fillRef idx="0">
-                  <a:schemeClr val="accent1"/>
-                </a:fillRef>
-                <a:effectRef idx="1">
-                  <a:schemeClr val="accent1"/>
-                </a:effectRef>
-                <a:fontRef idx="minor">
-                  <a:schemeClr val="tx1"/>
-                </a:fontRef>
-              </p:style>
-            </p:cxnSp>
-            <p:cxnSp>
-              <p:nvCxnSpPr>
-                <p:cNvPr id="31" name="Connecteur droit avec flèche 30"/>
-                <p:cNvCxnSpPr>
-                  <a:stCxn id="26" idx="0"/>
-                  <a:endCxn id="21" idx="5"/>
-                </p:cNvCxnSpPr>
-                <p:nvPr/>
-              </p:nvCxnSpPr>
-              <p:spPr>
-                <a:xfrm flipH="1" flipV="1">
-                  <a:off x="5429359" y="3403529"/>
-                  <a:ext cx="948846" cy="866135"/>
-                </a:xfrm>
-                <a:prstGeom prst="straightConnector1">
-                  <a:avLst/>
-                </a:prstGeom>
-                <a:ln>
-                  <a:solidFill>
-                    <a:srgbClr val="008000"/>
-                  </a:solidFill>
-                  <a:headEnd type="stealth" w="lg" len="lg"/>
-                  <a:tailEnd type="stealth" w="lg" len="lg"/>
-                </a:ln>
-              </p:spPr>
-              <p:style>
-                <a:lnRef idx="2">
-                  <a:schemeClr val="accent1"/>
-                </a:lnRef>
-                <a:fillRef idx="0">
-                  <a:schemeClr val="accent1"/>
-                </a:fillRef>
-                <a:effectRef idx="1">
-                  <a:schemeClr val="accent1"/>
-                </a:effectRef>
-                <a:fontRef idx="minor">
-                  <a:schemeClr val="tx1"/>
-                </a:fontRef>
-              </p:style>
-            </p:cxnSp>
-            <p:sp>
-              <p:nvSpPr>
-                <p:cNvPr id="34" name="ZoneTexte 33"/>
-                <p:cNvSpPr txBox="1"/>
-                <p:nvPr/>
-              </p:nvSpPr>
-              <p:spPr>
-                <a:xfrm>
-                  <a:off x="3384765" y="3653627"/>
-                  <a:ext cx="560896" cy="369332"/>
-                </a:xfrm>
-                <a:prstGeom prst="rect">
-                  <a:avLst/>
-                </a:prstGeom>
-                <a:noFill/>
-              </p:spPr>
-              <p:txBody>
-                <a:bodyPr wrap="none" rtlCol="0">
-                  <a:spAutoFit/>
-                </a:bodyPr>
-                <a:lstStyle/>
-                <a:p>
-                  <a:r>
-                    <a:rPr lang="fr-FR" dirty="0" smtClean="0"/>
-                    <a:t>Link</a:t>
-                  </a:r>
-                  <a:endParaRPr lang="fr-FR" dirty="0"/>
-                </a:p>
-              </p:txBody>
-            </p:sp>
-            <p:sp>
-              <p:nvSpPr>
-                <p:cNvPr id="35" name="ZoneTexte 34"/>
-                <p:cNvSpPr txBox="1"/>
-                <p:nvPr/>
-              </p:nvSpPr>
-              <p:spPr>
-                <a:xfrm>
-                  <a:off x="5940821" y="3503532"/>
-                  <a:ext cx="560896" cy="369332"/>
-                </a:xfrm>
-                <a:prstGeom prst="rect">
-                  <a:avLst/>
-                </a:prstGeom>
-                <a:noFill/>
-              </p:spPr>
-              <p:txBody>
-                <a:bodyPr wrap="none" rtlCol="0">
-                  <a:spAutoFit/>
-                </a:bodyPr>
-                <a:lstStyle/>
-                <a:p>
-                  <a:r>
-                    <a:rPr lang="fr-FR" dirty="0" smtClean="0"/>
-                    <a:t>Link</a:t>
-                  </a:r>
-                  <a:endParaRPr lang="fr-FR" dirty="0"/>
-                </a:p>
-              </p:txBody>
-            </p:sp>
-            <p:sp>
-              <p:nvSpPr>
-                <p:cNvPr id="37" name="Rectangle 36"/>
-                <p:cNvSpPr/>
-                <p:nvPr/>
-              </p:nvSpPr>
-              <p:spPr>
-                <a:xfrm>
-                  <a:off x="6692825" y="2834419"/>
-                  <a:ext cx="2127974" cy="640747"/>
-                </a:xfrm>
-                <a:prstGeom prst="rect">
-                  <a:avLst/>
-                </a:prstGeom>
-                <a:solidFill>
-                  <a:srgbClr val="CCC1DA"/>
-                </a:solidFill>
-                <a:ln>
-                  <a:solidFill>
-                    <a:schemeClr val="tx1"/>
-                  </a:solidFill>
-                </a:ln>
-              </p:spPr>
-              <p:style>
-                <a:lnRef idx="1">
-                  <a:schemeClr val="accent1"/>
-                </a:lnRef>
-                <a:fillRef idx="3">
-                  <a:schemeClr val="accent1"/>
-                </a:fillRef>
-                <a:effectRef idx="2">
-                  <a:schemeClr val="accent1"/>
-                </a:effectRef>
-                <a:fontRef idx="minor">
-                  <a:schemeClr val="lt1"/>
-                </a:fontRef>
-              </p:style>
-              <p:txBody>
-                <a:bodyPr rtlCol="0" anchor="ctr"/>
-                <a:lstStyle/>
-                <a:p>
-                  <a:pPr algn="ctr"/>
-                  <a:r>
-                    <a:rPr lang="fr-FR" sz="1600" dirty="0" smtClean="0">
-                      <a:solidFill>
-                        <a:schemeClr val="tx1"/>
-                      </a:solidFill>
-                    </a:rPr>
-                    <a:t>Reference Requirement </a:t>
-                  </a:r>
-                  <a:r>
-                    <a:rPr lang="fr-FR" sz="1600" dirty="0" smtClean="0">
-                      <a:solidFill>
-                        <a:schemeClr val="tx1"/>
-                      </a:solidFill>
-                    </a:rPr>
-                    <a:t>Data Base</a:t>
-                  </a:r>
-                  <a:endParaRPr lang="fr-FR" sz="1600" dirty="0">
-                    <a:solidFill>
-                      <a:schemeClr val="tx1"/>
-                    </a:solidFill>
-                  </a:endParaRPr>
-                </a:p>
-              </p:txBody>
-            </p:sp>
-            <p:cxnSp>
-              <p:nvCxnSpPr>
-                <p:cNvPr id="38" name="Connecteur droit avec flèche 37"/>
-                <p:cNvCxnSpPr>
-                  <a:stCxn id="21" idx="6"/>
-                  <a:endCxn id="37" idx="1"/>
-                </p:cNvCxnSpPr>
-                <p:nvPr/>
-              </p:nvCxnSpPr>
-              <p:spPr>
-                <a:xfrm flipV="1">
-                  <a:off x="5766126" y="3154793"/>
-                  <a:ext cx="926699" cy="7309"/>
-                </a:xfrm>
-                <a:prstGeom prst="straightConnector1">
-                  <a:avLst/>
-                </a:prstGeom>
-                <a:ln>
-                  <a:solidFill>
-                    <a:srgbClr val="000000"/>
-                  </a:solidFill>
-                  <a:tailEnd type="stealth" w="lg" len="lg"/>
-                </a:ln>
-              </p:spPr>
-              <p:style>
-                <a:lnRef idx="2">
-                  <a:schemeClr val="accent1"/>
-                </a:lnRef>
-                <a:fillRef idx="0">
-                  <a:schemeClr val="accent1"/>
-                </a:fillRef>
-                <a:effectRef idx="1">
-                  <a:schemeClr val="accent1"/>
-                </a:effectRef>
-                <a:fontRef idx="minor">
-                  <a:schemeClr val="tx1"/>
-                </a:fontRef>
-              </p:style>
-            </p:cxnSp>
-            <p:sp>
-              <p:nvSpPr>
-                <p:cNvPr id="43" name="ZoneTexte 42"/>
-                <p:cNvSpPr txBox="1"/>
-                <p:nvPr/>
-              </p:nvSpPr>
-              <p:spPr>
-                <a:xfrm>
-                  <a:off x="5786672" y="2785461"/>
-                  <a:ext cx="878065" cy="369332"/>
-                </a:xfrm>
-                <a:prstGeom prst="rect">
-                  <a:avLst/>
-                </a:prstGeom>
-                <a:noFill/>
-              </p:spPr>
-              <p:txBody>
-                <a:bodyPr wrap="none" rtlCol="0">
-                  <a:spAutoFit/>
-                </a:bodyPr>
-                <a:lstStyle/>
-                <a:p>
-                  <a:r>
-                    <a:rPr lang="fr-FR" dirty="0" smtClean="0"/>
-                    <a:t>Update</a:t>
-                  </a:r>
-                  <a:endParaRPr lang="fr-FR" dirty="0"/>
-                </a:p>
-              </p:txBody>
-            </p:sp>
-            <p:sp>
-              <p:nvSpPr>
-                <p:cNvPr id="44" name="Rectangle 43"/>
-                <p:cNvSpPr/>
-                <p:nvPr/>
-              </p:nvSpPr>
-              <p:spPr>
-                <a:xfrm>
-                  <a:off x="5429358" y="1304379"/>
-                  <a:ext cx="2098639" cy="640747"/>
-                </a:xfrm>
-                <a:prstGeom prst="rect">
-                  <a:avLst/>
-                </a:prstGeom>
-                <a:solidFill>
-                  <a:schemeClr val="accent1">
-                    <a:lumMod val="20000"/>
-                    <a:lumOff val="80000"/>
-                  </a:schemeClr>
-                </a:solidFill>
-                <a:ln>
-                  <a:solidFill>
-                    <a:schemeClr val="tx1"/>
-                  </a:solidFill>
-                </a:ln>
-              </p:spPr>
-              <p:style>
-                <a:lnRef idx="1">
-                  <a:schemeClr val="accent1"/>
-                </a:lnRef>
-                <a:fillRef idx="3">
-                  <a:schemeClr val="accent1"/>
-                </a:fillRef>
-                <a:effectRef idx="2">
-                  <a:schemeClr val="accent1"/>
-                </a:effectRef>
-                <a:fontRef idx="minor">
-                  <a:schemeClr val="lt1"/>
-                </a:fontRef>
-              </p:style>
-              <p:txBody>
-                <a:bodyPr rtlCol="0" anchor="ctr"/>
-                <a:lstStyle/>
-                <a:p>
-                  <a:pPr algn="ctr"/>
-                  <a:r>
-                    <a:rPr lang="fr-FR" dirty="0" err="1" smtClean="0">
-                      <a:solidFill>
-                        <a:schemeClr val="tx1"/>
-                      </a:solidFill>
-                    </a:rPr>
-                    <a:t>Subset</a:t>
-                  </a:r>
-                  <a:r>
-                    <a:rPr lang="fr-FR" dirty="0" smtClean="0">
-                      <a:solidFill>
-                        <a:schemeClr val="tx1"/>
-                      </a:solidFill>
-                    </a:rPr>
-                    <a:t> 026 </a:t>
-                  </a:r>
-                  <a:r>
-                    <a:rPr lang="fr-FR" dirty="0" err="1" smtClean="0">
-                      <a:solidFill>
-                        <a:schemeClr val="tx1"/>
-                      </a:solidFill>
-                    </a:rPr>
-                    <a:t>requirements</a:t>
-                  </a:r>
-                  <a:endParaRPr lang="fr-FR" dirty="0">
-                    <a:solidFill>
-                      <a:schemeClr val="tx1"/>
-                    </a:solidFill>
-                  </a:endParaRPr>
-                </a:p>
-              </p:txBody>
-            </p:sp>
-            <p:pic>
-              <p:nvPicPr>
-                <p:cNvPr id="18" name="Image 17"/>
-                <p:cNvPicPr>
-                  <a:picLocks noChangeAspect="1"/>
-                </p:cNvPicPr>
-                <p:nvPr/>
-              </p:nvPicPr>
-              <p:blipFill>
-                <a:blip r:embed="rId3"/>
-                <a:stretch>
-                  <a:fillRect/>
-                </a:stretch>
-              </p:blipFill>
-              <p:spPr>
-                <a:xfrm>
-                  <a:off x="7108238" y="1044318"/>
-                  <a:ext cx="1106203" cy="455718"/>
-                </a:xfrm>
-                <a:prstGeom prst="rect">
-                  <a:avLst/>
-                </a:prstGeom>
-              </p:spPr>
-            </p:pic>
-            <p:cxnSp>
-              <p:nvCxnSpPr>
-                <p:cNvPr id="46" name="Connecteur droit avec flèche 45"/>
-                <p:cNvCxnSpPr>
-                  <a:endCxn id="44" idx="1"/>
-                </p:cNvCxnSpPr>
-                <p:nvPr/>
-              </p:nvCxnSpPr>
-              <p:spPr>
-                <a:xfrm>
-                  <a:off x="3895138" y="1608945"/>
-                  <a:ext cx="1534220" cy="15808"/>
-                </a:xfrm>
-                <a:prstGeom prst="straightConnector1">
-                  <a:avLst/>
-                </a:prstGeom>
-                <a:ln>
-                  <a:solidFill>
-                    <a:srgbClr val="000000"/>
-                  </a:solidFill>
-                  <a:tailEnd type="stealth" w="lg" len="lg"/>
-                </a:ln>
-              </p:spPr>
-              <p:style>
-                <a:lnRef idx="2">
-                  <a:schemeClr val="accent1"/>
-                </a:lnRef>
-                <a:fillRef idx="0">
-                  <a:schemeClr val="accent1"/>
-                </a:fillRef>
-                <a:effectRef idx="1">
-                  <a:schemeClr val="accent1"/>
-                </a:effectRef>
-                <a:fontRef idx="minor">
-                  <a:schemeClr val="tx1"/>
-                </a:fontRef>
-              </p:style>
-            </p:cxnSp>
-            <p:sp>
-              <p:nvSpPr>
-                <p:cNvPr id="48" name="ZoneTexte 47"/>
-                <p:cNvSpPr txBox="1"/>
-                <p:nvPr/>
-              </p:nvSpPr>
-              <p:spPr>
-                <a:xfrm>
-                  <a:off x="4128641" y="1239613"/>
-                  <a:ext cx="1300356" cy="369332"/>
-                </a:xfrm>
-                <a:prstGeom prst="rect">
-                  <a:avLst/>
-                </a:prstGeom>
-                <a:noFill/>
-              </p:spPr>
-              <p:txBody>
-                <a:bodyPr wrap="none" rtlCol="0">
-                  <a:spAutoFit/>
-                </a:bodyPr>
-                <a:lstStyle/>
-                <a:p>
-                  <a:r>
-                    <a:rPr lang="fr-FR" dirty="0" smtClean="0"/>
-                    <a:t>1.B1 Import</a:t>
-                  </a:r>
-                  <a:endParaRPr lang="fr-FR" dirty="0"/>
-                </a:p>
-              </p:txBody>
-            </p:sp>
-            <p:cxnSp>
-              <p:nvCxnSpPr>
-                <p:cNvPr id="49" name="Connecteur droit avec flèche 48"/>
-                <p:cNvCxnSpPr>
-                  <a:stCxn id="44" idx="2"/>
-                  <a:endCxn id="21" idx="7"/>
-                </p:cNvCxnSpPr>
-                <p:nvPr/>
-              </p:nvCxnSpPr>
-              <p:spPr>
-                <a:xfrm flipH="1">
-                  <a:off x="5429359" y="1945126"/>
-                  <a:ext cx="1049319" cy="975549"/>
-                </a:xfrm>
-                <a:prstGeom prst="straightConnector1">
-                  <a:avLst/>
-                </a:prstGeom>
-                <a:ln>
-                  <a:solidFill>
-                    <a:srgbClr val="000000"/>
-                  </a:solidFill>
-                  <a:tailEnd type="stealth" w="lg" len="lg"/>
-                </a:ln>
-              </p:spPr>
-              <p:style>
-                <a:lnRef idx="2">
-                  <a:schemeClr val="accent1"/>
-                </a:lnRef>
-                <a:fillRef idx="0">
-                  <a:schemeClr val="accent1"/>
-                </a:fillRef>
-                <a:effectRef idx="1">
-                  <a:schemeClr val="accent1"/>
-                </a:effectRef>
-                <a:fontRef idx="minor">
-                  <a:schemeClr val="tx1"/>
-                </a:fontRef>
-              </p:style>
-            </p:cxnSp>
-            <p:sp>
-              <p:nvSpPr>
-                <p:cNvPr id="52" name="ZoneTexte 51"/>
-                <p:cNvSpPr txBox="1"/>
-                <p:nvPr/>
-              </p:nvSpPr>
-              <p:spPr>
-                <a:xfrm>
-                  <a:off x="5958682" y="2299825"/>
-                  <a:ext cx="1300356" cy="369332"/>
-                </a:xfrm>
-                <a:prstGeom prst="rect">
-                  <a:avLst/>
-                </a:prstGeom>
-                <a:noFill/>
-              </p:spPr>
-              <p:txBody>
-                <a:bodyPr wrap="none" rtlCol="0">
-                  <a:spAutoFit/>
-                </a:bodyPr>
-                <a:lstStyle/>
-                <a:p>
-                  <a:r>
-                    <a:rPr lang="fr-FR" dirty="0" smtClean="0"/>
-                    <a:t>1.B2 Import</a:t>
-                  </a:r>
-                  <a:endParaRPr lang="fr-FR" dirty="0"/>
-                </a:p>
-              </p:txBody>
-            </p:sp>
-            <p:cxnSp>
-              <p:nvCxnSpPr>
-                <p:cNvPr id="54" name="Connecteur droit avec flèche 53"/>
-                <p:cNvCxnSpPr>
-                  <a:stCxn id="27" idx="4"/>
-                  <a:endCxn id="53" idx="0"/>
-                </p:cNvCxnSpPr>
-                <p:nvPr/>
-              </p:nvCxnSpPr>
-              <p:spPr>
-                <a:xfrm>
-                  <a:off x="2642593" y="4952524"/>
-                  <a:ext cx="5192" cy="522197"/>
-                </a:xfrm>
-                <a:prstGeom prst="straightConnector1">
-                  <a:avLst/>
-                </a:prstGeom>
-                <a:ln>
-                  <a:solidFill>
-                    <a:srgbClr val="000000"/>
-                  </a:solidFill>
-                  <a:tailEnd type="stealth" w="lg" len="lg"/>
-                </a:ln>
-              </p:spPr>
-              <p:style>
-                <a:lnRef idx="2">
-                  <a:schemeClr val="accent1"/>
-                </a:lnRef>
-                <a:fillRef idx="0">
-                  <a:schemeClr val="accent1"/>
-                </a:fillRef>
-                <a:effectRef idx="1">
-                  <a:schemeClr val="accent1"/>
-                </a:effectRef>
-                <a:fontRef idx="minor">
-                  <a:schemeClr val="tx1"/>
-                </a:fontRef>
-              </p:style>
-            </p:cxnSp>
-            <p:sp>
-              <p:nvSpPr>
-                <p:cNvPr id="59" name="Rectangle 58"/>
-                <p:cNvSpPr/>
-                <p:nvPr/>
-              </p:nvSpPr>
-              <p:spPr>
-                <a:xfrm>
-                  <a:off x="953813" y="2841728"/>
-                  <a:ext cx="1224158" cy="640747"/>
-                </a:xfrm>
-                <a:prstGeom prst="rect">
-                  <a:avLst/>
-                </a:prstGeom>
-                <a:solidFill>
-                  <a:schemeClr val="accent1">
-                    <a:lumMod val="20000"/>
-                    <a:lumOff val="80000"/>
-                  </a:schemeClr>
-                </a:solidFill>
-                <a:ln>
-                  <a:solidFill>
-                    <a:schemeClr val="tx1"/>
-                  </a:solidFill>
-                </a:ln>
-              </p:spPr>
-              <p:style>
-                <a:lnRef idx="1">
-                  <a:schemeClr val="accent1"/>
-                </a:lnRef>
-                <a:fillRef idx="3">
-                  <a:schemeClr val="accent1"/>
-                </a:fillRef>
-                <a:effectRef idx="2">
-                  <a:schemeClr val="accent1"/>
-                </a:effectRef>
-                <a:fontRef idx="minor">
-                  <a:schemeClr val="lt1"/>
-                </a:fontRef>
-              </p:style>
-              <p:txBody>
-                <a:bodyPr rtlCol="0" anchor="ctr"/>
-                <a:lstStyle/>
-                <a:p>
-                  <a:pPr algn="ctr"/>
-                  <a:r>
-                    <a:rPr lang="fr-FR" dirty="0" smtClean="0">
-                      <a:solidFill>
-                        <a:schemeClr val="tx1"/>
-                      </a:solidFill>
-                    </a:rPr>
-                    <a:t>OpenETCS API</a:t>
-                  </a:r>
-                  <a:endParaRPr lang="fr-FR" dirty="0">
-                    <a:solidFill>
-                      <a:schemeClr val="tx1"/>
-                    </a:solidFill>
-                  </a:endParaRPr>
-                </a:p>
-              </p:txBody>
-            </p:sp>
-            <p:cxnSp>
-              <p:nvCxnSpPr>
-                <p:cNvPr id="61" name="Connecteur droit avec flèche 60"/>
-                <p:cNvCxnSpPr>
-                  <a:stCxn id="59" idx="3"/>
-                  <a:endCxn id="21" idx="2"/>
-                </p:cNvCxnSpPr>
-                <p:nvPr/>
-              </p:nvCxnSpPr>
-              <p:spPr>
-                <a:xfrm>
-                  <a:off x="2177971" y="3162102"/>
-                  <a:ext cx="1288569" cy="0"/>
-                </a:xfrm>
-                <a:prstGeom prst="straightConnector1">
-                  <a:avLst/>
-                </a:prstGeom>
-                <a:ln>
-                  <a:solidFill>
-                    <a:srgbClr val="000000"/>
-                  </a:solidFill>
-                  <a:tailEnd type="stealth" w="lg" len="lg"/>
-                </a:ln>
-              </p:spPr>
-              <p:style>
-                <a:lnRef idx="2">
-                  <a:schemeClr val="accent1"/>
-                </a:lnRef>
-                <a:fillRef idx="0">
-                  <a:schemeClr val="accent1"/>
-                </a:fillRef>
-                <a:effectRef idx="1">
-                  <a:schemeClr val="accent1"/>
-                </a:effectRef>
-                <a:fontRef idx="minor">
-                  <a:schemeClr val="tx1"/>
-                </a:fontRef>
-              </p:style>
-            </p:cxnSp>
-            <p:sp>
-              <p:nvSpPr>
-                <p:cNvPr id="65" name="ZoneTexte 64"/>
-                <p:cNvSpPr txBox="1"/>
-                <p:nvPr/>
-              </p:nvSpPr>
-              <p:spPr>
-                <a:xfrm>
-                  <a:off x="2280348" y="2736009"/>
-                  <a:ext cx="1056700" cy="369332"/>
-                </a:xfrm>
-                <a:prstGeom prst="rect">
-                  <a:avLst/>
-                </a:prstGeom>
-                <a:noFill/>
-              </p:spPr>
-              <p:txBody>
-                <a:bodyPr wrap="none" rtlCol="0">
-                  <a:spAutoFit/>
-                </a:bodyPr>
-                <a:lstStyle/>
-                <a:p>
-                  <a:r>
-                    <a:rPr lang="fr-FR" dirty="0" smtClean="0"/>
-                    <a:t>2. Import</a:t>
-                  </a:r>
-                  <a:endParaRPr lang="fr-FR" dirty="0"/>
-                </a:p>
-              </p:txBody>
-            </p:sp>
-          </p:grpSp>
-        </p:grpSp>
-        <p:pic>
-          <p:nvPicPr>
-            <p:cNvPr id="66" name="Image 65"/>
-            <p:cNvPicPr>
-              <a:picLocks noChangeAspect="1"/>
-            </p:cNvPicPr>
-            <p:nvPr/>
-          </p:nvPicPr>
-          <p:blipFill>
-            <a:blip r:embed="rId4"/>
-            <a:stretch>
-              <a:fillRect/>
-            </a:stretch>
-          </p:blipFill>
-          <p:spPr>
-            <a:xfrm>
-              <a:off x="7935533" y="2484491"/>
-              <a:ext cx="795600" cy="429624"/>
-            </a:xfrm>
-            <a:prstGeom prst="rect">
-              <a:avLst/>
-            </a:prstGeom>
-            <a:ln>
-              <a:noFill/>
-            </a:ln>
-          </p:spPr>
-        </p:pic>
-      </p:grpSp>
-      <p:sp>
-        <p:nvSpPr>
-          <p:cNvPr id="39" name="Ellipse 38"/>
-          <p:cNvSpPr/>
-          <p:nvPr/>
-        </p:nvSpPr>
-        <p:spPr>
-          <a:xfrm>
-            <a:off x="3945660" y="5531930"/>
-            <a:ext cx="1889109" cy="682860"/>
-          </a:xfrm>
-          <a:prstGeom prst="ellipse">
-            <a:avLst/>
-          </a:prstGeom>
-          <a:solidFill>
-            <a:srgbClr val="CCC1DA"/>
-          </a:solidFill>
-          <a:ln>
-            <a:solidFill>
-              <a:srgbClr val="000000"/>
-            </a:solidFill>
-          </a:ln>
-        </p:spPr>
-        <p:style>
-          <a:lnRef idx="1">
-            <a:schemeClr val="accent1"/>
-          </a:lnRef>
-          <a:fillRef idx="3">
-            <a:schemeClr val="accent1"/>
-          </a:fillRef>
-          <a:effectRef idx="2">
-            <a:schemeClr val="accent1"/>
-          </a:effectRef>
-          <a:fontRef idx="minor">
-            <a:schemeClr val="lt1"/>
-          </a:fontRef>
-        </p:style>
-        <p:txBody>
-          <a:bodyPr rtlCol="0" anchor="ctr"/>
-          <a:lstStyle/>
-          <a:p>
-            <a:pPr algn="ctr"/>
-            <a:r>
-              <a:rPr lang="fr-FR" dirty="0" err="1" smtClean="0">
-                <a:solidFill>
-                  <a:srgbClr val="000000"/>
-                </a:solidFill>
-              </a:rPr>
-              <a:t>GenDoc</a:t>
-            </a:r>
-            <a:endParaRPr lang="fr-FR" dirty="0">
-              <a:solidFill>
-                <a:srgbClr val="000000"/>
-              </a:solidFill>
-            </a:endParaRPr>
-          </a:p>
-        </p:txBody>
-      </p:sp>
-      <p:cxnSp>
-        <p:nvCxnSpPr>
-          <p:cNvPr id="40" name="Connecteur droit avec flèche 39"/>
-          <p:cNvCxnSpPr/>
-          <p:nvPr/>
-        </p:nvCxnSpPr>
-        <p:spPr>
-          <a:xfrm>
-            <a:off x="4854993" y="3501197"/>
-            <a:ext cx="0" cy="2059575"/>
-          </a:xfrm>
-          <a:prstGeom prst="straightConnector1">
-            <a:avLst/>
-          </a:prstGeom>
-          <a:ln>
-            <a:solidFill>
-              <a:srgbClr val="000000"/>
-            </a:solidFill>
-            <a:tailEnd type="stealth" w="lg" len="lg"/>
-          </a:ln>
-        </p:spPr>
-        <p:style>
-          <a:lnRef idx="2">
-            <a:schemeClr val="accent1"/>
-          </a:lnRef>
-          <a:fillRef idx="0">
-            <a:schemeClr val="accent1"/>
-          </a:fillRef>
-          <a:effectRef idx="1">
-            <a:schemeClr val="accent1"/>
-          </a:effectRef>
-          <a:fontRef idx="minor">
-            <a:schemeClr val="tx1"/>
-          </a:fontRef>
-        </p:style>
-      </p:cxnSp>
-      <p:sp>
-        <p:nvSpPr>
-          <p:cNvPr id="41" name="ZoneTexte 40"/>
-          <p:cNvSpPr txBox="1"/>
-          <p:nvPr/>
-        </p:nvSpPr>
-        <p:spPr>
-          <a:xfrm>
-            <a:off x="3823942" y="4503099"/>
-            <a:ext cx="1031051" cy="369332"/>
-          </a:xfrm>
-          <a:prstGeom prst="rect">
-            <a:avLst/>
-          </a:prstGeom>
-          <a:noFill/>
-        </p:spPr>
-        <p:txBody>
-          <a:bodyPr wrap="none" rtlCol="0">
-            <a:spAutoFit/>
-          </a:bodyPr>
-          <a:lstStyle/>
-          <a:p>
-            <a:r>
-              <a:rPr lang="fr-FR" dirty="0"/>
-              <a:t>7</a:t>
-            </a:r>
-            <a:r>
-              <a:rPr lang="fr-FR" dirty="0" smtClean="0"/>
-              <a:t>. export</a:t>
-            </a:r>
-            <a:endParaRPr lang="fr-FR" dirty="0"/>
-          </a:p>
-        </p:txBody>
-      </p:sp>
-      <p:pic>
-        <p:nvPicPr>
-          <p:cNvPr id="42" name="Image 41"/>
-          <p:cNvPicPr>
-            <a:picLocks noChangeAspect="1"/>
-          </p:cNvPicPr>
-          <p:nvPr/>
-        </p:nvPicPr>
-        <p:blipFill>
-          <a:blip r:embed="rId5"/>
-          <a:stretch>
-            <a:fillRect/>
-          </a:stretch>
-        </p:blipFill>
-        <p:spPr>
-          <a:xfrm>
-            <a:off x="4436984" y="4952524"/>
-            <a:ext cx="831894" cy="369332"/>
-          </a:xfrm>
-          <a:prstGeom prst="rect">
-            <a:avLst/>
-          </a:prstGeom>
-        </p:spPr>
-      </p:pic>
-    </p:spTree>
-    <p:extLst>
-      <p:ext uri="{BB962C8B-B14F-4D97-AF65-F5344CB8AC3E}">
-        <p14:creationId xmlns:p14="http://schemas.microsoft.com/office/powerpoint/2010/main" val="3972746041"/>
-      </p:ext>
-    </p:extLst>
-  </p:cSld>
-  <p:clrMapOvr>
-    <a:masterClrMapping/>
-  </p:clrMapOvr>
-</p:sld>
-</file>
-
 <file path=ppt/theme/theme1.xml><?xml version="1.0" encoding="utf-8"?>
 <a:theme xmlns:a="http://schemas.openxmlformats.org/drawingml/2006/main" name="Thème Office">
   <a:themeElements>

</xml_diff>